<commit_message>
FInalize PowerPoint outline and add spotify presentation
</commit_message>
<xml_diff>
--- a/World Happiness Analysis- Group 4 Final Presentation.pptx
+++ b/World Happiness Analysis- Group 4 Final Presentation.pptx
@@ -5,10 +5,10 @@
     <p:sldMasterId id="2147483697" r:id="rId4"/>
   </p:sldMasterIdLst>
   <p:notesMasterIdLst>
-    <p:notesMasterId r:id="rId20"/>
+    <p:notesMasterId r:id="rId24"/>
   </p:notesMasterIdLst>
   <p:handoutMasterIdLst>
-    <p:handoutMasterId r:id="rId21"/>
+    <p:handoutMasterId r:id="rId25"/>
   </p:handoutMasterIdLst>
   <p:sldIdLst>
     <p:sldId id="289" r:id="rId5"/>
@@ -25,7 +25,11 @@
     <p:sldId id="329" r:id="rId16"/>
     <p:sldId id="333" r:id="rId17"/>
     <p:sldId id="334" r:id="rId18"/>
-    <p:sldId id="315" r:id="rId19"/>
+    <p:sldId id="337" r:id="rId19"/>
+    <p:sldId id="338" r:id="rId20"/>
+    <p:sldId id="339" r:id="rId21"/>
+    <p:sldId id="315" r:id="rId22"/>
+    <p:sldId id="340" r:id="rId23"/>
   </p:sldIdLst>
   <p:sldSz cx="12192000" cy="6858000"/>
   <p:notesSz cx="6858000" cy="9144000"/>
@@ -1208,7 +1212,7 @@
             <a:spLocks noGrp="1"/>
           </p:cNvSpPr>
           <p:nvPr>
-            <p:ph type="sldNum" sz="quarter" idx="5"/>
+            <p:ph type="sldNum" sz="quarter" idx="10"/>
           </p:nvPr>
         </p:nvSpPr>
         <p:spPr/>
@@ -1227,7 +1231,343 @@
     </p:spTree>
     <p:extLst>
       <p:ext uri="{BB962C8B-B14F-4D97-AF65-F5344CB8AC3E}">
+        <p14:creationId xmlns:p14="http://schemas.microsoft.com/office/powerpoint/2010/main" val="970064993"/>
+      </p:ext>
+    </p:extLst>
+  </p:cSld>
+  <p:clrMapOvr>
+    <a:masterClrMapping/>
+  </p:clrMapOvr>
+</p:notes>
+</file>
+
+<file path=ppt/notesSlides/notesSlide16.xml><?xml version="1.0" encoding="utf-8"?>
+<p:notes xmlns:a="http://schemas.openxmlformats.org/drawingml/2006/main" xmlns:r="http://schemas.openxmlformats.org/officeDocument/2006/relationships" xmlns:p="http://schemas.openxmlformats.org/presentationml/2006/main">
+  <p:cSld>
+    <p:spTree>
+      <p:nvGrpSpPr>
+        <p:cNvPr id="1" name=""/>
+        <p:cNvGrpSpPr/>
+        <p:nvPr/>
+      </p:nvGrpSpPr>
+      <p:grpSpPr>
+        <a:xfrm>
+          <a:off x="0" y="0"/>
+          <a:ext cx="0" cy="0"/>
+          <a:chOff x="0" y="0"/>
+          <a:chExt cx="0" cy="0"/>
+        </a:xfrm>
+      </p:grpSpPr>
+      <p:sp>
+        <p:nvSpPr>
+          <p:cNvPr id="2" name="Slide Image Placeholder 1"/>
+          <p:cNvSpPr>
+            <a:spLocks noGrp="1" noRot="1" noChangeAspect="1"/>
+          </p:cNvSpPr>
+          <p:nvPr>
+            <p:ph type="sldImg"/>
+          </p:nvPr>
+        </p:nvSpPr>
+        <p:spPr/>
+      </p:sp>
+      <p:sp>
+        <p:nvSpPr>
+          <p:cNvPr id="3" name="Notes Placeholder 2"/>
+          <p:cNvSpPr>
+            <a:spLocks noGrp="1"/>
+          </p:cNvSpPr>
+          <p:nvPr>
+            <p:ph type="body" idx="1"/>
+          </p:nvPr>
+        </p:nvSpPr>
+        <p:spPr/>
+        <p:txBody>
+          <a:bodyPr/>
+          <a:lstStyle/>
+          <a:p>
+            <a:endParaRPr lang="en-US" dirty="0"/>
+          </a:p>
+        </p:txBody>
+      </p:sp>
+      <p:sp>
+        <p:nvSpPr>
+          <p:cNvPr id="4" name="Slide Number Placeholder 3"/>
+          <p:cNvSpPr>
+            <a:spLocks noGrp="1"/>
+          </p:cNvSpPr>
+          <p:nvPr>
+            <p:ph type="sldNum" sz="quarter" idx="10"/>
+          </p:nvPr>
+        </p:nvSpPr>
+        <p:spPr/>
+        <p:txBody>
+          <a:bodyPr/>
+          <a:lstStyle/>
+          <a:p>
+            <a:fld id="{D2D22BCB-3FB0-4AD6-9692-BE008A8F6B96}" type="slidenum">
+              <a:rPr lang="en-US" smtClean="0"/>
+              <a:t>16</a:t>
+            </a:fld>
+            <a:endParaRPr lang="en-US"/>
+          </a:p>
+        </p:txBody>
+      </p:sp>
+    </p:spTree>
+    <p:extLst>
+      <p:ext uri="{BB962C8B-B14F-4D97-AF65-F5344CB8AC3E}">
+        <p14:creationId xmlns:p14="http://schemas.microsoft.com/office/powerpoint/2010/main" val="1570823943"/>
+      </p:ext>
+    </p:extLst>
+  </p:cSld>
+  <p:clrMapOvr>
+    <a:masterClrMapping/>
+  </p:clrMapOvr>
+</p:notes>
+</file>
+
+<file path=ppt/notesSlides/notesSlide17.xml><?xml version="1.0" encoding="utf-8"?>
+<p:notes xmlns:a="http://schemas.openxmlformats.org/drawingml/2006/main" xmlns:r="http://schemas.openxmlformats.org/officeDocument/2006/relationships" xmlns:p="http://schemas.openxmlformats.org/presentationml/2006/main">
+  <p:cSld>
+    <p:spTree>
+      <p:nvGrpSpPr>
+        <p:cNvPr id="1" name=""/>
+        <p:cNvGrpSpPr/>
+        <p:nvPr/>
+      </p:nvGrpSpPr>
+      <p:grpSpPr>
+        <a:xfrm>
+          <a:off x="0" y="0"/>
+          <a:ext cx="0" cy="0"/>
+          <a:chOff x="0" y="0"/>
+          <a:chExt cx="0" cy="0"/>
+        </a:xfrm>
+      </p:grpSpPr>
+      <p:sp>
+        <p:nvSpPr>
+          <p:cNvPr id="2" name="Slide Image Placeholder 1"/>
+          <p:cNvSpPr>
+            <a:spLocks noGrp="1" noRot="1" noChangeAspect="1"/>
+          </p:cNvSpPr>
+          <p:nvPr>
+            <p:ph type="sldImg"/>
+          </p:nvPr>
+        </p:nvSpPr>
+        <p:spPr/>
+      </p:sp>
+      <p:sp>
+        <p:nvSpPr>
+          <p:cNvPr id="3" name="Notes Placeholder 2"/>
+          <p:cNvSpPr>
+            <a:spLocks noGrp="1"/>
+          </p:cNvSpPr>
+          <p:nvPr>
+            <p:ph type="body" idx="1"/>
+          </p:nvPr>
+        </p:nvSpPr>
+        <p:spPr/>
+        <p:txBody>
+          <a:bodyPr/>
+          <a:lstStyle/>
+          <a:p>
+            <a:endParaRPr lang="en-US" dirty="0"/>
+          </a:p>
+        </p:txBody>
+      </p:sp>
+      <p:sp>
+        <p:nvSpPr>
+          <p:cNvPr id="4" name="Slide Number Placeholder 3"/>
+          <p:cNvSpPr>
+            <a:spLocks noGrp="1"/>
+          </p:cNvSpPr>
+          <p:nvPr>
+            <p:ph type="sldNum" sz="quarter" idx="10"/>
+          </p:nvPr>
+        </p:nvSpPr>
+        <p:spPr/>
+        <p:txBody>
+          <a:bodyPr/>
+          <a:lstStyle/>
+          <a:p>
+            <a:fld id="{D2D22BCB-3FB0-4AD6-9692-BE008A8F6B96}" type="slidenum">
+              <a:rPr lang="en-US" smtClean="0"/>
+              <a:t>17</a:t>
+            </a:fld>
+            <a:endParaRPr lang="en-US"/>
+          </a:p>
+        </p:txBody>
+      </p:sp>
+    </p:spTree>
+    <p:extLst>
+      <p:ext uri="{BB962C8B-B14F-4D97-AF65-F5344CB8AC3E}">
+        <p14:creationId xmlns:p14="http://schemas.microsoft.com/office/powerpoint/2010/main" val="1563162935"/>
+      </p:ext>
+    </p:extLst>
+  </p:cSld>
+  <p:clrMapOvr>
+    <a:masterClrMapping/>
+  </p:clrMapOvr>
+</p:notes>
+</file>
+
+<file path=ppt/notesSlides/notesSlide18.xml><?xml version="1.0" encoding="utf-8"?>
+<p:notes xmlns:a="http://schemas.openxmlformats.org/drawingml/2006/main" xmlns:r="http://schemas.openxmlformats.org/officeDocument/2006/relationships" xmlns:p="http://schemas.openxmlformats.org/presentationml/2006/main">
+  <p:cSld>
+    <p:spTree>
+      <p:nvGrpSpPr>
+        <p:cNvPr id="1" name=""/>
+        <p:cNvGrpSpPr/>
+        <p:nvPr/>
+      </p:nvGrpSpPr>
+      <p:grpSpPr>
+        <a:xfrm>
+          <a:off x="0" y="0"/>
+          <a:ext cx="0" cy="0"/>
+          <a:chOff x="0" y="0"/>
+          <a:chExt cx="0" cy="0"/>
+        </a:xfrm>
+      </p:grpSpPr>
+      <p:sp>
+        <p:nvSpPr>
+          <p:cNvPr id="2" name="Slide Image Placeholder 1"/>
+          <p:cNvSpPr>
+            <a:spLocks noGrp="1" noRot="1" noChangeAspect="1"/>
+          </p:cNvSpPr>
+          <p:nvPr>
+            <p:ph type="sldImg"/>
+          </p:nvPr>
+        </p:nvSpPr>
+        <p:spPr/>
+      </p:sp>
+      <p:sp>
+        <p:nvSpPr>
+          <p:cNvPr id="3" name="Notes Placeholder 2"/>
+          <p:cNvSpPr>
+            <a:spLocks noGrp="1"/>
+          </p:cNvSpPr>
+          <p:nvPr>
+            <p:ph type="body" idx="1"/>
+          </p:nvPr>
+        </p:nvSpPr>
+        <p:spPr/>
+        <p:txBody>
+          <a:bodyPr/>
+          <a:lstStyle/>
+          <a:p>
+            <a:endParaRPr lang="en-US" dirty="0"/>
+          </a:p>
+        </p:txBody>
+      </p:sp>
+      <p:sp>
+        <p:nvSpPr>
+          <p:cNvPr id="4" name="Slide Number Placeholder 3"/>
+          <p:cNvSpPr>
+            <a:spLocks noGrp="1"/>
+          </p:cNvSpPr>
+          <p:nvPr>
+            <p:ph type="sldNum" sz="quarter" idx="5"/>
+          </p:nvPr>
+        </p:nvSpPr>
+        <p:spPr/>
+        <p:txBody>
+          <a:bodyPr/>
+          <a:lstStyle/>
+          <a:p>
+            <a:fld id="{D2D22BCB-3FB0-4AD6-9692-BE008A8F6B96}" type="slidenum">
+              <a:rPr lang="en-US" smtClean="0"/>
+              <a:t>18</a:t>
+            </a:fld>
+            <a:endParaRPr lang="en-US"/>
+          </a:p>
+        </p:txBody>
+      </p:sp>
+    </p:spTree>
+    <p:extLst>
+      <p:ext uri="{BB962C8B-B14F-4D97-AF65-F5344CB8AC3E}">
         <p14:creationId xmlns:p14="http://schemas.microsoft.com/office/powerpoint/2010/main" val="1486313915"/>
+      </p:ext>
+    </p:extLst>
+  </p:cSld>
+  <p:clrMapOvr>
+    <a:masterClrMapping/>
+  </p:clrMapOvr>
+</p:notes>
+</file>
+
+<file path=ppt/notesSlides/notesSlide19.xml><?xml version="1.0" encoding="utf-8"?>
+<p:notes xmlns:a="http://schemas.openxmlformats.org/drawingml/2006/main" xmlns:r="http://schemas.openxmlformats.org/officeDocument/2006/relationships" xmlns:p="http://schemas.openxmlformats.org/presentationml/2006/main">
+  <p:cSld>
+    <p:spTree>
+      <p:nvGrpSpPr>
+        <p:cNvPr id="1" name=""/>
+        <p:cNvGrpSpPr/>
+        <p:nvPr/>
+      </p:nvGrpSpPr>
+      <p:grpSpPr>
+        <a:xfrm>
+          <a:off x="0" y="0"/>
+          <a:ext cx="0" cy="0"/>
+          <a:chOff x="0" y="0"/>
+          <a:chExt cx="0" cy="0"/>
+        </a:xfrm>
+      </p:grpSpPr>
+      <p:sp>
+        <p:nvSpPr>
+          <p:cNvPr id="2" name="Slide Image Placeholder 1"/>
+          <p:cNvSpPr>
+            <a:spLocks noGrp="1" noRot="1" noChangeAspect="1"/>
+          </p:cNvSpPr>
+          <p:nvPr>
+            <p:ph type="sldImg"/>
+          </p:nvPr>
+        </p:nvSpPr>
+        <p:spPr/>
+      </p:sp>
+      <p:sp>
+        <p:nvSpPr>
+          <p:cNvPr id="3" name="Notes Placeholder 2"/>
+          <p:cNvSpPr>
+            <a:spLocks noGrp="1"/>
+          </p:cNvSpPr>
+          <p:nvPr>
+            <p:ph type="body" idx="1"/>
+          </p:nvPr>
+        </p:nvSpPr>
+        <p:spPr/>
+        <p:txBody>
+          <a:bodyPr/>
+          <a:lstStyle/>
+          <a:p>
+            <a:endParaRPr lang="en-US" dirty="0"/>
+          </a:p>
+        </p:txBody>
+      </p:sp>
+      <p:sp>
+        <p:nvSpPr>
+          <p:cNvPr id="4" name="Slide Number Placeholder 3"/>
+          <p:cNvSpPr>
+            <a:spLocks noGrp="1"/>
+          </p:cNvSpPr>
+          <p:nvPr>
+            <p:ph type="sldNum" sz="quarter" idx="5"/>
+          </p:nvPr>
+        </p:nvSpPr>
+        <p:spPr/>
+        <p:txBody>
+          <a:bodyPr/>
+          <a:lstStyle/>
+          <a:p>
+            <a:fld id="{D2D22BCB-3FB0-4AD6-9692-BE008A8F6B96}" type="slidenum">
+              <a:rPr lang="en-US" smtClean="0"/>
+              <a:t>19</a:t>
+            </a:fld>
+            <a:endParaRPr lang="en-US"/>
+          </a:p>
+        </p:txBody>
+      </p:sp>
+    </p:spTree>
+    <p:extLst>
+      <p:ext uri="{BB962C8B-B14F-4D97-AF65-F5344CB8AC3E}">
+        <p14:creationId xmlns:p14="http://schemas.microsoft.com/office/powerpoint/2010/main" val="1137257507"/>
       </p:ext>
     </p:extLst>
   </p:cSld>
@@ -6423,103 +6763,6 @@
           </a:p>
         </p:txBody>
       </p:sp>
-      <mc:AlternateContent xmlns:mc="http://schemas.openxmlformats.org/markup-compatibility/2006">
-        <mc:Choice xmlns:pslz="http://schemas.microsoft.com/office/powerpoint/2016/slidezoom" Requires="pslz">
-          <p:graphicFrame>
-            <p:nvGraphicFramePr>
-              <p:cNvPr id="5" name="Slide Zoom 4">
-                <a:extLst>
-                  <a:ext uri="{FF2B5EF4-FFF2-40B4-BE49-F238E27FC236}">
-                    <a16:creationId xmlns:a16="http://schemas.microsoft.com/office/drawing/2014/main" id="{0182542D-C00A-4849-8112-3BB9ADE98E31}"/>
-                  </a:ext>
-                </a:extLst>
-              </p:cNvPr>
-              <p:cNvGraphicFramePr>
-                <a:graphicFrameLocks noChangeAspect="1"/>
-              </p:cNvGraphicFramePr>
-              <p:nvPr>
-                <p:extLst>
-                  <p:ext uri="{D42A27DB-BD31-4B8C-83A1-F6EECF244321}">
-                    <p14:modId xmlns:p14="http://schemas.microsoft.com/office/powerpoint/2010/main" val="1447769578"/>
-                  </p:ext>
-                </p:extLst>
-              </p:nvPr>
-            </p:nvGraphicFramePr>
-            <p:xfrm>
-              <a:off x="1342417" y="1281824"/>
-              <a:ext cx="3048000" cy="1714500"/>
-            </p:xfrm>
-            <a:graphic>
-              <a:graphicData uri="http://schemas.microsoft.com/office/powerpoint/2016/slidezoom">
-                <pslz:sldZm>
-                  <pslz:sldZmObj sldId="329" cId="774039450">
-                    <pslz:zmPr id="{A3BC8B57-13F8-41BD-9AB7-49DBCA6D610D}" returnToParent="0" transitionDur="1000">
-                      <p166:blipFill xmlns:p166="http://schemas.microsoft.com/office/powerpoint/2016/6/main">
-                        <a:blip r:embed="rId5"/>
-                        <a:stretch>
-                          <a:fillRect/>
-                        </a:stretch>
-                      </p166:blipFill>
-                      <p166:spPr xmlns:p166="http://schemas.microsoft.com/office/powerpoint/2016/6/main">
-                        <a:xfrm>
-                          <a:off x="0" y="0"/>
-                          <a:ext cx="3048000" cy="1714500"/>
-                        </a:xfrm>
-                        <a:prstGeom prst="rect">
-                          <a:avLst/>
-                        </a:prstGeom>
-                        <a:ln w="3175">
-                          <a:solidFill>
-                            <a:prstClr val="ltGray"/>
-                          </a:solidFill>
-                        </a:ln>
-                      </p166:spPr>
-                    </pslz:zmPr>
-                  </pslz:sldZmObj>
-                </pslz:sldZm>
-              </a:graphicData>
-            </a:graphic>
-          </p:graphicFrame>
-        </mc:Choice>
-        <mc:Fallback>
-          <p:pic>
-            <p:nvPicPr>
-              <p:cNvPr id="5" name="Slide Zoom 4">
-                <a:hlinkClick r:id="rId6" action="ppaction://hlinksldjump"/>
-                <a:extLst>
-                  <a:ext uri="{FF2B5EF4-FFF2-40B4-BE49-F238E27FC236}">
-                    <a16:creationId xmlns:a16="http://schemas.microsoft.com/office/drawing/2014/main" id="{0182542D-C00A-4849-8112-3BB9ADE98E31}"/>
-                  </a:ext>
-                </a:extLst>
-              </p:cNvPr>
-              <p:cNvPicPr>
-                <a:picLocks noGrp="1" noRot="1" noChangeAspect="1" noMove="1" noResize="1" noEditPoints="1" noAdjustHandles="1" noChangeArrowheads="1" noChangeShapeType="1"/>
-              </p:cNvPicPr>
-              <p:nvPr/>
-            </p:nvPicPr>
-            <p:blipFill>
-              <a:blip r:embed="rId5"/>
-              <a:stretch>
-                <a:fillRect/>
-              </a:stretch>
-            </p:blipFill>
-            <p:spPr>
-              <a:xfrm>
-                <a:off x="1342417" y="1281824"/>
-                <a:ext cx="3048000" cy="1714500"/>
-              </a:xfrm>
-              <a:prstGeom prst="rect">
-                <a:avLst/>
-              </a:prstGeom>
-              <a:ln w="3175">
-                <a:solidFill>
-                  <a:prstClr val="ltGray"/>
-                </a:solidFill>
-              </a:ln>
-            </p:spPr>
-          </p:pic>
-        </mc:Fallback>
-      </mc:AlternateContent>
     </p:spTree>
     <p:extLst>
       <p:ext uri="{BB962C8B-B14F-4D97-AF65-F5344CB8AC3E}">
@@ -6886,97 +7129,6 @@
           </a:p>
         </p:txBody>
       </p:sp>
-      <mc:AlternateContent xmlns:mc="http://schemas.openxmlformats.org/markup-compatibility/2006">
-        <mc:Choice xmlns:pslz="http://schemas.microsoft.com/office/powerpoint/2016/slidezoom" Requires="pslz">
-          <p:graphicFrame>
-            <p:nvGraphicFramePr>
-              <p:cNvPr id="5" name="Slide Zoom 4">
-                <a:extLst>
-                  <a:ext uri="{FF2B5EF4-FFF2-40B4-BE49-F238E27FC236}">
-                    <a16:creationId xmlns:a16="http://schemas.microsoft.com/office/drawing/2014/main" id="{0182542D-C00A-4849-8112-3BB9ADE98E31}"/>
-                  </a:ext>
-                </a:extLst>
-              </p:cNvPr>
-              <p:cNvGraphicFramePr>
-                <a:graphicFrameLocks noChangeAspect="1"/>
-              </p:cNvGraphicFramePr>
-              <p:nvPr/>
-            </p:nvGraphicFramePr>
-            <p:xfrm>
-              <a:off x="1342417" y="1281824"/>
-              <a:ext cx="3048000" cy="1714500"/>
-            </p:xfrm>
-            <a:graphic>
-              <a:graphicData uri="http://schemas.microsoft.com/office/powerpoint/2016/slidezoom">
-                <pslz:sldZm>
-                  <pslz:sldZmObj sldId="329" cId="774039450">
-                    <pslz:zmPr id="{A3BC8B57-13F8-41BD-9AB7-49DBCA6D610D}" returnToParent="0" transitionDur="1000">
-                      <p166:blipFill xmlns:p166="http://schemas.microsoft.com/office/powerpoint/2016/6/main">
-                        <a:blip r:embed="rId5"/>
-                        <a:stretch>
-                          <a:fillRect/>
-                        </a:stretch>
-                      </p166:blipFill>
-                      <p166:spPr xmlns:p166="http://schemas.microsoft.com/office/powerpoint/2016/6/main">
-                        <a:xfrm>
-                          <a:off x="0" y="0"/>
-                          <a:ext cx="3048000" cy="1714500"/>
-                        </a:xfrm>
-                        <a:prstGeom prst="rect">
-                          <a:avLst/>
-                        </a:prstGeom>
-                        <a:ln w="3175">
-                          <a:solidFill>
-                            <a:prstClr val="ltGray"/>
-                          </a:solidFill>
-                        </a:ln>
-                      </p166:spPr>
-                    </pslz:zmPr>
-                  </pslz:sldZmObj>
-                </pslz:sldZm>
-              </a:graphicData>
-            </a:graphic>
-          </p:graphicFrame>
-        </mc:Choice>
-        <mc:Fallback>
-          <p:pic>
-            <p:nvPicPr>
-              <p:cNvPr id="5" name="Slide Zoom 4">
-                <a:hlinkClick r:id="rId6" action="ppaction://hlinksldjump"/>
-                <a:extLst>
-                  <a:ext uri="{FF2B5EF4-FFF2-40B4-BE49-F238E27FC236}">
-                    <a16:creationId xmlns:a16="http://schemas.microsoft.com/office/drawing/2014/main" id="{0182542D-C00A-4849-8112-3BB9ADE98E31}"/>
-                  </a:ext>
-                </a:extLst>
-              </p:cNvPr>
-              <p:cNvPicPr>
-                <a:picLocks noGrp="1" noRot="1" noChangeAspect="1" noMove="1" noResize="1" noEditPoints="1" noAdjustHandles="1" noChangeArrowheads="1" noChangeShapeType="1"/>
-              </p:cNvPicPr>
-              <p:nvPr/>
-            </p:nvPicPr>
-            <p:blipFill>
-              <a:blip r:embed="rId5"/>
-              <a:stretch>
-                <a:fillRect/>
-              </a:stretch>
-            </p:blipFill>
-            <p:spPr>
-              <a:xfrm>
-                <a:off x="1342417" y="1281824"/>
-                <a:ext cx="3048000" cy="1714500"/>
-              </a:xfrm>
-              <a:prstGeom prst="rect">
-                <a:avLst/>
-              </a:prstGeom>
-              <a:ln w="3175">
-                <a:solidFill>
-                  <a:prstClr val="ltGray"/>
-                </a:solidFill>
-              </a:ln>
-            </p:spPr>
-          </p:pic>
-        </mc:Fallback>
-      </mc:AlternateContent>
     </p:spTree>
     <p:extLst>
       <p:ext uri="{BB962C8B-B14F-4D97-AF65-F5344CB8AC3E}">
@@ -7029,14 +7181,116 @@
             <p:ph idx="1"/>
           </p:nvPr>
         </p:nvSpPr>
-        <p:spPr/>
+        <p:spPr>
+          <a:xfrm>
+            <a:off x="838200" y="2308699"/>
+            <a:ext cx="10515600" cy="3863502"/>
+          </a:xfrm>
+        </p:spPr>
         <p:txBody>
           <a:bodyPr>
             <a:normAutofit/>
           </a:bodyPr>
           <a:lstStyle/>
           <a:p>
+            <a:r>
+              <a:rPr lang="en-US" dirty="0"/>
+              <a:t>Three step process:</a:t>
+            </a:r>
+          </a:p>
+          <a:p>
+            <a:pPr lvl="1"/>
+            <a:r>
+              <a:rPr lang="en-US" dirty="0"/>
+              <a:t>Collect the top songs for different countries.</a:t>
+            </a:r>
+          </a:p>
+          <a:p>
+            <a:pPr lvl="2"/>
+            <a:r>
+              <a:rPr lang="en-US" dirty="0"/>
+              <a:t>Made a list of countries and dates to search for their top 200 songs. Chose to select one day a month for 66 countries that were available in </a:t>
+            </a:r>
+            <a:r>
+              <a:rPr lang="en-US" dirty="0" err="1"/>
+              <a:t>SpotifyCharts</a:t>
+            </a:r>
             <a:endParaRPr lang="en-US" dirty="0"/>
+          </a:p>
+          <a:p>
+            <a:pPr lvl="2"/>
+            <a:r>
+              <a:rPr lang="en-US" dirty="0"/>
+              <a:t>The </a:t>
+            </a:r>
+            <a:r>
+              <a:rPr lang="en-US" dirty="0" err="1"/>
+              <a:t>Api</a:t>
+            </a:r>
+            <a:r>
+              <a:rPr lang="en-US" dirty="0"/>
+              <a:t> does not allow for this, so we used some one else’s code. Installed a the code into PythonData</a:t>
+            </a:r>
+          </a:p>
+          <a:p>
+            <a:pPr lvl="2"/>
+            <a:r>
+              <a:rPr lang="en-US" dirty="0"/>
+              <a:t>Saved the results into a </a:t>
+            </a:r>
+            <a:r>
+              <a:rPr lang="en-US" dirty="0" err="1"/>
+              <a:t>cvs</a:t>
+            </a:r>
+            <a:r>
+              <a:rPr lang="en-US" dirty="0"/>
+              <a:t> file</a:t>
+            </a:r>
+          </a:p>
+          <a:p>
+            <a:pPr lvl="1"/>
+            <a:r>
+              <a:rPr lang="en-US" dirty="0"/>
+              <a:t>Classify each songs happiness, energy, danceability and </a:t>
+            </a:r>
+            <a:r>
+              <a:rPr lang="en-US" dirty="0" err="1"/>
+              <a:t>speechiness</a:t>
+            </a:r>
+            <a:r>
+              <a:rPr lang="en-US" dirty="0"/>
+              <a:t>.</a:t>
+            </a:r>
+          </a:p>
+          <a:p>
+            <a:pPr lvl="2"/>
+            <a:r>
+              <a:rPr lang="en-US" dirty="0"/>
+              <a:t>Used the </a:t>
+            </a:r>
+            <a:r>
+              <a:rPr lang="en-US" dirty="0" err="1"/>
+              <a:t>spotify</a:t>
+            </a:r>
+            <a:r>
+              <a:rPr lang="en-US" dirty="0"/>
+              <a:t> API for python called </a:t>
+            </a:r>
+            <a:r>
+              <a:rPr lang="en-US" dirty="0" err="1"/>
+              <a:t>Spotipy</a:t>
+            </a:r>
+            <a:r>
+              <a:rPr lang="en-US" dirty="0"/>
+              <a:t>. Classified each song collected.</a:t>
+            </a:r>
+          </a:p>
+          <a:p>
+            <a:pPr lvl="1"/>
+            <a:r>
+              <a:rPr lang="en-US" dirty="0"/>
+              <a:t>Compare against the World Happiness Index.</a:t>
+            </a:r>
           </a:p>
         </p:txBody>
       </p:sp>
@@ -7192,43 +7446,7 @@
                   </a:outerShdw>
                 </a:effectLst>
               </a:rPr>
-              <a:t> |   </a:t>
-            </a:r>
-            <a:r>
-              <a:rPr lang="en-US" dirty="0" err="1">
-                <a:ln w="0"/>
-                <a:solidFill>
-                  <a:schemeClr val="bg1">
-                    <a:lumMod val="65000"/>
-                  </a:schemeClr>
-                </a:solidFill>
-                <a:effectLst>
-                  <a:outerShdw blurRad="38100" dist="25400" dir="5400000" algn="ctr" rotWithShape="0">
-                    <a:srgbClr val="6E747A">
-                      <a:alpha val="43000"/>
-                    </a:srgbClr>
-                  </a:outerShdw>
-                </a:effectLst>
-              </a:rPr>
-              <a:t>Discusion</a:t>
-            </a:r>
-            <a:r>
-              <a:rPr lang="en-US" dirty="0">
-                <a:ln w="0"/>
-                <a:solidFill>
-                  <a:schemeClr val="bg1">
-                    <a:lumMod val="65000"/>
-                  </a:schemeClr>
-                </a:solidFill>
-                <a:effectLst>
-                  <a:outerShdw blurRad="38100" dist="25400" dir="5400000" algn="ctr" rotWithShape="0">
-                    <a:srgbClr val="6E747A">
-                      <a:alpha val="43000"/>
-                    </a:srgbClr>
-                  </a:outerShdw>
-                </a:effectLst>
-              </a:rPr>
-              <a:t>  |  </a:t>
+              <a:t> |   Discussion  |  </a:t>
             </a:r>
           </a:p>
         </p:txBody>
@@ -7343,97 +7561,6 @@
           </a:p>
         </p:txBody>
       </p:sp>
-      <mc:AlternateContent xmlns:mc="http://schemas.openxmlformats.org/markup-compatibility/2006">
-        <mc:Choice xmlns:pslz="http://schemas.microsoft.com/office/powerpoint/2016/slidezoom" Requires="pslz">
-          <p:graphicFrame>
-            <p:nvGraphicFramePr>
-              <p:cNvPr id="5" name="Slide Zoom 4">
-                <a:extLst>
-                  <a:ext uri="{FF2B5EF4-FFF2-40B4-BE49-F238E27FC236}">
-                    <a16:creationId xmlns:a16="http://schemas.microsoft.com/office/drawing/2014/main" id="{0182542D-C00A-4849-8112-3BB9ADE98E31}"/>
-                  </a:ext>
-                </a:extLst>
-              </p:cNvPr>
-              <p:cNvGraphicFramePr>
-                <a:graphicFrameLocks noChangeAspect="1"/>
-              </p:cNvGraphicFramePr>
-              <p:nvPr/>
-            </p:nvGraphicFramePr>
-            <p:xfrm>
-              <a:off x="1342417" y="1281824"/>
-              <a:ext cx="3048000" cy="1714500"/>
-            </p:xfrm>
-            <a:graphic>
-              <a:graphicData uri="http://schemas.microsoft.com/office/powerpoint/2016/slidezoom">
-                <pslz:sldZm>
-                  <pslz:sldZmObj sldId="329" cId="774039450">
-                    <pslz:zmPr id="{A3BC8B57-13F8-41BD-9AB7-49DBCA6D610D}" returnToParent="0" transitionDur="1000">
-                      <p166:blipFill xmlns:p166="http://schemas.microsoft.com/office/powerpoint/2016/6/main">
-                        <a:blip r:embed="rId5"/>
-                        <a:stretch>
-                          <a:fillRect/>
-                        </a:stretch>
-                      </p166:blipFill>
-                      <p166:spPr xmlns:p166="http://schemas.microsoft.com/office/powerpoint/2016/6/main">
-                        <a:xfrm>
-                          <a:off x="0" y="0"/>
-                          <a:ext cx="3048000" cy="1714500"/>
-                        </a:xfrm>
-                        <a:prstGeom prst="rect">
-                          <a:avLst/>
-                        </a:prstGeom>
-                        <a:ln w="3175">
-                          <a:solidFill>
-                            <a:prstClr val="ltGray"/>
-                          </a:solidFill>
-                        </a:ln>
-                      </p166:spPr>
-                    </pslz:zmPr>
-                  </pslz:sldZmObj>
-                </pslz:sldZm>
-              </a:graphicData>
-            </a:graphic>
-          </p:graphicFrame>
-        </mc:Choice>
-        <mc:Fallback>
-          <p:pic>
-            <p:nvPicPr>
-              <p:cNvPr id="5" name="Slide Zoom 4">
-                <a:hlinkClick r:id="rId6" action="ppaction://hlinksldjump"/>
-                <a:extLst>
-                  <a:ext uri="{FF2B5EF4-FFF2-40B4-BE49-F238E27FC236}">
-                    <a16:creationId xmlns:a16="http://schemas.microsoft.com/office/drawing/2014/main" id="{0182542D-C00A-4849-8112-3BB9ADE98E31}"/>
-                  </a:ext>
-                </a:extLst>
-              </p:cNvPr>
-              <p:cNvPicPr>
-                <a:picLocks noGrp="1" noRot="1" noChangeAspect="1" noMove="1" noResize="1" noEditPoints="1" noAdjustHandles="1" noChangeArrowheads="1" noChangeShapeType="1"/>
-              </p:cNvPicPr>
-              <p:nvPr/>
-            </p:nvPicPr>
-            <p:blipFill>
-              <a:blip r:embed="rId5"/>
-              <a:stretch>
-                <a:fillRect/>
-              </a:stretch>
-            </p:blipFill>
-            <p:spPr>
-              <a:xfrm>
-                <a:off x="1342417" y="1281824"/>
-                <a:ext cx="3048000" cy="1714500"/>
-              </a:xfrm>
-              <a:prstGeom prst="rect">
-                <a:avLst/>
-              </a:prstGeom>
-              <a:ln w="3175">
-                <a:solidFill>
-                  <a:prstClr val="ltGray"/>
-                </a:solidFill>
-              </a:ln>
-            </p:spPr>
-          </p:pic>
-        </mc:Fallback>
-      </mc:AlternateContent>
     </p:spTree>
     <p:extLst>
       <p:ext uri="{BB962C8B-B14F-4D97-AF65-F5344CB8AC3E}">
@@ -7476,53 +7603,372 @@
           <a:chExt cx="0" cy="0"/>
         </a:xfrm>
       </p:grpSpPr>
-      <p:sp>
-        <p:nvSpPr>
-          <p:cNvPr id="4" name="Title 1"/>
-          <p:cNvSpPr txBox="1">
-            <a:spLocks/>
-          </p:cNvSpPr>
-          <p:nvPr/>
-        </p:nvSpPr>
+      <p:pic>
+        <p:nvPicPr>
+          <p:cNvPr id="14" name="Content Placeholder 13" descr="A close up of a logo&#10;&#10;Description automatically generated">
+            <a:extLst>
+              <a:ext uri="{FF2B5EF4-FFF2-40B4-BE49-F238E27FC236}">
+                <a16:creationId xmlns:a16="http://schemas.microsoft.com/office/drawing/2014/main" id="{A7B9B3C6-3D55-4E54-85F0-19EBE620968D}"/>
+              </a:ext>
+            </a:extLst>
+          </p:cNvPr>
+          <p:cNvPicPr>
+            <a:picLocks noGrp="1" noChangeAspect="1"/>
+          </p:cNvPicPr>
+          <p:nvPr>
+            <p:ph sz="quarter" idx="4"/>
+          </p:nvPr>
+        </p:nvPicPr>
+        <p:blipFill>
+          <a:blip r:embed="rId3">
+            <a:extLst>
+              <a:ext uri="{28A0092B-C50C-407E-A947-70E740481C1C}">
+                <a14:useLocalDpi xmlns:a14="http://schemas.microsoft.com/office/drawing/2010/main" val="0"/>
+              </a:ext>
+            </a:extLst>
+          </a:blip>
+          <a:stretch>
+            <a:fillRect/>
+          </a:stretch>
+        </p:blipFill>
         <p:spPr>
           <a:xfrm>
-            <a:off x="1845201" y="3113654"/>
-            <a:ext cx="7607300" cy="1325563"/>
+            <a:off x="6189663" y="2702719"/>
+            <a:ext cx="5157787" cy="3438524"/>
+          </a:xfrm>
+        </p:spPr>
+      </p:pic>
+      <p:sp>
+        <p:nvSpPr>
+          <p:cNvPr id="6" name="Text Placeholder 5">
+            <a:extLst>
+              <a:ext uri="{FF2B5EF4-FFF2-40B4-BE49-F238E27FC236}">
+                <a16:creationId xmlns:a16="http://schemas.microsoft.com/office/drawing/2014/main" id="{02EEDBFE-8D64-4C23-97FA-B9353088CE32}"/>
+              </a:ext>
+            </a:extLst>
+          </p:cNvPr>
+          <p:cNvSpPr>
+            <a:spLocks noGrp="1"/>
+          </p:cNvSpPr>
+          <p:nvPr>
+            <p:ph type="body" sz="quarter" idx="3"/>
+          </p:nvPr>
+        </p:nvSpPr>
+        <p:spPr>
+          <a:xfrm>
+            <a:off x="6189663" y="2295729"/>
+            <a:ext cx="5157787" cy="376136"/>
+          </a:xfrm>
+        </p:spPr>
+        <p:txBody>
+          <a:bodyPr>
+            <a:normAutofit fontScale="92500" lnSpcReduction="10000"/>
+          </a:bodyPr>
+          <a:lstStyle/>
+          <a:p>
+            <a:r>
+              <a:rPr lang="en-US" b="0" dirty="0"/>
+              <a:t>R </a:t>
+            </a:r>
+            <a:r>
+              <a:rPr lang="en-US" b="0" dirty="0" err="1"/>
+              <a:t>sqr</a:t>
+            </a:r>
+            <a:r>
+              <a:rPr lang="en-US" b="0" dirty="0"/>
+              <a:t>= -0.07 P-Value= 0.59</a:t>
+            </a:r>
+            <a:endParaRPr lang="en-US" dirty="0"/>
+          </a:p>
+        </p:txBody>
+      </p:sp>
+      <p:pic>
+        <p:nvPicPr>
+          <p:cNvPr id="11" name="Content Placeholder 10" descr="A close up of a logo&#10;&#10;Description automatically generated">
+            <a:extLst>
+              <a:ext uri="{FF2B5EF4-FFF2-40B4-BE49-F238E27FC236}">
+                <a16:creationId xmlns:a16="http://schemas.microsoft.com/office/drawing/2014/main" id="{F653853E-CC28-44B3-9D5C-C43C533C6665}"/>
+              </a:ext>
+            </a:extLst>
+          </p:cNvPr>
+          <p:cNvPicPr>
+            <a:picLocks noGrp="1" noChangeAspect="1"/>
+          </p:cNvPicPr>
+          <p:nvPr>
+            <p:ph sz="half" idx="2"/>
+          </p:nvPr>
+        </p:nvPicPr>
+        <p:blipFill>
+          <a:blip r:embed="rId4">
+            <a:extLst>
+              <a:ext uri="{28A0092B-C50C-407E-A947-70E740481C1C}">
+                <a14:useLocalDpi xmlns:a14="http://schemas.microsoft.com/office/drawing/2010/main" val="0"/>
+              </a:ext>
+            </a:extLst>
+          </a:blip>
+          <a:stretch>
+            <a:fillRect/>
+          </a:stretch>
+        </p:blipFill>
+        <p:spPr>
+          <a:xfrm>
+            <a:off x="831850" y="2671865"/>
+            <a:ext cx="5170488" cy="3618442"/>
+          </a:xfrm>
+        </p:spPr>
+      </p:pic>
+      <p:sp>
+        <p:nvSpPr>
+          <p:cNvPr id="4" name="Text Placeholder 3">
+            <a:extLst>
+              <a:ext uri="{FF2B5EF4-FFF2-40B4-BE49-F238E27FC236}">
+                <a16:creationId xmlns:a16="http://schemas.microsoft.com/office/drawing/2014/main" id="{F8B037C4-63A4-4DF6-AAAD-6CC78B6D4231}"/>
+              </a:ext>
+            </a:extLst>
+          </p:cNvPr>
+          <p:cNvSpPr>
+            <a:spLocks noGrp="1"/>
+          </p:cNvSpPr>
+          <p:nvPr>
+            <p:ph type="body" idx="1"/>
+          </p:nvPr>
+        </p:nvSpPr>
+        <p:spPr>
+          <a:xfrm>
+            <a:off x="831850" y="2295729"/>
+            <a:ext cx="5156200" cy="376136"/>
+          </a:xfrm>
+        </p:spPr>
+        <p:txBody>
+          <a:bodyPr>
+            <a:normAutofit fontScale="92500" lnSpcReduction="10000"/>
+          </a:bodyPr>
+          <a:lstStyle/>
+          <a:p>
+            <a:r>
+              <a:rPr lang="en-US" b="0" dirty="0"/>
+              <a:t>R </a:t>
+            </a:r>
+            <a:r>
+              <a:rPr lang="en-US" b="0" dirty="0" err="1"/>
+              <a:t>sqr</a:t>
+            </a:r>
+            <a:r>
+              <a:rPr lang="en-US" b="0" dirty="0"/>
+              <a:t>= -0.29 P-Value= 0.034</a:t>
+            </a:r>
+            <a:endParaRPr lang="en-US" dirty="0"/>
+          </a:p>
+        </p:txBody>
+      </p:sp>
+      <p:sp>
+        <p:nvSpPr>
+          <p:cNvPr id="2" name="Title 1"/>
+          <p:cNvSpPr>
+            <a:spLocks noGrp="1"/>
+          </p:cNvSpPr>
+          <p:nvPr>
+            <p:ph type="title"/>
+          </p:nvPr>
+        </p:nvSpPr>
+        <p:spPr>
+          <a:xfrm>
+            <a:off x="831850" y="1692920"/>
+            <a:ext cx="10515600" cy="492561"/>
+          </a:xfrm>
+        </p:spPr>
+        <p:txBody>
+          <a:bodyPr>
+            <a:normAutofit fontScale="90000"/>
+          </a:bodyPr>
+          <a:lstStyle/>
+          <a:p>
+            <a:r>
+              <a:rPr lang="en-US" dirty="0"/>
+              <a:t>Exploration &amp; Analysis – Musical expression</a:t>
+            </a:r>
+          </a:p>
+        </p:txBody>
+      </p:sp>
+      <p:sp>
+        <p:nvSpPr>
+          <p:cNvPr id="10" name="Round Diagonal Corner Rectangle 9"/>
+          <p:cNvSpPr/>
+          <p:nvPr/>
+        </p:nvSpPr>
+        <p:spPr>
+          <a:xfrm>
+            <a:off x="1076885" y="6426201"/>
+            <a:ext cx="8933627" cy="364208"/>
+          </a:xfrm>
+          <a:prstGeom prst="round2DiagRect">
+            <a:avLst/>
+          </a:prstGeom>
+          <a:solidFill>
+            <a:srgbClr val="9E2936"/>
+          </a:solidFill>
+        </p:spPr>
+        <p:style>
+          <a:lnRef idx="1">
+            <a:schemeClr val="accent2"/>
+          </a:lnRef>
+          <a:fillRef idx="2">
+            <a:schemeClr val="accent2"/>
+          </a:fillRef>
+          <a:effectRef idx="1">
+            <a:schemeClr val="accent2"/>
+          </a:effectRef>
+          <a:fontRef idx="minor">
+            <a:schemeClr val="dk1"/>
+          </a:fontRef>
+        </p:style>
+        <p:txBody>
+          <a:bodyPr rtlCol="0" anchor="ctr"/>
+          <a:lstStyle/>
+          <a:p>
+            <a:pPr algn="ctr"/>
+            <a:r>
+              <a:rPr lang="es-CO" dirty="0" err="1">
+                <a:solidFill>
+                  <a:schemeClr val="bg1">
+                    <a:lumMod val="65000"/>
+                  </a:schemeClr>
+                </a:solidFill>
+              </a:rPr>
+              <a:t>Hypothesis</a:t>
+            </a:r>
+            <a:r>
+              <a:rPr lang="es-CO" dirty="0">
+                <a:solidFill>
+                  <a:schemeClr val="bg1">
+                    <a:lumMod val="65000"/>
+                  </a:schemeClr>
+                </a:solidFill>
+              </a:rPr>
+              <a:t> </a:t>
+            </a:r>
+            <a:r>
+              <a:rPr lang="en-US" dirty="0">
+                <a:ln w="0"/>
+                <a:solidFill>
+                  <a:schemeClr val="bg1"/>
+                </a:solidFill>
+                <a:effectLst>
+                  <a:outerShdw blurRad="38100" dist="25400" dir="5400000" algn="ctr" rotWithShape="0">
+                    <a:srgbClr val="6E747A">
+                      <a:alpha val="43000"/>
+                    </a:srgbClr>
+                  </a:outerShdw>
+                </a:effectLst>
+              </a:rPr>
+              <a:t> </a:t>
+            </a:r>
+            <a:r>
+              <a:rPr lang="en-US" dirty="0">
+                <a:ln w="0"/>
+                <a:solidFill>
+                  <a:schemeClr val="bg1">
+                    <a:lumMod val="65000"/>
+                  </a:schemeClr>
+                </a:solidFill>
+                <a:effectLst>
+                  <a:outerShdw blurRad="38100" dist="25400" dir="5400000" algn="ctr" rotWithShape="0">
+                    <a:srgbClr val="6E747A">
+                      <a:alpha val="43000"/>
+                    </a:srgbClr>
+                  </a:outerShdw>
+                </a:effectLst>
+              </a:rPr>
+              <a:t>|   Data |   </a:t>
+            </a:r>
+            <a:r>
+              <a:rPr lang="en-US" dirty="0">
+                <a:ln w="0"/>
+                <a:solidFill>
+                  <a:schemeClr val="bg1"/>
+                </a:solidFill>
+                <a:effectLst>
+                  <a:outerShdw blurRad="38100" dist="25400" dir="5400000" algn="ctr" rotWithShape="0">
+                    <a:srgbClr val="6E747A">
+                      <a:alpha val="43000"/>
+                    </a:srgbClr>
+                  </a:outerShdw>
+                </a:effectLst>
+              </a:rPr>
+              <a:t>Exploration &amp; analysis</a:t>
+            </a:r>
+            <a:r>
+              <a:rPr lang="en-US" dirty="0">
+                <a:ln w="0"/>
+                <a:solidFill>
+                  <a:schemeClr val="bg1">
+                    <a:lumMod val="65000"/>
+                  </a:schemeClr>
+                </a:solidFill>
+                <a:effectLst>
+                  <a:outerShdw blurRad="38100" dist="25400" dir="5400000" algn="ctr" rotWithShape="0">
+                    <a:srgbClr val="6E747A">
+                      <a:alpha val="43000"/>
+                    </a:srgbClr>
+                  </a:outerShdw>
+                </a:effectLst>
+              </a:rPr>
+              <a:t> |   Discussion  |  </a:t>
+            </a:r>
+          </a:p>
+        </p:txBody>
+      </p:sp>
+      <p:pic>
+        <p:nvPicPr>
+          <p:cNvPr id="12" name="Picture 11"/>
+          <p:cNvPicPr>
+            <a:picLocks noChangeAspect="1"/>
+          </p:cNvPicPr>
+          <p:nvPr/>
+        </p:nvPicPr>
+        <p:blipFill>
+          <a:blip r:embed="rId5">
+            <a:extLst>
+              <a:ext uri="{BEBA8EAE-BF5A-486C-A8C5-ECC9F3942E4B}">
+                <a14:imgProps xmlns:a14="http://schemas.microsoft.com/office/drawing/2010/main">
+                  <a14:imgLayer r:embed="rId6">
+                    <a14:imgEffect>
+                      <a14:saturation sat="0"/>
+                    </a14:imgEffect>
+                  </a14:imgLayer>
+                </a14:imgProps>
+              </a:ext>
+              <a:ext uri="{28A0092B-C50C-407E-A947-70E740481C1C}">
+                <a14:useLocalDpi xmlns:a14="http://schemas.microsoft.com/office/drawing/2010/main" val="0"/>
+              </a:ext>
+            </a:extLst>
+          </a:blip>
+          <a:stretch>
+            <a:fillRect/>
+          </a:stretch>
+        </p:blipFill>
+        <p:spPr>
+          <a:xfrm>
+            <a:off x="4584700" y="31442"/>
+            <a:ext cx="7607300" cy="1397965"/>
           </a:xfrm>
           <a:prstGeom prst="rect">
             <a:avLst/>
           </a:prstGeom>
+          <a:effectLst>
+            <a:softEdge rad="50800"/>
+          </a:effectLst>
         </p:spPr>
-        <p:txBody>
-          <a:bodyPr/>
-          <a:lstStyle>
-            <a:lvl1pPr algn="l" defTabSz="914400" rtl="0" eaLnBrk="1" latinLnBrk="0" hangingPunct="1">
-              <a:spcBef>
-                <a:spcPct val="0"/>
-              </a:spcBef>
-              <a:buNone/>
-              <a:defRPr sz="4400" kern="1200">
-                <a:solidFill>
-                  <a:schemeClr val="accent2"/>
-                </a:solidFill>
-                <a:latin typeface="+mj-lt"/>
-                <a:ea typeface="+mj-ea"/>
-                <a:cs typeface="+mj-cs"/>
-              </a:defRPr>
-            </a:lvl1pPr>
-          </a:lstStyle>
-          <a:p>
-            <a:pPr algn="ctr"/>
-            <a:r>
-              <a:rPr lang="en-US" sz="7200" dirty="0"/>
-              <a:t>Discussion</a:t>
-            </a:r>
-          </a:p>
-        </p:txBody>
-      </p:sp>
-      <p:sp>
-        <p:nvSpPr>
-          <p:cNvPr id="5" name="Title 1"/>
+      </p:pic>
+      <p:sp>
+        <p:nvSpPr>
+          <p:cNvPr id="8" name="Title 1">
+            <a:extLst>
+              <a:ext uri="{FF2B5EF4-FFF2-40B4-BE49-F238E27FC236}">
+                <a16:creationId xmlns:a16="http://schemas.microsoft.com/office/drawing/2014/main" id="{984A60E7-48A8-4B8E-AD9F-0A37136405B5}"/>
+              </a:ext>
+            </a:extLst>
+          </p:cNvPr>
           <p:cNvSpPr txBox="1">
             <a:spLocks/>
           </p:cNvSpPr>
@@ -7530,8 +7976,8 @@
         </p:nvSpPr>
         <p:spPr>
           <a:xfrm>
-            <a:off x="552450" y="142875"/>
-            <a:ext cx="3682324" cy="1179512"/>
+            <a:off x="0" y="142875"/>
+            <a:ext cx="5076967" cy="1179512"/>
           </a:xfrm>
           <a:prstGeom prst="rect">
             <a:avLst/>
@@ -7559,16 +8005,1287 @@
           </a:lstStyle>
           <a:p>
             <a:r>
-              <a:rPr lang="es-CO" sz="2800" dirty="0"/>
-              <a:t>Vida en Expatriación</a:t>
-            </a:r>
-            <a:endParaRPr lang="en-US" sz="2800" dirty="0"/>
-          </a:p>
-          <a:p>
+              <a:rPr lang="es-CO" sz="3200" dirty="0" err="1"/>
+              <a:t>World</a:t>
+            </a:r>
+            <a:r>
+              <a:rPr lang="es-CO" sz="3200" dirty="0"/>
+              <a:t> </a:t>
+            </a:r>
+            <a:r>
+              <a:rPr lang="es-CO" sz="3200" dirty="0" err="1"/>
+              <a:t>Happines</a:t>
+            </a:r>
+            <a:r>
+              <a:rPr lang="es-CO" sz="3200" dirty="0"/>
+              <a:t> </a:t>
+            </a:r>
+            <a:r>
+              <a:rPr lang="es-CO" sz="3200" dirty="0" err="1"/>
+              <a:t>Analysis</a:t>
+            </a:r>
             <a:endParaRPr lang="en-US" sz="3000" dirty="0"/>
           </a:p>
         </p:txBody>
       </p:sp>
+    </p:spTree>
+    <p:extLst>
+      <p:ext uri="{BB962C8B-B14F-4D97-AF65-F5344CB8AC3E}">
+        <p14:creationId xmlns:p14="http://schemas.microsoft.com/office/powerpoint/2010/main" val="1545131517"/>
+      </p:ext>
+    </p:extLst>
+  </p:cSld>
+  <p:clrMapOvr>
+    <a:masterClrMapping/>
+  </p:clrMapOvr>
+  <mc:AlternateContent xmlns:mc="http://schemas.openxmlformats.org/markup-compatibility/2006" xmlns:p14="http://schemas.microsoft.com/office/powerpoint/2010/main">
+    <mc:Choice Requires="p14">
+      <p:transition spd="med" p14:dur="700">
+        <p:fade/>
+      </p:transition>
+    </mc:Choice>
+    <mc:Fallback xmlns="">
+      <p:transition spd="med">
+        <p:fade/>
+      </p:transition>
+    </mc:Fallback>
+  </mc:AlternateContent>
+</p:sld>
+</file>
+
+<file path=ppt/slides/slide16.xml><?xml version="1.0" encoding="utf-8"?>
+<p:sld xmlns:a="http://schemas.openxmlformats.org/drawingml/2006/main" xmlns:r="http://schemas.openxmlformats.org/officeDocument/2006/relationships" xmlns:p="http://schemas.openxmlformats.org/presentationml/2006/main">
+  <p:cSld>
+    <p:spTree>
+      <p:nvGrpSpPr>
+        <p:cNvPr id="1" name=""/>
+        <p:cNvGrpSpPr/>
+        <p:nvPr/>
+      </p:nvGrpSpPr>
+      <p:grpSpPr>
+        <a:xfrm>
+          <a:off x="0" y="0"/>
+          <a:ext cx="0" cy="0"/>
+          <a:chOff x="0" y="0"/>
+          <a:chExt cx="0" cy="0"/>
+        </a:xfrm>
+      </p:grpSpPr>
+      <p:sp>
+        <p:nvSpPr>
+          <p:cNvPr id="6" name="Text Placeholder 5">
+            <a:extLst>
+              <a:ext uri="{FF2B5EF4-FFF2-40B4-BE49-F238E27FC236}">
+                <a16:creationId xmlns:a16="http://schemas.microsoft.com/office/drawing/2014/main" id="{02EEDBFE-8D64-4C23-97FA-B9353088CE32}"/>
+              </a:ext>
+            </a:extLst>
+          </p:cNvPr>
+          <p:cNvSpPr>
+            <a:spLocks noGrp="1"/>
+          </p:cNvSpPr>
+          <p:nvPr>
+            <p:ph type="body" sz="quarter" idx="3"/>
+          </p:nvPr>
+        </p:nvSpPr>
+        <p:spPr>
+          <a:xfrm>
+            <a:off x="6189663" y="2295729"/>
+            <a:ext cx="5157787" cy="376136"/>
+          </a:xfrm>
+        </p:spPr>
+        <p:txBody>
+          <a:bodyPr>
+            <a:normAutofit fontScale="92500" lnSpcReduction="10000"/>
+          </a:bodyPr>
+          <a:lstStyle/>
+          <a:p>
+            <a:r>
+              <a:rPr lang="en-US" b="0" dirty="0"/>
+              <a:t>R </a:t>
+            </a:r>
+            <a:r>
+              <a:rPr lang="en-US" b="0" dirty="0" err="1"/>
+              <a:t>sqr</a:t>
+            </a:r>
+            <a:r>
+              <a:rPr lang="en-US" b="0" dirty="0"/>
+              <a:t>= 0.42 P-Value= 0.00183</a:t>
+            </a:r>
+            <a:endParaRPr lang="en-US" dirty="0"/>
+          </a:p>
+        </p:txBody>
+      </p:sp>
+      <p:sp>
+        <p:nvSpPr>
+          <p:cNvPr id="4" name="Text Placeholder 3">
+            <a:extLst>
+              <a:ext uri="{FF2B5EF4-FFF2-40B4-BE49-F238E27FC236}">
+                <a16:creationId xmlns:a16="http://schemas.microsoft.com/office/drawing/2014/main" id="{F8B037C4-63A4-4DF6-AAAD-6CC78B6D4231}"/>
+              </a:ext>
+            </a:extLst>
+          </p:cNvPr>
+          <p:cNvSpPr>
+            <a:spLocks noGrp="1"/>
+          </p:cNvSpPr>
+          <p:nvPr>
+            <p:ph type="body" idx="1"/>
+          </p:nvPr>
+        </p:nvSpPr>
+        <p:spPr>
+          <a:xfrm>
+            <a:off x="831850" y="2295729"/>
+            <a:ext cx="5156200" cy="376136"/>
+          </a:xfrm>
+        </p:spPr>
+        <p:txBody>
+          <a:bodyPr>
+            <a:normAutofit fontScale="92500" lnSpcReduction="10000"/>
+          </a:bodyPr>
+          <a:lstStyle/>
+          <a:p>
+            <a:r>
+              <a:rPr lang="en-US" b="0" dirty="0"/>
+              <a:t>R </a:t>
+            </a:r>
+            <a:r>
+              <a:rPr lang="en-US" b="0" dirty="0" err="1"/>
+              <a:t>sqr</a:t>
+            </a:r>
+            <a:r>
+              <a:rPr lang="en-US" b="0" dirty="0"/>
+              <a:t>= -0.21 P-Value= 0.13</a:t>
+            </a:r>
+            <a:endParaRPr lang="en-US" dirty="0"/>
+          </a:p>
+        </p:txBody>
+      </p:sp>
+      <p:sp>
+        <p:nvSpPr>
+          <p:cNvPr id="2" name="Title 1"/>
+          <p:cNvSpPr>
+            <a:spLocks noGrp="1"/>
+          </p:cNvSpPr>
+          <p:nvPr>
+            <p:ph type="title"/>
+          </p:nvPr>
+        </p:nvSpPr>
+        <p:spPr>
+          <a:xfrm>
+            <a:off x="831850" y="1692920"/>
+            <a:ext cx="10515600" cy="492561"/>
+          </a:xfrm>
+        </p:spPr>
+        <p:txBody>
+          <a:bodyPr>
+            <a:normAutofit fontScale="90000"/>
+          </a:bodyPr>
+          <a:lstStyle/>
+          <a:p>
+            <a:r>
+              <a:rPr lang="en-US" dirty="0"/>
+              <a:t>Exploration &amp; Analysis – Musical expression</a:t>
+            </a:r>
+          </a:p>
+        </p:txBody>
+      </p:sp>
+      <p:sp>
+        <p:nvSpPr>
+          <p:cNvPr id="10" name="Round Diagonal Corner Rectangle 9"/>
+          <p:cNvSpPr/>
+          <p:nvPr/>
+        </p:nvSpPr>
+        <p:spPr>
+          <a:xfrm>
+            <a:off x="1076885" y="6426201"/>
+            <a:ext cx="8933627" cy="364208"/>
+          </a:xfrm>
+          <a:prstGeom prst="round2DiagRect">
+            <a:avLst/>
+          </a:prstGeom>
+          <a:solidFill>
+            <a:srgbClr val="9E2936"/>
+          </a:solidFill>
+        </p:spPr>
+        <p:style>
+          <a:lnRef idx="1">
+            <a:schemeClr val="accent2"/>
+          </a:lnRef>
+          <a:fillRef idx="2">
+            <a:schemeClr val="accent2"/>
+          </a:fillRef>
+          <a:effectRef idx="1">
+            <a:schemeClr val="accent2"/>
+          </a:effectRef>
+          <a:fontRef idx="minor">
+            <a:schemeClr val="dk1"/>
+          </a:fontRef>
+        </p:style>
+        <p:txBody>
+          <a:bodyPr rtlCol="0" anchor="ctr"/>
+          <a:lstStyle/>
+          <a:p>
+            <a:pPr algn="ctr"/>
+            <a:r>
+              <a:rPr lang="es-CO" dirty="0" err="1">
+                <a:solidFill>
+                  <a:schemeClr val="bg1">
+                    <a:lumMod val="65000"/>
+                  </a:schemeClr>
+                </a:solidFill>
+              </a:rPr>
+              <a:t>Hypothesis</a:t>
+            </a:r>
+            <a:r>
+              <a:rPr lang="es-CO" dirty="0">
+                <a:solidFill>
+                  <a:schemeClr val="bg1">
+                    <a:lumMod val="65000"/>
+                  </a:schemeClr>
+                </a:solidFill>
+              </a:rPr>
+              <a:t> </a:t>
+            </a:r>
+            <a:r>
+              <a:rPr lang="en-US" dirty="0">
+                <a:ln w="0"/>
+                <a:solidFill>
+                  <a:schemeClr val="bg1"/>
+                </a:solidFill>
+                <a:effectLst>
+                  <a:outerShdw blurRad="38100" dist="25400" dir="5400000" algn="ctr" rotWithShape="0">
+                    <a:srgbClr val="6E747A">
+                      <a:alpha val="43000"/>
+                    </a:srgbClr>
+                  </a:outerShdw>
+                </a:effectLst>
+              </a:rPr>
+              <a:t> </a:t>
+            </a:r>
+            <a:r>
+              <a:rPr lang="en-US" dirty="0">
+                <a:ln w="0"/>
+                <a:solidFill>
+                  <a:schemeClr val="bg1">
+                    <a:lumMod val="65000"/>
+                  </a:schemeClr>
+                </a:solidFill>
+                <a:effectLst>
+                  <a:outerShdw blurRad="38100" dist="25400" dir="5400000" algn="ctr" rotWithShape="0">
+                    <a:srgbClr val="6E747A">
+                      <a:alpha val="43000"/>
+                    </a:srgbClr>
+                  </a:outerShdw>
+                </a:effectLst>
+              </a:rPr>
+              <a:t>|   Data |   </a:t>
+            </a:r>
+            <a:r>
+              <a:rPr lang="en-US" dirty="0">
+                <a:ln w="0"/>
+                <a:solidFill>
+                  <a:schemeClr val="bg1"/>
+                </a:solidFill>
+                <a:effectLst>
+                  <a:outerShdw blurRad="38100" dist="25400" dir="5400000" algn="ctr" rotWithShape="0">
+                    <a:srgbClr val="6E747A">
+                      <a:alpha val="43000"/>
+                    </a:srgbClr>
+                  </a:outerShdw>
+                </a:effectLst>
+              </a:rPr>
+              <a:t>Exploration &amp; analysis</a:t>
+            </a:r>
+            <a:r>
+              <a:rPr lang="en-US" dirty="0">
+                <a:ln w="0"/>
+                <a:solidFill>
+                  <a:schemeClr val="bg1">
+                    <a:lumMod val="65000"/>
+                  </a:schemeClr>
+                </a:solidFill>
+                <a:effectLst>
+                  <a:outerShdw blurRad="38100" dist="25400" dir="5400000" algn="ctr" rotWithShape="0">
+                    <a:srgbClr val="6E747A">
+                      <a:alpha val="43000"/>
+                    </a:srgbClr>
+                  </a:outerShdw>
+                </a:effectLst>
+              </a:rPr>
+              <a:t> |   Discussion  |  </a:t>
+            </a:r>
+          </a:p>
+        </p:txBody>
+      </p:sp>
+      <p:pic>
+        <p:nvPicPr>
+          <p:cNvPr id="12" name="Picture 11"/>
+          <p:cNvPicPr>
+            <a:picLocks noChangeAspect="1"/>
+          </p:cNvPicPr>
+          <p:nvPr/>
+        </p:nvPicPr>
+        <p:blipFill>
+          <a:blip r:embed="rId3">
+            <a:extLst>
+              <a:ext uri="{BEBA8EAE-BF5A-486C-A8C5-ECC9F3942E4B}">
+                <a14:imgProps xmlns:a14="http://schemas.microsoft.com/office/drawing/2010/main">
+                  <a14:imgLayer r:embed="rId4">
+                    <a14:imgEffect>
+                      <a14:saturation sat="0"/>
+                    </a14:imgEffect>
+                  </a14:imgLayer>
+                </a14:imgProps>
+              </a:ext>
+              <a:ext uri="{28A0092B-C50C-407E-A947-70E740481C1C}">
+                <a14:useLocalDpi xmlns:a14="http://schemas.microsoft.com/office/drawing/2010/main" val="0"/>
+              </a:ext>
+            </a:extLst>
+          </a:blip>
+          <a:stretch>
+            <a:fillRect/>
+          </a:stretch>
+        </p:blipFill>
+        <p:spPr>
+          <a:xfrm>
+            <a:off x="4584700" y="31442"/>
+            <a:ext cx="7607300" cy="1397965"/>
+          </a:xfrm>
+          <a:prstGeom prst="rect">
+            <a:avLst/>
+          </a:prstGeom>
+          <a:effectLst>
+            <a:softEdge rad="50800"/>
+          </a:effectLst>
+        </p:spPr>
+      </p:pic>
+      <p:sp>
+        <p:nvSpPr>
+          <p:cNvPr id="8" name="Title 1">
+            <a:extLst>
+              <a:ext uri="{FF2B5EF4-FFF2-40B4-BE49-F238E27FC236}">
+                <a16:creationId xmlns:a16="http://schemas.microsoft.com/office/drawing/2014/main" id="{984A60E7-48A8-4B8E-AD9F-0A37136405B5}"/>
+              </a:ext>
+            </a:extLst>
+          </p:cNvPr>
+          <p:cNvSpPr txBox="1">
+            <a:spLocks/>
+          </p:cNvSpPr>
+          <p:nvPr/>
+        </p:nvSpPr>
+        <p:spPr>
+          <a:xfrm>
+            <a:off x="0" y="142875"/>
+            <a:ext cx="5076967" cy="1179512"/>
+          </a:xfrm>
+          <a:prstGeom prst="rect">
+            <a:avLst/>
+          </a:prstGeom>
+        </p:spPr>
+        <p:txBody>
+          <a:bodyPr vert="horz" lIns="91440" tIns="45720" rIns="91440" bIns="45720" rtlCol="0" anchor="ctr">
+            <a:normAutofit/>
+          </a:bodyPr>
+          <a:lstStyle>
+            <a:lvl1pPr algn="l" defTabSz="914400" rtl="0" eaLnBrk="1" latinLnBrk="0" hangingPunct="1">
+              <a:spcBef>
+                <a:spcPct val="0"/>
+              </a:spcBef>
+              <a:buNone/>
+              <a:defRPr sz="4400" kern="1200">
+                <a:solidFill>
+                  <a:schemeClr val="accent2"/>
+                </a:solidFill>
+                <a:latin typeface="+mj-lt"/>
+                <a:ea typeface="+mj-ea"/>
+                <a:cs typeface="+mj-cs"/>
+              </a:defRPr>
+            </a:lvl1pPr>
+          </a:lstStyle>
+          <a:p>
+            <a:r>
+              <a:rPr lang="es-CO" sz="3200" dirty="0" err="1"/>
+              <a:t>World</a:t>
+            </a:r>
+            <a:r>
+              <a:rPr lang="es-CO" sz="3200" dirty="0"/>
+              <a:t> </a:t>
+            </a:r>
+            <a:r>
+              <a:rPr lang="es-CO" sz="3200" dirty="0" err="1"/>
+              <a:t>Happines</a:t>
+            </a:r>
+            <a:r>
+              <a:rPr lang="es-CO" sz="3200" dirty="0"/>
+              <a:t> </a:t>
+            </a:r>
+            <a:r>
+              <a:rPr lang="es-CO" sz="3200" dirty="0" err="1"/>
+              <a:t>Analysis</a:t>
+            </a:r>
+            <a:endParaRPr lang="en-US" sz="3000" dirty="0"/>
+          </a:p>
+        </p:txBody>
+      </p:sp>
+      <p:pic>
+        <p:nvPicPr>
+          <p:cNvPr id="9" name="Content Placeholder 8" descr="A close up of a logo&#10;&#10;Description automatically generated">
+            <a:extLst>
+              <a:ext uri="{FF2B5EF4-FFF2-40B4-BE49-F238E27FC236}">
+                <a16:creationId xmlns:a16="http://schemas.microsoft.com/office/drawing/2014/main" id="{3F49046E-6C4F-4F45-B56E-108108A5EBD2}"/>
+              </a:ext>
+            </a:extLst>
+          </p:cNvPr>
+          <p:cNvPicPr>
+            <a:picLocks noGrp="1" noChangeAspect="1"/>
+          </p:cNvPicPr>
+          <p:nvPr>
+            <p:ph sz="half" idx="2"/>
+          </p:nvPr>
+        </p:nvPicPr>
+        <p:blipFill>
+          <a:blip r:embed="rId5">
+            <a:extLst>
+              <a:ext uri="{28A0092B-C50C-407E-A947-70E740481C1C}">
+                <a14:useLocalDpi xmlns:a14="http://schemas.microsoft.com/office/drawing/2010/main" val="0"/>
+              </a:ext>
+            </a:extLst>
+          </a:blip>
+          <a:stretch>
+            <a:fillRect/>
+          </a:stretch>
+        </p:blipFill>
+        <p:spPr>
+          <a:xfrm>
+            <a:off x="844550" y="2782113"/>
+            <a:ext cx="5157785" cy="3438524"/>
+          </a:xfrm>
+        </p:spPr>
+      </p:pic>
+      <p:pic>
+        <p:nvPicPr>
+          <p:cNvPr id="17" name="Content Placeholder 16" descr="A close up of a logo&#10;&#10;Description automatically generated">
+            <a:extLst>
+              <a:ext uri="{FF2B5EF4-FFF2-40B4-BE49-F238E27FC236}">
+                <a16:creationId xmlns:a16="http://schemas.microsoft.com/office/drawing/2014/main" id="{6524748C-9711-4B62-BC85-BCC436FC710E}"/>
+              </a:ext>
+            </a:extLst>
+          </p:cNvPr>
+          <p:cNvPicPr>
+            <a:picLocks noGrp="1" noChangeAspect="1"/>
+          </p:cNvPicPr>
+          <p:nvPr>
+            <p:ph sz="quarter" idx="4"/>
+          </p:nvPr>
+        </p:nvPicPr>
+        <p:blipFill>
+          <a:blip r:embed="rId6">
+            <a:extLst>
+              <a:ext uri="{28A0092B-C50C-407E-A947-70E740481C1C}">
+                <a14:useLocalDpi xmlns:a14="http://schemas.microsoft.com/office/drawing/2010/main" val="0"/>
+              </a:ext>
+            </a:extLst>
+          </a:blip>
+          <a:stretch>
+            <a:fillRect/>
+          </a:stretch>
+        </p:blipFill>
+        <p:spPr>
+          <a:xfrm>
+            <a:off x="6262320" y="2782113"/>
+            <a:ext cx="5085130" cy="3390087"/>
+          </a:xfrm>
+        </p:spPr>
+      </p:pic>
+    </p:spTree>
+    <p:extLst>
+      <p:ext uri="{BB962C8B-B14F-4D97-AF65-F5344CB8AC3E}">
+        <p14:creationId xmlns:p14="http://schemas.microsoft.com/office/powerpoint/2010/main" val="3093005127"/>
+      </p:ext>
+    </p:extLst>
+  </p:cSld>
+  <p:clrMapOvr>
+    <a:masterClrMapping/>
+  </p:clrMapOvr>
+  <mc:AlternateContent xmlns:mc="http://schemas.openxmlformats.org/markup-compatibility/2006" xmlns:p14="http://schemas.microsoft.com/office/powerpoint/2010/main">
+    <mc:Choice Requires="p14">
+      <p:transition spd="med" p14:dur="700">
+        <p:fade/>
+      </p:transition>
+    </mc:Choice>
+    <mc:Fallback xmlns="">
+      <p:transition spd="med">
+        <p:fade/>
+      </p:transition>
+    </mc:Fallback>
+  </mc:AlternateContent>
+</p:sld>
+</file>
+
+<file path=ppt/slides/slide17.xml><?xml version="1.0" encoding="utf-8"?>
+<p:sld xmlns:a="http://schemas.openxmlformats.org/drawingml/2006/main" xmlns:r="http://schemas.openxmlformats.org/officeDocument/2006/relationships" xmlns:p="http://schemas.openxmlformats.org/presentationml/2006/main">
+  <p:cSld>
+    <p:spTree>
+      <p:nvGrpSpPr>
+        <p:cNvPr id="1" name=""/>
+        <p:cNvGrpSpPr/>
+        <p:nvPr/>
+      </p:nvGrpSpPr>
+      <p:grpSpPr>
+        <a:xfrm>
+          <a:off x="0" y="0"/>
+          <a:ext cx="0" cy="0"/>
+          <a:chOff x="0" y="0"/>
+          <a:chExt cx="0" cy="0"/>
+        </a:xfrm>
+      </p:grpSpPr>
+      <p:sp>
+        <p:nvSpPr>
+          <p:cNvPr id="4" name="Text Placeholder 3">
+            <a:extLst>
+              <a:ext uri="{FF2B5EF4-FFF2-40B4-BE49-F238E27FC236}">
+                <a16:creationId xmlns:a16="http://schemas.microsoft.com/office/drawing/2014/main" id="{F8B037C4-63A4-4DF6-AAAD-6CC78B6D4231}"/>
+              </a:ext>
+            </a:extLst>
+          </p:cNvPr>
+          <p:cNvSpPr>
+            <a:spLocks noGrp="1"/>
+          </p:cNvSpPr>
+          <p:nvPr>
+            <p:ph type="body" idx="1"/>
+          </p:nvPr>
+        </p:nvSpPr>
+        <p:spPr>
+          <a:xfrm>
+            <a:off x="831849" y="2295729"/>
+            <a:ext cx="10348473" cy="376136"/>
+          </a:xfrm>
+        </p:spPr>
+        <p:txBody>
+          <a:bodyPr>
+            <a:normAutofit fontScale="70000" lnSpcReduction="20000"/>
+          </a:bodyPr>
+          <a:lstStyle/>
+          <a:p>
+            <a:r>
+              <a:rPr lang="en-US" b="0" dirty="0"/>
+              <a:t>Side questions: What is the specific music profile of the US? Can we find a song with that specific profile?</a:t>
+            </a:r>
+            <a:endParaRPr lang="en-US" dirty="0"/>
+          </a:p>
+        </p:txBody>
+      </p:sp>
+      <p:sp>
+        <p:nvSpPr>
+          <p:cNvPr id="2" name="Title 1"/>
+          <p:cNvSpPr>
+            <a:spLocks noGrp="1"/>
+          </p:cNvSpPr>
+          <p:nvPr>
+            <p:ph type="title"/>
+          </p:nvPr>
+        </p:nvSpPr>
+        <p:spPr>
+          <a:xfrm>
+            <a:off x="831850" y="1692920"/>
+            <a:ext cx="10515600" cy="492561"/>
+          </a:xfrm>
+        </p:spPr>
+        <p:txBody>
+          <a:bodyPr>
+            <a:normAutofit fontScale="90000"/>
+          </a:bodyPr>
+          <a:lstStyle/>
+          <a:p>
+            <a:r>
+              <a:rPr lang="en-US" dirty="0"/>
+              <a:t>Exploration &amp; Analysis – Musical expression</a:t>
+            </a:r>
+          </a:p>
+        </p:txBody>
+      </p:sp>
+      <p:sp>
+        <p:nvSpPr>
+          <p:cNvPr id="10" name="Round Diagonal Corner Rectangle 9"/>
+          <p:cNvSpPr/>
+          <p:nvPr/>
+        </p:nvSpPr>
+        <p:spPr>
+          <a:xfrm>
+            <a:off x="1076885" y="6426201"/>
+            <a:ext cx="8933627" cy="364208"/>
+          </a:xfrm>
+          <a:prstGeom prst="round2DiagRect">
+            <a:avLst/>
+          </a:prstGeom>
+          <a:solidFill>
+            <a:srgbClr val="9E2936"/>
+          </a:solidFill>
+        </p:spPr>
+        <p:style>
+          <a:lnRef idx="1">
+            <a:schemeClr val="accent2"/>
+          </a:lnRef>
+          <a:fillRef idx="2">
+            <a:schemeClr val="accent2"/>
+          </a:fillRef>
+          <a:effectRef idx="1">
+            <a:schemeClr val="accent2"/>
+          </a:effectRef>
+          <a:fontRef idx="minor">
+            <a:schemeClr val="dk1"/>
+          </a:fontRef>
+        </p:style>
+        <p:txBody>
+          <a:bodyPr rtlCol="0" anchor="ctr"/>
+          <a:lstStyle/>
+          <a:p>
+            <a:pPr algn="ctr"/>
+            <a:r>
+              <a:rPr lang="es-CO" dirty="0" err="1">
+                <a:solidFill>
+                  <a:schemeClr val="bg1">
+                    <a:lumMod val="65000"/>
+                  </a:schemeClr>
+                </a:solidFill>
+              </a:rPr>
+              <a:t>Hypothesis</a:t>
+            </a:r>
+            <a:r>
+              <a:rPr lang="es-CO" dirty="0">
+                <a:solidFill>
+                  <a:schemeClr val="bg1">
+                    <a:lumMod val="65000"/>
+                  </a:schemeClr>
+                </a:solidFill>
+              </a:rPr>
+              <a:t> </a:t>
+            </a:r>
+            <a:r>
+              <a:rPr lang="en-US" dirty="0">
+                <a:ln w="0"/>
+                <a:solidFill>
+                  <a:schemeClr val="bg1"/>
+                </a:solidFill>
+                <a:effectLst>
+                  <a:outerShdw blurRad="38100" dist="25400" dir="5400000" algn="ctr" rotWithShape="0">
+                    <a:srgbClr val="6E747A">
+                      <a:alpha val="43000"/>
+                    </a:srgbClr>
+                  </a:outerShdw>
+                </a:effectLst>
+              </a:rPr>
+              <a:t> </a:t>
+            </a:r>
+            <a:r>
+              <a:rPr lang="en-US" dirty="0">
+                <a:ln w="0"/>
+                <a:solidFill>
+                  <a:schemeClr val="bg1">
+                    <a:lumMod val="65000"/>
+                  </a:schemeClr>
+                </a:solidFill>
+                <a:effectLst>
+                  <a:outerShdw blurRad="38100" dist="25400" dir="5400000" algn="ctr" rotWithShape="0">
+                    <a:srgbClr val="6E747A">
+                      <a:alpha val="43000"/>
+                    </a:srgbClr>
+                  </a:outerShdw>
+                </a:effectLst>
+              </a:rPr>
+              <a:t>|   Data |   </a:t>
+            </a:r>
+            <a:r>
+              <a:rPr lang="en-US" dirty="0">
+                <a:ln w="0"/>
+                <a:solidFill>
+                  <a:schemeClr val="bg1"/>
+                </a:solidFill>
+                <a:effectLst>
+                  <a:outerShdw blurRad="38100" dist="25400" dir="5400000" algn="ctr" rotWithShape="0">
+                    <a:srgbClr val="6E747A">
+                      <a:alpha val="43000"/>
+                    </a:srgbClr>
+                  </a:outerShdw>
+                </a:effectLst>
+              </a:rPr>
+              <a:t>Exploration &amp; analysis</a:t>
+            </a:r>
+            <a:r>
+              <a:rPr lang="en-US" dirty="0">
+                <a:ln w="0"/>
+                <a:solidFill>
+                  <a:schemeClr val="bg1">
+                    <a:lumMod val="65000"/>
+                  </a:schemeClr>
+                </a:solidFill>
+                <a:effectLst>
+                  <a:outerShdw blurRad="38100" dist="25400" dir="5400000" algn="ctr" rotWithShape="0">
+                    <a:srgbClr val="6E747A">
+                      <a:alpha val="43000"/>
+                    </a:srgbClr>
+                  </a:outerShdw>
+                </a:effectLst>
+              </a:rPr>
+              <a:t> |   Discussion  |  </a:t>
+            </a:r>
+          </a:p>
+        </p:txBody>
+      </p:sp>
+      <p:pic>
+        <p:nvPicPr>
+          <p:cNvPr id="12" name="Picture 11"/>
+          <p:cNvPicPr>
+            <a:picLocks noChangeAspect="1"/>
+          </p:cNvPicPr>
+          <p:nvPr/>
+        </p:nvPicPr>
+        <p:blipFill>
+          <a:blip r:embed="rId3">
+            <a:extLst>
+              <a:ext uri="{BEBA8EAE-BF5A-486C-A8C5-ECC9F3942E4B}">
+                <a14:imgProps xmlns:a14="http://schemas.microsoft.com/office/drawing/2010/main">
+                  <a14:imgLayer r:embed="rId4">
+                    <a14:imgEffect>
+                      <a14:saturation sat="0"/>
+                    </a14:imgEffect>
+                  </a14:imgLayer>
+                </a14:imgProps>
+              </a:ext>
+              <a:ext uri="{28A0092B-C50C-407E-A947-70E740481C1C}">
+                <a14:useLocalDpi xmlns:a14="http://schemas.microsoft.com/office/drawing/2010/main" val="0"/>
+              </a:ext>
+            </a:extLst>
+          </a:blip>
+          <a:stretch>
+            <a:fillRect/>
+          </a:stretch>
+        </p:blipFill>
+        <p:spPr>
+          <a:xfrm>
+            <a:off x="4584700" y="31442"/>
+            <a:ext cx="7607300" cy="1397965"/>
+          </a:xfrm>
+          <a:prstGeom prst="rect">
+            <a:avLst/>
+          </a:prstGeom>
+          <a:effectLst>
+            <a:softEdge rad="50800"/>
+          </a:effectLst>
+        </p:spPr>
+      </p:pic>
+      <p:sp>
+        <p:nvSpPr>
+          <p:cNvPr id="8" name="Title 1">
+            <a:extLst>
+              <a:ext uri="{FF2B5EF4-FFF2-40B4-BE49-F238E27FC236}">
+                <a16:creationId xmlns:a16="http://schemas.microsoft.com/office/drawing/2014/main" id="{984A60E7-48A8-4B8E-AD9F-0A37136405B5}"/>
+              </a:ext>
+            </a:extLst>
+          </p:cNvPr>
+          <p:cNvSpPr txBox="1">
+            <a:spLocks/>
+          </p:cNvSpPr>
+          <p:nvPr/>
+        </p:nvSpPr>
+        <p:spPr>
+          <a:xfrm>
+            <a:off x="0" y="142875"/>
+            <a:ext cx="5076967" cy="1179512"/>
+          </a:xfrm>
+          <a:prstGeom prst="rect">
+            <a:avLst/>
+          </a:prstGeom>
+        </p:spPr>
+        <p:txBody>
+          <a:bodyPr vert="horz" lIns="91440" tIns="45720" rIns="91440" bIns="45720" rtlCol="0" anchor="ctr">
+            <a:normAutofit/>
+          </a:bodyPr>
+          <a:lstStyle>
+            <a:lvl1pPr algn="l" defTabSz="914400" rtl="0" eaLnBrk="1" latinLnBrk="0" hangingPunct="1">
+              <a:spcBef>
+                <a:spcPct val="0"/>
+              </a:spcBef>
+              <a:buNone/>
+              <a:defRPr sz="4400" kern="1200">
+                <a:solidFill>
+                  <a:schemeClr val="accent2"/>
+                </a:solidFill>
+                <a:latin typeface="+mj-lt"/>
+                <a:ea typeface="+mj-ea"/>
+                <a:cs typeface="+mj-cs"/>
+              </a:defRPr>
+            </a:lvl1pPr>
+          </a:lstStyle>
+          <a:p>
+            <a:r>
+              <a:rPr lang="es-CO" sz="3200" dirty="0" err="1"/>
+              <a:t>World</a:t>
+            </a:r>
+            <a:r>
+              <a:rPr lang="es-CO" sz="3200" dirty="0"/>
+              <a:t> </a:t>
+            </a:r>
+            <a:r>
+              <a:rPr lang="es-CO" sz="3200" dirty="0" err="1"/>
+              <a:t>Happines</a:t>
+            </a:r>
+            <a:r>
+              <a:rPr lang="es-CO" sz="3200" dirty="0"/>
+              <a:t> </a:t>
+            </a:r>
+            <a:r>
+              <a:rPr lang="es-CO" sz="3200" dirty="0" err="1"/>
+              <a:t>Analysis</a:t>
+            </a:r>
+            <a:endParaRPr lang="en-US" sz="3000" dirty="0"/>
+          </a:p>
+        </p:txBody>
+      </p:sp>
+      <p:pic>
+        <p:nvPicPr>
+          <p:cNvPr id="11" name="Content Placeholder 10" descr="A picture containing screenshot&#10;&#10;Description automatically generated">
+            <a:extLst>
+              <a:ext uri="{FF2B5EF4-FFF2-40B4-BE49-F238E27FC236}">
+                <a16:creationId xmlns:a16="http://schemas.microsoft.com/office/drawing/2014/main" id="{DC4BAF8E-DAFC-4F0F-A414-4EAF1876565D}"/>
+              </a:ext>
+            </a:extLst>
+          </p:cNvPr>
+          <p:cNvPicPr>
+            <a:picLocks noGrp="1" noChangeAspect="1"/>
+          </p:cNvPicPr>
+          <p:nvPr>
+            <p:ph sz="half" idx="2"/>
+          </p:nvPr>
+        </p:nvPicPr>
+        <p:blipFill>
+          <a:blip r:embed="rId5">
+            <a:extLst>
+              <a:ext uri="{28A0092B-C50C-407E-A947-70E740481C1C}">
+                <a14:useLocalDpi xmlns:a14="http://schemas.microsoft.com/office/drawing/2010/main" val="0"/>
+              </a:ext>
+            </a:extLst>
+          </a:blip>
+          <a:stretch>
+            <a:fillRect/>
+          </a:stretch>
+        </p:blipFill>
+        <p:spPr>
+          <a:xfrm>
+            <a:off x="831850" y="4383932"/>
+            <a:ext cx="5156200" cy="1738008"/>
+          </a:xfrm>
+        </p:spPr>
+      </p:pic>
+      <p:pic>
+        <p:nvPicPr>
+          <p:cNvPr id="18" name="Picture 17">
+            <a:extLst>
+              <a:ext uri="{FF2B5EF4-FFF2-40B4-BE49-F238E27FC236}">
+                <a16:creationId xmlns:a16="http://schemas.microsoft.com/office/drawing/2014/main" id="{A361D5BD-7885-4C15-A06E-8063DBB65DF4}"/>
+              </a:ext>
+            </a:extLst>
+          </p:cNvPr>
+          <p:cNvPicPr>
+            <a:picLocks noChangeAspect="1"/>
+          </p:cNvPicPr>
+          <p:nvPr/>
+        </p:nvPicPr>
+        <p:blipFill>
+          <a:blip r:embed="rId6"/>
+          <a:stretch>
+            <a:fillRect/>
+          </a:stretch>
+        </p:blipFill>
+        <p:spPr>
+          <a:xfrm>
+            <a:off x="676849" y="2936900"/>
+            <a:ext cx="5311201" cy="1294901"/>
+          </a:xfrm>
+          <a:prstGeom prst="rect">
+            <a:avLst/>
+          </a:prstGeom>
+        </p:spPr>
+      </p:pic>
+      <p:sp>
+        <p:nvSpPr>
+          <p:cNvPr id="19" name="Rectangle 1">
+            <a:extLst>
+              <a:ext uri="{FF2B5EF4-FFF2-40B4-BE49-F238E27FC236}">
+                <a16:creationId xmlns:a16="http://schemas.microsoft.com/office/drawing/2014/main" id="{558F2E86-1006-4432-AE5C-8A8AEBC7F730}"/>
+              </a:ext>
+            </a:extLst>
+          </p:cNvPr>
+          <p:cNvSpPr>
+            <a:spLocks noGrp="1" noChangeArrowheads="1"/>
+          </p:cNvSpPr>
+          <p:nvPr>
+            <p:ph sz="quarter" idx="4"/>
+          </p:nvPr>
+        </p:nvSpPr>
+        <p:spPr bwMode="auto">
+          <a:xfrm>
+            <a:off x="6329164" y="4312267"/>
+            <a:ext cx="5514330" cy="553998"/>
+          </a:xfrm>
+          <a:prstGeom prst="rect">
+            <a:avLst/>
+          </a:prstGeom>
+          <a:noFill/>
+          <a:ln>
+            <a:noFill/>
+          </a:ln>
+          <a:effectLst/>
+          <a:extLst>
+            <a:ext uri="{909E8E84-426E-40DD-AFC4-6F175D3DCCD1}">
+              <a14:hiddenFill xmlns:a14="http://schemas.microsoft.com/office/drawing/2010/main">
+                <a:solidFill>
+                  <a:schemeClr val="accent1"/>
+                </a:solidFill>
+              </a14:hiddenFill>
+            </a:ext>
+            <a:ext uri="{91240B29-F687-4F45-9708-019B960494DF}">
+              <a14:hiddenLine xmlns:a14="http://schemas.microsoft.com/office/drawing/2010/main" w="9525">
+                <a:solidFill>
+                  <a:schemeClr val="tx1"/>
+                </a:solidFill>
+                <a:miter lim="800000"/>
+                <a:headEnd/>
+                <a:tailEnd/>
+              </a14:hiddenLine>
+            </a:ext>
+            <a:ext uri="{AF507438-7753-43E0-B8FC-AC1667EBCBE1}">
+              <a14:hiddenEffects xmlns:a14="http://schemas.microsoft.com/office/drawing/2010/main">
+                <a:effectLst>
+                  <a:outerShdw dist="35921" dir="2700000" algn="ctr" rotWithShape="0">
+                    <a:schemeClr val="bg2"/>
+                  </a:outerShdw>
+                </a:effectLst>
+              </a14:hiddenEffects>
+            </a:ext>
+          </a:extLst>
+        </p:spPr>
+        <p:txBody>
+          <a:bodyPr vert="horz" wrap="none" lIns="0" tIns="0" rIns="0" bIns="0" numCol="1" anchor="ctr" anchorCtr="0" compatLnSpc="1">
+            <a:prstTxWarp prst="textNoShape">
+              <a:avLst/>
+            </a:prstTxWarp>
+            <a:spAutoFit/>
+          </a:bodyPr>
+          <a:lstStyle>
+            <a:lvl1pPr eaLnBrk="0" fontAlgn="base" hangingPunct="0">
+              <a:spcBef>
+                <a:spcPct val="0"/>
+              </a:spcBef>
+              <a:spcAft>
+                <a:spcPct val="0"/>
+              </a:spcAft>
+              <a:defRPr>
+                <a:solidFill>
+                  <a:schemeClr val="tx1"/>
+                </a:solidFill>
+                <a:latin typeface="Arial" panose="020B0604020202020204" pitchFamily="34" charset="0"/>
+              </a:defRPr>
+            </a:lvl1pPr>
+            <a:lvl2pPr eaLnBrk="0" fontAlgn="base" hangingPunct="0">
+              <a:spcBef>
+                <a:spcPct val="0"/>
+              </a:spcBef>
+              <a:spcAft>
+                <a:spcPct val="0"/>
+              </a:spcAft>
+              <a:defRPr>
+                <a:solidFill>
+                  <a:schemeClr val="tx1"/>
+                </a:solidFill>
+                <a:latin typeface="Arial" panose="020B0604020202020204" pitchFamily="34" charset="0"/>
+              </a:defRPr>
+            </a:lvl2pPr>
+            <a:lvl3pPr eaLnBrk="0" fontAlgn="base" hangingPunct="0">
+              <a:spcBef>
+                <a:spcPct val="0"/>
+              </a:spcBef>
+              <a:spcAft>
+                <a:spcPct val="0"/>
+              </a:spcAft>
+              <a:defRPr>
+                <a:solidFill>
+                  <a:schemeClr val="tx1"/>
+                </a:solidFill>
+                <a:latin typeface="Arial" panose="020B0604020202020204" pitchFamily="34" charset="0"/>
+              </a:defRPr>
+            </a:lvl3pPr>
+            <a:lvl4pPr eaLnBrk="0" fontAlgn="base" hangingPunct="0">
+              <a:spcBef>
+                <a:spcPct val="0"/>
+              </a:spcBef>
+              <a:spcAft>
+                <a:spcPct val="0"/>
+              </a:spcAft>
+              <a:defRPr>
+                <a:solidFill>
+                  <a:schemeClr val="tx1"/>
+                </a:solidFill>
+                <a:latin typeface="Arial" panose="020B0604020202020204" pitchFamily="34" charset="0"/>
+              </a:defRPr>
+            </a:lvl4pPr>
+            <a:lvl5pPr eaLnBrk="0" fontAlgn="base" hangingPunct="0">
+              <a:spcBef>
+                <a:spcPct val="0"/>
+              </a:spcBef>
+              <a:spcAft>
+                <a:spcPct val="0"/>
+              </a:spcAft>
+              <a:defRPr>
+                <a:solidFill>
+                  <a:schemeClr val="tx1"/>
+                </a:solidFill>
+                <a:latin typeface="Arial" panose="020B0604020202020204" pitchFamily="34" charset="0"/>
+              </a:defRPr>
+            </a:lvl5pPr>
+            <a:lvl6pPr eaLnBrk="0" fontAlgn="base" hangingPunct="0">
+              <a:spcBef>
+                <a:spcPct val="0"/>
+              </a:spcBef>
+              <a:spcAft>
+                <a:spcPct val="0"/>
+              </a:spcAft>
+              <a:defRPr>
+                <a:solidFill>
+                  <a:schemeClr val="tx1"/>
+                </a:solidFill>
+                <a:latin typeface="Arial" panose="020B0604020202020204" pitchFamily="34" charset="0"/>
+              </a:defRPr>
+            </a:lvl6pPr>
+            <a:lvl7pPr eaLnBrk="0" fontAlgn="base" hangingPunct="0">
+              <a:spcBef>
+                <a:spcPct val="0"/>
+              </a:spcBef>
+              <a:spcAft>
+                <a:spcPct val="0"/>
+              </a:spcAft>
+              <a:defRPr>
+                <a:solidFill>
+                  <a:schemeClr val="tx1"/>
+                </a:solidFill>
+                <a:latin typeface="Arial" panose="020B0604020202020204" pitchFamily="34" charset="0"/>
+              </a:defRPr>
+            </a:lvl7pPr>
+            <a:lvl8pPr eaLnBrk="0" fontAlgn="base" hangingPunct="0">
+              <a:spcBef>
+                <a:spcPct val="0"/>
+              </a:spcBef>
+              <a:spcAft>
+                <a:spcPct val="0"/>
+              </a:spcAft>
+              <a:defRPr>
+                <a:solidFill>
+                  <a:schemeClr val="tx1"/>
+                </a:solidFill>
+                <a:latin typeface="Arial" panose="020B0604020202020204" pitchFamily="34" charset="0"/>
+              </a:defRPr>
+            </a:lvl8pPr>
+            <a:lvl9pPr eaLnBrk="0" fontAlgn="base" hangingPunct="0">
+              <a:spcBef>
+                <a:spcPct val="0"/>
+              </a:spcBef>
+              <a:spcAft>
+                <a:spcPct val="0"/>
+              </a:spcAft>
+              <a:defRPr>
+                <a:solidFill>
+                  <a:schemeClr val="tx1"/>
+                </a:solidFill>
+                <a:latin typeface="Arial" panose="020B0604020202020204" pitchFamily="34" charset="0"/>
+              </a:defRPr>
+            </a:lvl9pPr>
+          </a:lstStyle>
+          <a:p>
+            <a:pPr marL="0" marR="0" lvl="0" indent="0" algn="just" defTabSz="914400" rtl="0" eaLnBrk="0" fontAlgn="base" latinLnBrk="0" hangingPunct="0">
+              <a:lnSpc>
+                <a:spcPct val="100000"/>
+              </a:lnSpc>
+              <a:spcBef>
+                <a:spcPct val="0"/>
+              </a:spcBef>
+              <a:spcAft>
+                <a:spcPct val="0"/>
+              </a:spcAft>
+              <a:buClrTx/>
+              <a:buSzTx/>
+              <a:buFontTx/>
+              <a:buNone/>
+              <a:tabLst/>
+            </a:pPr>
+            <a:r>
+              <a:rPr kumimoji="0" lang="en-US" altLang="en-US" sz="1800" b="0" i="0" u="none" strike="noStrike" cap="none" normalizeH="0" baseline="0" dirty="0" err="1">
+                <a:ln>
+                  <a:noFill/>
+                </a:ln>
+                <a:solidFill>
+                  <a:srgbClr val="000000"/>
+                </a:solidFill>
+                <a:effectLst/>
+                <a:latin typeface="Courier New" panose="02070309020205020404" pitchFamily="49" charset="0"/>
+                <a:cs typeface="Courier New" panose="02070309020205020404" pitchFamily="49" charset="0"/>
+              </a:rPr>
+              <a:t>Ahora</a:t>
+            </a:r>
+            <a:r>
+              <a:rPr kumimoji="0" lang="en-US" altLang="en-US" sz="1800" b="0" i="0" u="none" strike="noStrike" cap="none" normalizeH="0" baseline="0" dirty="0">
+                <a:ln>
+                  <a:noFill/>
+                </a:ln>
+                <a:solidFill>
+                  <a:srgbClr val="000000"/>
+                </a:solidFill>
+                <a:effectLst/>
+                <a:latin typeface="Courier New" panose="02070309020205020404" pitchFamily="49" charset="0"/>
+                <a:cs typeface="Courier New" panose="02070309020205020404" pitchFamily="49" charset="0"/>
+              </a:rPr>
+              <a:t> Dice (feat. J </a:t>
+            </a:r>
+            <a:r>
+              <a:rPr kumimoji="0" lang="en-US" altLang="en-US" sz="1800" b="0" i="0" u="none" strike="noStrike" cap="none" normalizeH="0" baseline="0" dirty="0" err="1">
+                <a:ln>
+                  <a:noFill/>
+                </a:ln>
+                <a:solidFill>
+                  <a:srgbClr val="000000"/>
+                </a:solidFill>
+                <a:effectLst/>
+                <a:latin typeface="Courier New" panose="02070309020205020404" pitchFamily="49" charset="0"/>
+                <a:cs typeface="Courier New" panose="02070309020205020404" pitchFamily="49" charset="0"/>
+              </a:rPr>
+              <a:t>Balvin</a:t>
+            </a:r>
+            <a:r>
+              <a:rPr kumimoji="0" lang="en-US" altLang="en-US" sz="1800" b="0" i="0" u="none" strike="noStrike" cap="none" normalizeH="0" baseline="0" dirty="0">
+                <a:ln>
+                  <a:noFill/>
+                </a:ln>
+                <a:solidFill>
+                  <a:srgbClr val="000000"/>
+                </a:solidFill>
+                <a:effectLst/>
+                <a:latin typeface="Courier New" panose="02070309020205020404" pitchFamily="49" charset="0"/>
+                <a:cs typeface="Courier New" panose="02070309020205020404" pitchFamily="49" charset="0"/>
+              </a:rPr>
+              <a:t> &amp; </a:t>
+            </a:r>
+            <a:r>
+              <a:rPr kumimoji="0" lang="en-US" altLang="en-US" sz="1800" b="0" i="0" u="none" strike="noStrike" cap="none" normalizeH="0" baseline="0" dirty="0" err="1">
+                <a:ln>
+                  <a:noFill/>
+                </a:ln>
+                <a:solidFill>
+                  <a:srgbClr val="000000"/>
+                </a:solidFill>
+                <a:effectLst/>
+                <a:latin typeface="Courier New" panose="02070309020205020404" pitchFamily="49" charset="0"/>
+                <a:cs typeface="Courier New" panose="02070309020205020404" pitchFamily="49" charset="0"/>
+              </a:rPr>
+              <a:t>Arcangel</a:t>
+            </a:r>
+            <a:r>
+              <a:rPr kumimoji="0" lang="en-US" altLang="en-US" sz="1800" b="0" i="0" u="none" strike="noStrike" cap="none" normalizeH="0" baseline="0" dirty="0">
+                <a:ln>
+                  <a:noFill/>
+                </a:ln>
+                <a:solidFill>
+                  <a:srgbClr val="000000"/>
+                </a:solidFill>
+                <a:effectLst/>
+                <a:latin typeface="Courier New" panose="02070309020205020404" pitchFamily="49" charset="0"/>
+                <a:cs typeface="Courier New" panose="02070309020205020404" pitchFamily="49" charset="0"/>
+              </a:rPr>
+              <a:t>) </a:t>
+            </a:r>
+          </a:p>
+          <a:p>
+            <a:pPr marL="0" marR="0" lvl="0" indent="0" algn="just" defTabSz="914400" rtl="0" eaLnBrk="0" fontAlgn="base" latinLnBrk="0" hangingPunct="0">
+              <a:lnSpc>
+                <a:spcPct val="100000"/>
+              </a:lnSpc>
+              <a:spcBef>
+                <a:spcPct val="0"/>
+              </a:spcBef>
+              <a:spcAft>
+                <a:spcPct val="0"/>
+              </a:spcAft>
+              <a:buClrTx/>
+              <a:buSzTx/>
+              <a:buFontTx/>
+              <a:buNone/>
+              <a:tabLst/>
+            </a:pPr>
+            <a:r>
+              <a:rPr kumimoji="0" lang="en-US" altLang="en-US" sz="1800" b="0" i="0" u="sng" strike="noStrike" cap="none" normalizeH="0" baseline="0" dirty="0">
+                <a:ln>
+                  <a:noFill/>
+                </a:ln>
+                <a:solidFill>
+                  <a:srgbClr val="0088CC"/>
+                </a:solidFill>
+                <a:effectLst/>
+                <a:latin typeface="&amp;quot"/>
+                <a:hlinkClick r:id="rId7"/>
+              </a:rPr>
+              <a:t>https://www.youtube.com/watch?v=c73Cu3TQnlg</a:t>
+            </a:r>
+            <a:endParaRPr kumimoji="0" lang="en-US" altLang="en-US" sz="4000" b="0" i="0" u="none" strike="noStrike" cap="none" normalizeH="0" baseline="0" dirty="0">
+              <a:ln>
+                <a:noFill/>
+              </a:ln>
+              <a:solidFill>
+                <a:schemeClr val="tx1"/>
+              </a:solidFill>
+              <a:effectLst/>
+              <a:latin typeface="Arial" panose="020B0604020202020204" pitchFamily="34" charset="0"/>
+            </a:endParaRPr>
+          </a:p>
+        </p:txBody>
+      </p:sp>
+    </p:spTree>
+    <p:extLst>
+      <p:ext uri="{BB962C8B-B14F-4D97-AF65-F5344CB8AC3E}">
+        <p14:creationId xmlns:p14="http://schemas.microsoft.com/office/powerpoint/2010/main" val="1060273566"/>
+      </p:ext>
+    </p:extLst>
+  </p:cSld>
+  <p:clrMapOvr>
+    <a:masterClrMapping/>
+  </p:clrMapOvr>
+  <mc:AlternateContent xmlns:mc="http://schemas.openxmlformats.org/markup-compatibility/2006" xmlns:p14="http://schemas.microsoft.com/office/powerpoint/2010/main">
+    <mc:Choice Requires="p14">
+      <p:transition spd="med" p14:dur="700">
+        <p:fade/>
+      </p:transition>
+    </mc:Choice>
+    <mc:Fallback xmlns="">
+      <p:transition spd="med">
+        <p:fade/>
+      </p:transition>
+    </mc:Fallback>
+  </mc:AlternateContent>
+</p:sld>
+</file>
+
+<file path=ppt/slides/slide18.xml><?xml version="1.0" encoding="utf-8"?>
+<p:sld xmlns:a="http://schemas.openxmlformats.org/drawingml/2006/main" xmlns:r="http://schemas.openxmlformats.org/officeDocument/2006/relationships" xmlns:p="http://schemas.openxmlformats.org/presentationml/2006/main">
+  <p:cSld>
+    <p:spTree>
+      <p:nvGrpSpPr>
+        <p:cNvPr id="1" name=""/>
+        <p:cNvGrpSpPr/>
+        <p:nvPr/>
+      </p:nvGrpSpPr>
+      <p:grpSpPr>
+        <a:xfrm>
+          <a:off x="0" y="0"/>
+          <a:ext cx="0" cy="0"/>
+          <a:chOff x="0" y="0"/>
+          <a:chExt cx="0" cy="0"/>
+        </a:xfrm>
+      </p:grpSpPr>
       <p:pic>
         <p:nvPicPr>
           <p:cNvPr id="6" name="Picture 5"/>
@@ -7625,7 +9342,7 @@
         </p:nvSpPr>
         <p:spPr>
           <a:xfrm>
-            <a:off x="1076885" y="6426201"/>
+            <a:off x="1182037" y="6350917"/>
             <a:ext cx="8933627" cy="364208"/>
           </a:xfrm>
           <a:prstGeom prst="round2DiagRect">
@@ -7655,59 +9372,26 @@
           <a:p>
             <a:pPr algn="ctr"/>
             <a:r>
-              <a:rPr lang="es-CO" dirty="0" err="1">
-                <a:solidFill>
-                  <a:schemeClr val="bg1">
-                    <a:lumMod val="65000"/>
-                  </a:schemeClr>
-                </a:solidFill>
-              </a:rPr>
-              <a:t>Hypothesis</a:t>
-            </a:r>
-            <a:r>
-              <a:rPr lang="es-CO" dirty="0">
-                <a:solidFill>
-                  <a:schemeClr val="bg1">
-                    <a:lumMod val="65000"/>
-                  </a:schemeClr>
-                </a:solidFill>
-              </a:rPr>
-              <a:t> </a:t>
-            </a:r>
-            <a:r>
               <a:rPr lang="en-US" dirty="0">
-                <a:ln w="0"/>
                 <a:solidFill>
                   <a:schemeClr val="bg1"/>
                 </a:solidFill>
-                <a:effectLst>
-                  <a:outerShdw blurRad="38100" dist="25400" dir="5400000" algn="ctr" rotWithShape="0">
-                    <a:srgbClr val="6E747A">
-                      <a:alpha val="43000"/>
-                    </a:srgbClr>
-                  </a:outerShdw>
-                </a:effectLst>
               </a:rPr>
-              <a:t> </a:t>
-            </a:r>
-            <a:r>
-              <a:rPr lang="en-US" dirty="0">
-                <a:ln w="0"/>
-                <a:solidFill>
-                  <a:schemeClr val="bg1">
-                    <a:lumMod val="65000"/>
-                  </a:schemeClr>
-                </a:solidFill>
-                <a:effectLst>
-                  <a:outerShdw blurRad="38100" dist="25400" dir="5400000" algn="ctr" rotWithShape="0">
-                    <a:srgbClr val="6E747A">
-                      <a:alpha val="43000"/>
-                    </a:srgbClr>
-                  </a:outerShdw>
-                </a:effectLst>
-              </a:rPr>
-              <a:t>|   Data |   Exploration &amp; analysis |   Discussion  |  </a:t>
-            </a:r>
+              <a:t>Appendix</a:t>
+            </a:r>
+            <a:endParaRPr lang="en-US" dirty="0">
+              <a:ln w="0"/>
+              <a:solidFill>
+                <a:schemeClr val="bg1"/>
+              </a:solidFill>
+              <a:effectLst>
+                <a:outerShdw blurRad="38100" dist="25400" dir="5400000" algn="ctr" rotWithShape="0">
+                  <a:srgbClr val="6E747A">
+                    <a:alpha val="43000"/>
+                  </a:srgbClr>
+                </a:outerShdw>
+              </a:effectLst>
+            </a:endParaRPr>
           </a:p>
         </p:txBody>
       </p:sp>
@@ -7750,10 +9434,568 @@
           </a:p>
         </p:txBody>
       </p:sp>
+      <p:sp>
+        <p:nvSpPr>
+          <p:cNvPr id="8" name="Title 1">
+            <a:extLst>
+              <a:ext uri="{FF2B5EF4-FFF2-40B4-BE49-F238E27FC236}">
+                <a16:creationId xmlns:a16="http://schemas.microsoft.com/office/drawing/2014/main" id="{0CE643D2-A8DC-48EE-91C2-065ACE39FC10}"/>
+              </a:ext>
+            </a:extLst>
+          </p:cNvPr>
+          <p:cNvSpPr txBox="1">
+            <a:spLocks/>
+          </p:cNvSpPr>
+          <p:nvPr/>
+        </p:nvSpPr>
+        <p:spPr>
+          <a:xfrm>
+            <a:off x="0" y="142875"/>
+            <a:ext cx="5076967" cy="1179512"/>
+          </a:xfrm>
+          <a:prstGeom prst="rect">
+            <a:avLst/>
+          </a:prstGeom>
+        </p:spPr>
+        <p:txBody>
+          <a:bodyPr vert="horz" lIns="91440" tIns="45720" rIns="91440" bIns="45720" rtlCol="0" anchor="ctr">
+            <a:normAutofit/>
+          </a:bodyPr>
+          <a:lstStyle>
+            <a:lvl1pPr algn="l" defTabSz="914400" rtl="0" eaLnBrk="1" latinLnBrk="0" hangingPunct="1">
+              <a:spcBef>
+                <a:spcPct val="0"/>
+              </a:spcBef>
+              <a:buNone/>
+              <a:defRPr sz="4400" kern="1200">
+                <a:solidFill>
+                  <a:schemeClr val="accent2"/>
+                </a:solidFill>
+                <a:latin typeface="+mj-lt"/>
+                <a:ea typeface="+mj-ea"/>
+                <a:cs typeface="+mj-cs"/>
+              </a:defRPr>
+            </a:lvl1pPr>
+          </a:lstStyle>
+          <a:p>
+            <a:r>
+              <a:rPr lang="es-CO" sz="3200" dirty="0" err="1"/>
+              <a:t>World</a:t>
+            </a:r>
+            <a:r>
+              <a:rPr lang="es-CO" sz="3200" dirty="0"/>
+              <a:t> </a:t>
+            </a:r>
+            <a:r>
+              <a:rPr lang="es-CO" sz="3200" dirty="0" err="1"/>
+              <a:t>Happines</a:t>
+            </a:r>
+            <a:r>
+              <a:rPr lang="es-CO" sz="3200" dirty="0"/>
+              <a:t> </a:t>
+            </a:r>
+            <a:r>
+              <a:rPr lang="es-CO" sz="3200" dirty="0" err="1"/>
+              <a:t>Analysis</a:t>
+            </a:r>
+            <a:endParaRPr lang="en-US" sz="3000" dirty="0"/>
+          </a:p>
+        </p:txBody>
+      </p:sp>
+      <p:sp>
+        <p:nvSpPr>
+          <p:cNvPr id="10" name="Title 9">
+            <a:extLst>
+              <a:ext uri="{FF2B5EF4-FFF2-40B4-BE49-F238E27FC236}">
+                <a16:creationId xmlns:a16="http://schemas.microsoft.com/office/drawing/2014/main" id="{80C1BF82-0C4D-4BD3-BEF6-84BBAC2EB0B0}"/>
+              </a:ext>
+            </a:extLst>
+          </p:cNvPr>
+          <p:cNvSpPr>
+            <a:spLocks noGrp="1"/>
+          </p:cNvSpPr>
+          <p:nvPr>
+            <p:ph type="title"/>
+          </p:nvPr>
+        </p:nvSpPr>
+        <p:spPr>
+          <a:xfrm>
+            <a:off x="838200" y="1471095"/>
+            <a:ext cx="10515600" cy="645403"/>
+          </a:xfrm>
+        </p:spPr>
+        <p:txBody>
+          <a:bodyPr>
+            <a:normAutofit fontScale="90000"/>
+          </a:bodyPr>
+          <a:lstStyle/>
+          <a:p>
+            <a:r>
+              <a:rPr lang="en-US" dirty="0"/>
+              <a:t>Spotify – Code to get top 200 songs</a:t>
+            </a:r>
+          </a:p>
+        </p:txBody>
+      </p:sp>
+      <p:pic>
+        <p:nvPicPr>
+          <p:cNvPr id="13" name="Content Placeholder 12" descr="A screenshot of a social media post&#10;&#10;Description automatically generated">
+            <a:extLst>
+              <a:ext uri="{FF2B5EF4-FFF2-40B4-BE49-F238E27FC236}">
+                <a16:creationId xmlns:a16="http://schemas.microsoft.com/office/drawing/2014/main" id="{A2F123E8-4BF8-4655-9C8D-17E4E0AA7C1E}"/>
+              </a:ext>
+            </a:extLst>
+          </p:cNvPr>
+          <p:cNvPicPr>
+            <a:picLocks noGrp="1" noChangeAspect="1"/>
+          </p:cNvPicPr>
+          <p:nvPr>
+            <p:ph idx="1"/>
+          </p:nvPr>
+        </p:nvPicPr>
+        <p:blipFill>
+          <a:blip r:embed="rId5" cstate="print">
+            <a:extLst>
+              <a:ext uri="{28A0092B-C50C-407E-A947-70E740481C1C}">
+                <a14:useLocalDpi xmlns:a14="http://schemas.microsoft.com/office/drawing/2010/main" val="0"/>
+              </a:ext>
+            </a:extLst>
+          </a:blip>
+          <a:stretch>
+            <a:fillRect/>
+          </a:stretch>
+        </p:blipFill>
+        <p:spPr>
+          <a:xfrm>
+            <a:off x="3089312" y="2392363"/>
+            <a:ext cx="6013376" cy="3779837"/>
+          </a:xfrm>
+        </p:spPr>
+      </p:pic>
+      <p:sp>
+        <p:nvSpPr>
+          <p:cNvPr id="14" name="TextBox 13">
+            <a:extLst>
+              <a:ext uri="{FF2B5EF4-FFF2-40B4-BE49-F238E27FC236}">
+                <a16:creationId xmlns:a16="http://schemas.microsoft.com/office/drawing/2014/main" id="{7510C40A-D6D3-49FC-B295-118B59BA8E70}"/>
+              </a:ext>
+            </a:extLst>
+          </p:cNvPr>
+          <p:cNvSpPr txBox="1"/>
+          <p:nvPr/>
+        </p:nvSpPr>
+        <p:spPr>
+          <a:xfrm>
+            <a:off x="85288" y="1973520"/>
+            <a:ext cx="12106712" cy="369332"/>
+          </a:xfrm>
+          <a:prstGeom prst="rect">
+            <a:avLst/>
+          </a:prstGeom>
+          <a:noFill/>
+          <a:ln>
+            <a:solidFill>
+              <a:schemeClr val="bg2">
+                <a:lumMod val="90000"/>
+              </a:schemeClr>
+            </a:solidFill>
+          </a:ln>
+        </p:spPr>
+        <p:txBody>
+          <a:bodyPr wrap="none" rtlCol="0" anchor="ctr" anchorCtr="1">
+            <a:spAutoFit/>
+          </a:bodyPr>
+          <a:lstStyle/>
+          <a:p>
+            <a:r>
+              <a:rPr lang="en-US" dirty="0"/>
+              <a:t>Looped through a Dataframe with a list of countries and a random day per month, for a total of 12 days per country. </a:t>
+            </a:r>
+          </a:p>
+        </p:txBody>
+      </p:sp>
     </p:spTree>
     <p:extLst>
       <p:ext uri="{BB962C8B-B14F-4D97-AF65-F5344CB8AC3E}">
         <p14:creationId xmlns:p14="http://schemas.microsoft.com/office/powerpoint/2010/main" val="356326671"/>
+      </p:ext>
+    </p:extLst>
+  </p:cSld>
+  <p:clrMapOvr>
+    <a:masterClrMapping/>
+  </p:clrMapOvr>
+  <mc:AlternateContent xmlns:mc="http://schemas.openxmlformats.org/markup-compatibility/2006" xmlns:p14="http://schemas.microsoft.com/office/powerpoint/2010/main">
+    <mc:Choice Requires="p14">
+      <p:transition spd="med" p14:dur="700">
+        <p:fade/>
+      </p:transition>
+    </mc:Choice>
+    <mc:Fallback xmlns="">
+      <p:transition spd="med">
+        <p:fade/>
+      </p:transition>
+    </mc:Fallback>
+  </mc:AlternateContent>
+</p:sld>
+</file>
+
+<file path=ppt/slides/slide19.xml><?xml version="1.0" encoding="utf-8"?>
+<p:sld xmlns:a="http://schemas.openxmlformats.org/drawingml/2006/main" xmlns:r="http://schemas.openxmlformats.org/officeDocument/2006/relationships" xmlns:p="http://schemas.openxmlformats.org/presentationml/2006/main">
+  <p:cSld>
+    <p:spTree>
+      <p:nvGrpSpPr>
+        <p:cNvPr id="1" name=""/>
+        <p:cNvGrpSpPr/>
+        <p:nvPr/>
+      </p:nvGrpSpPr>
+      <p:grpSpPr>
+        <a:xfrm>
+          <a:off x="0" y="0"/>
+          <a:ext cx="0" cy="0"/>
+          <a:chOff x="0" y="0"/>
+          <a:chExt cx="0" cy="0"/>
+        </a:xfrm>
+      </p:grpSpPr>
+      <p:pic>
+        <p:nvPicPr>
+          <p:cNvPr id="6" name="Picture 5"/>
+          <p:cNvPicPr>
+            <a:picLocks noChangeAspect="1"/>
+          </p:cNvPicPr>
+          <p:nvPr/>
+        </p:nvPicPr>
+        <p:blipFill>
+          <a:blip r:embed="rId3">
+            <a:extLst>
+              <a:ext uri="{BEBA8EAE-BF5A-486C-A8C5-ECC9F3942E4B}">
+                <a14:imgProps xmlns:a14="http://schemas.microsoft.com/office/drawing/2010/main">
+                  <a14:imgLayer r:embed="rId4">
+                    <a14:imgEffect>
+                      <a14:saturation sat="0"/>
+                    </a14:imgEffect>
+                  </a14:imgLayer>
+                </a14:imgProps>
+              </a:ext>
+              <a:ext uri="{28A0092B-C50C-407E-A947-70E740481C1C}">
+                <a14:useLocalDpi xmlns:a14="http://schemas.microsoft.com/office/drawing/2010/main" val="0"/>
+              </a:ext>
+            </a:extLst>
+          </a:blip>
+          <a:stretch>
+            <a:fillRect/>
+          </a:stretch>
+        </p:blipFill>
+        <p:spPr>
+          <a:xfrm>
+            <a:off x="4584700" y="31442"/>
+            <a:ext cx="7607300" cy="1397965"/>
+          </a:xfrm>
+          <a:prstGeom prst="rect">
+            <a:avLst/>
+          </a:prstGeom>
+          <a:effectLst>
+            <a:softEdge rad="50800"/>
+          </a:effectLst>
+        </p:spPr>
+      </p:pic>
+      <p:sp>
+        <p:nvSpPr>
+          <p:cNvPr id="7" name="Round Diagonal Corner Rectangle 9">
+            <a:extLst>
+              <a:ext uri="{FF2B5EF4-FFF2-40B4-BE49-F238E27FC236}">
+                <a16:creationId xmlns:a16="http://schemas.microsoft.com/office/drawing/2014/main" id="{D4DB5EDE-6E6B-4C9E-A4BB-947D2D332971}"/>
+              </a:ext>
+            </a:extLst>
+          </p:cNvPr>
+          <p:cNvSpPr/>
+          <p:nvPr/>
+        </p:nvSpPr>
+        <p:spPr>
+          <a:xfrm>
+            <a:off x="1182037" y="6350917"/>
+            <a:ext cx="8933627" cy="364208"/>
+          </a:xfrm>
+          <a:prstGeom prst="round2DiagRect">
+            <a:avLst/>
+          </a:prstGeom>
+          <a:solidFill>
+            <a:srgbClr val="9E2936"/>
+          </a:solidFill>
+        </p:spPr>
+        <p:style>
+          <a:lnRef idx="1">
+            <a:schemeClr val="accent2"/>
+          </a:lnRef>
+          <a:fillRef idx="2">
+            <a:schemeClr val="accent2"/>
+          </a:fillRef>
+          <a:effectRef idx="1">
+            <a:schemeClr val="accent2"/>
+          </a:effectRef>
+          <a:fontRef idx="minor">
+            <a:schemeClr val="dk1"/>
+          </a:fontRef>
+        </p:style>
+        <p:txBody>
+          <a:bodyPr rtlCol="0" anchor="ctr"/>
+          <a:lstStyle/>
+          <a:p>
+            <a:pPr algn="ctr"/>
+            <a:r>
+              <a:rPr lang="en-US" dirty="0">
+                <a:solidFill>
+                  <a:schemeClr val="bg1"/>
+                </a:solidFill>
+              </a:rPr>
+              <a:t>Appendix</a:t>
+            </a:r>
+            <a:endParaRPr lang="en-US" dirty="0">
+              <a:ln w="0"/>
+              <a:solidFill>
+                <a:schemeClr val="bg1"/>
+              </a:solidFill>
+              <a:effectLst>
+                <a:outerShdw blurRad="38100" dist="25400" dir="5400000" algn="ctr" rotWithShape="0">
+                  <a:srgbClr val="6E747A">
+                    <a:alpha val="43000"/>
+                  </a:srgbClr>
+                </a:outerShdw>
+              </a:effectLst>
+            </a:endParaRPr>
+          </a:p>
+        </p:txBody>
+      </p:sp>
+      <p:sp>
+        <p:nvSpPr>
+          <p:cNvPr id="2" name="TextBox 1">
+            <a:extLst>
+              <a:ext uri="{FF2B5EF4-FFF2-40B4-BE49-F238E27FC236}">
+                <a16:creationId xmlns:a16="http://schemas.microsoft.com/office/drawing/2014/main" id="{CA39116B-6DC9-4B9F-9047-93742DB46DC3}"/>
+              </a:ext>
+            </a:extLst>
+          </p:cNvPr>
+          <p:cNvSpPr txBox="1"/>
+          <p:nvPr/>
+        </p:nvSpPr>
+        <p:spPr>
+          <a:xfrm>
+            <a:off x="5603132" y="4254551"/>
+            <a:ext cx="45719" cy="369332"/>
+          </a:xfrm>
+          <a:prstGeom prst="rect">
+            <a:avLst/>
+          </a:prstGeom>
+          <a:noFill/>
+          <a:ln>
+            <a:solidFill>
+              <a:schemeClr val="bg2">
+                <a:lumMod val="90000"/>
+              </a:schemeClr>
+            </a:solidFill>
+          </a:ln>
+        </p:spPr>
+        <p:txBody>
+          <a:bodyPr wrap="square" rtlCol="0" anchor="ctr" anchorCtr="1">
+            <a:spAutoFit/>
+          </a:bodyPr>
+          <a:lstStyle/>
+          <a:p>
+            <a:endParaRPr lang="en-US" dirty="0"/>
+          </a:p>
+        </p:txBody>
+      </p:sp>
+      <p:sp>
+        <p:nvSpPr>
+          <p:cNvPr id="8" name="Title 1">
+            <a:extLst>
+              <a:ext uri="{FF2B5EF4-FFF2-40B4-BE49-F238E27FC236}">
+                <a16:creationId xmlns:a16="http://schemas.microsoft.com/office/drawing/2014/main" id="{0CE643D2-A8DC-48EE-91C2-065ACE39FC10}"/>
+              </a:ext>
+            </a:extLst>
+          </p:cNvPr>
+          <p:cNvSpPr txBox="1">
+            <a:spLocks/>
+          </p:cNvSpPr>
+          <p:nvPr/>
+        </p:nvSpPr>
+        <p:spPr>
+          <a:xfrm>
+            <a:off x="0" y="142875"/>
+            <a:ext cx="5076967" cy="1179512"/>
+          </a:xfrm>
+          <a:prstGeom prst="rect">
+            <a:avLst/>
+          </a:prstGeom>
+        </p:spPr>
+        <p:txBody>
+          <a:bodyPr vert="horz" lIns="91440" tIns="45720" rIns="91440" bIns="45720" rtlCol="0" anchor="ctr">
+            <a:normAutofit/>
+          </a:bodyPr>
+          <a:lstStyle>
+            <a:lvl1pPr algn="l" defTabSz="914400" rtl="0" eaLnBrk="1" latinLnBrk="0" hangingPunct="1">
+              <a:spcBef>
+                <a:spcPct val="0"/>
+              </a:spcBef>
+              <a:buNone/>
+              <a:defRPr sz="4400" kern="1200">
+                <a:solidFill>
+                  <a:schemeClr val="accent2"/>
+                </a:solidFill>
+                <a:latin typeface="+mj-lt"/>
+                <a:ea typeface="+mj-ea"/>
+                <a:cs typeface="+mj-cs"/>
+              </a:defRPr>
+            </a:lvl1pPr>
+          </a:lstStyle>
+          <a:p>
+            <a:r>
+              <a:rPr lang="es-CO" sz="3200" dirty="0" err="1"/>
+              <a:t>World</a:t>
+            </a:r>
+            <a:r>
+              <a:rPr lang="es-CO" sz="3200" dirty="0"/>
+              <a:t> </a:t>
+            </a:r>
+            <a:r>
+              <a:rPr lang="es-CO" sz="3200" dirty="0" err="1"/>
+              <a:t>Happines</a:t>
+            </a:r>
+            <a:r>
+              <a:rPr lang="es-CO" sz="3200" dirty="0"/>
+              <a:t> </a:t>
+            </a:r>
+            <a:r>
+              <a:rPr lang="es-CO" sz="3200" dirty="0" err="1"/>
+              <a:t>Analysis</a:t>
+            </a:r>
+            <a:endParaRPr lang="en-US" sz="3000" dirty="0"/>
+          </a:p>
+        </p:txBody>
+      </p:sp>
+      <p:sp>
+        <p:nvSpPr>
+          <p:cNvPr id="10" name="Title 9">
+            <a:extLst>
+              <a:ext uri="{FF2B5EF4-FFF2-40B4-BE49-F238E27FC236}">
+                <a16:creationId xmlns:a16="http://schemas.microsoft.com/office/drawing/2014/main" id="{80C1BF82-0C4D-4BD3-BEF6-84BBAC2EB0B0}"/>
+              </a:ext>
+            </a:extLst>
+          </p:cNvPr>
+          <p:cNvSpPr>
+            <a:spLocks noGrp="1"/>
+          </p:cNvSpPr>
+          <p:nvPr>
+            <p:ph type="title"/>
+          </p:nvPr>
+        </p:nvSpPr>
+        <p:spPr>
+          <a:xfrm>
+            <a:off x="838200" y="1471095"/>
+            <a:ext cx="10515600" cy="645403"/>
+          </a:xfrm>
+        </p:spPr>
+        <p:txBody>
+          <a:bodyPr>
+            <a:normAutofit fontScale="90000"/>
+          </a:bodyPr>
+          <a:lstStyle/>
+          <a:p>
+            <a:r>
+              <a:rPr lang="en-US" dirty="0"/>
+              <a:t>Spotify – Use </a:t>
+            </a:r>
+            <a:r>
+              <a:rPr lang="en-US" dirty="0" err="1"/>
+              <a:t>Spotipy</a:t>
+            </a:r>
+            <a:r>
+              <a:rPr lang="en-US" dirty="0"/>
+              <a:t> API to classify songs</a:t>
+            </a:r>
+          </a:p>
+        </p:txBody>
+      </p:sp>
+      <p:sp>
+        <p:nvSpPr>
+          <p:cNvPr id="14" name="TextBox 13">
+            <a:extLst>
+              <a:ext uri="{FF2B5EF4-FFF2-40B4-BE49-F238E27FC236}">
+                <a16:creationId xmlns:a16="http://schemas.microsoft.com/office/drawing/2014/main" id="{7510C40A-D6D3-49FC-B295-118B59BA8E70}"/>
+              </a:ext>
+            </a:extLst>
+          </p:cNvPr>
+          <p:cNvSpPr txBox="1"/>
+          <p:nvPr/>
+        </p:nvSpPr>
+        <p:spPr>
+          <a:xfrm>
+            <a:off x="1490467" y="1999884"/>
+            <a:ext cx="8225329" cy="369332"/>
+          </a:xfrm>
+          <a:prstGeom prst="rect">
+            <a:avLst/>
+          </a:prstGeom>
+          <a:noFill/>
+          <a:ln>
+            <a:solidFill>
+              <a:schemeClr val="bg2">
+                <a:lumMod val="90000"/>
+              </a:schemeClr>
+            </a:solidFill>
+          </a:ln>
+        </p:spPr>
+        <p:txBody>
+          <a:bodyPr wrap="none" rtlCol="0" anchor="ctr" anchorCtr="1">
+            <a:spAutoFit/>
+          </a:bodyPr>
+          <a:lstStyle/>
+          <a:p>
+            <a:r>
+              <a:rPr lang="en-US" dirty="0"/>
+              <a:t>Looped each song collected. Final count were 66 countries and 60,000 songs. </a:t>
+            </a:r>
+          </a:p>
+        </p:txBody>
+      </p:sp>
+      <p:pic>
+        <p:nvPicPr>
+          <p:cNvPr id="9" name="Content Placeholder 8" descr="A screenshot of a cell phone&#10;&#10;Description automatically generated">
+            <a:extLst>
+              <a:ext uri="{FF2B5EF4-FFF2-40B4-BE49-F238E27FC236}">
+                <a16:creationId xmlns:a16="http://schemas.microsoft.com/office/drawing/2014/main" id="{71859A41-718F-47ED-9922-A0AC0109D1FF}"/>
+              </a:ext>
+            </a:extLst>
+          </p:cNvPr>
+          <p:cNvPicPr>
+            <a:picLocks noGrp="1" noChangeAspect="1"/>
+          </p:cNvPicPr>
+          <p:nvPr>
+            <p:ph idx="1"/>
+          </p:nvPr>
+        </p:nvPicPr>
+        <p:blipFill>
+          <a:blip r:embed="rId5" cstate="print">
+            <a:extLst>
+              <a:ext uri="{28A0092B-C50C-407E-A947-70E740481C1C}">
+                <a14:useLocalDpi xmlns:a14="http://schemas.microsoft.com/office/drawing/2010/main" val="0"/>
+              </a:ext>
+            </a:extLst>
+          </a:blip>
+          <a:stretch>
+            <a:fillRect/>
+          </a:stretch>
+        </p:blipFill>
+        <p:spPr>
+          <a:xfrm>
+            <a:off x="3709480" y="2369216"/>
+            <a:ext cx="4247745" cy="3906319"/>
+          </a:xfrm>
+        </p:spPr>
+      </p:pic>
+    </p:spTree>
+    <p:extLst>
+      <p:ext uri="{BB962C8B-B14F-4D97-AF65-F5344CB8AC3E}">
+        <p14:creationId xmlns:p14="http://schemas.microsoft.com/office/powerpoint/2010/main" val="555572706"/>
       </p:ext>
     </p:extLst>
   </p:cSld>
@@ -10672,27 +12914,41 @@
           <a:chExt cx="0" cy="0"/>
         </a:xfrm>
       </p:grpSpPr>
-      <p:sp>
-        <p:nvSpPr>
-          <p:cNvPr id="3" name="Content Placeholder 2"/>
-          <p:cNvSpPr>
-            <a:spLocks noGrp="1"/>
-          </p:cNvSpPr>
+      <p:pic>
+        <p:nvPicPr>
+          <p:cNvPr id="5" name="Content Placeholder 4" descr="A screenshot of a cell phone&#10;&#10;Description automatically generated">
+            <a:extLst>
+              <a:ext uri="{FF2B5EF4-FFF2-40B4-BE49-F238E27FC236}">
+                <a16:creationId xmlns:a16="http://schemas.microsoft.com/office/drawing/2014/main" id="{DC7C85E5-6604-4226-BBCA-D35ACAF135F8}"/>
+              </a:ext>
+            </a:extLst>
+          </p:cNvPr>
+          <p:cNvPicPr>
+            <a:picLocks noGrp="1" noChangeAspect="1"/>
+          </p:cNvPicPr>
           <p:nvPr>
             <p:ph idx="1"/>
           </p:nvPr>
-        </p:nvSpPr>
-        <p:spPr/>
-        <p:txBody>
-          <a:bodyPr>
-            <a:normAutofit/>
-          </a:bodyPr>
-          <a:lstStyle/>
-          <a:p>
-            <a:endParaRPr lang="en-US" dirty="0"/>
-          </a:p>
-        </p:txBody>
-      </p:sp>
+        </p:nvPicPr>
+        <p:blipFill>
+          <a:blip r:embed="rId3">
+            <a:extLst>
+              <a:ext uri="{28A0092B-C50C-407E-A947-70E740481C1C}">
+                <a14:useLocalDpi xmlns:a14="http://schemas.microsoft.com/office/drawing/2010/main" val="0"/>
+              </a:ext>
+            </a:extLst>
+          </a:blip>
+          <a:stretch>
+            <a:fillRect/>
+          </a:stretch>
+        </p:blipFill>
+        <p:spPr>
+          <a:xfrm>
+            <a:off x="3352175" y="2424490"/>
+            <a:ext cx="5487650" cy="3658433"/>
+          </a:xfrm>
+        </p:spPr>
+      </p:pic>
       <p:sp>
         <p:nvSpPr>
           <p:cNvPr id="2" name="Title 1"/>
@@ -10895,11 +13151,11 @@
           <p:nvPr/>
         </p:nvPicPr>
         <p:blipFill>
-          <a:blip r:embed="rId3">
+          <a:blip r:embed="rId4">
             <a:extLst>
               <a:ext uri="{BEBA8EAE-BF5A-486C-A8C5-ECC9F3942E4B}">
                 <a14:imgProps xmlns:a14="http://schemas.microsoft.com/office/drawing/2010/main">
-                  <a14:imgLayer r:embed="rId4">
+                  <a14:imgLayer r:embed="rId5">
                     <a14:imgEffect>
                       <a14:saturation sat="0"/>
                     </a14:imgEffect>
@@ -11868,15 +14124,6 @@
 </file>
 
 <file path=customXml/item1.xml><?xml version="1.0" encoding="utf-8"?>
-<?mso-contentType ?>
-<FormTemplates xmlns="http://schemas.microsoft.com/sharepoint/v3/contenttype/forms">
-  <Display>DocumentLibraryForm</Display>
-  <Edit>AssetEditForm</Edit>
-  <New>DocumentLibraryForm</New>
-</FormTemplates>
-</file>
-
-<file path=customXml/item2.xml><?xml version="1.0" encoding="utf-8"?>
 <p:properties xmlns:p="http://schemas.microsoft.com/office/2006/metadata/properties" xmlns:xsi="http://www.w3.org/2001/XMLSchema-instance" xmlns:pc="http://schemas.microsoft.com/office/infopath/2007/PartnerControls">
   <documentManagement>
     <APDescription xmlns="4873beb7-5857-4685-be1f-d57550cc96cc" xsi:nil="true"/>
@@ -12000,6 +14247,15 @@
     <UANotes xmlns="4873beb7-5857-4685-be1f-d57550cc96cc" xsi:nil="true"/>
   </documentManagement>
 </p:properties>
+</file>
+
+<file path=customXml/item2.xml><?xml version="1.0" encoding="utf-8"?>
+<?mso-contentType ?>
+<FormTemplates xmlns="http://schemas.microsoft.com/sharepoint/v3/contenttype/forms">
+  <Display>DocumentLibraryForm</Display>
+  <Edit>AssetEditForm</Edit>
+  <New>DocumentLibraryForm</New>
+</FormTemplates>
 </file>
 
 <file path=customXml/item3.xml><?xml version="1.0" encoding="utf-8"?>
@@ -13043,14 +15299,6 @@
 </file>
 
 <file path=customXml/itemProps1.xml><?xml version="1.0" encoding="utf-8"?>
-<ds:datastoreItem xmlns:ds="http://schemas.openxmlformats.org/officeDocument/2006/customXml" ds:itemID="{DCE864F3-A1EC-4046-9110-1C72B133CC3C}">
-  <ds:schemaRefs>
-    <ds:schemaRef ds:uri="http://schemas.microsoft.com/sharepoint/v3/contenttype/forms"/>
-  </ds:schemaRefs>
-</ds:datastoreItem>
-</file>
-
-<file path=customXml/itemProps2.xml><?xml version="1.0" encoding="utf-8"?>
 <ds:datastoreItem xmlns:ds="http://schemas.openxmlformats.org/officeDocument/2006/customXml" ds:itemID="{8EF0CB1D-80F7-4EA9-8A4A-0886922580CB}">
   <ds:schemaRefs>
     <ds:schemaRef ds:uri="http://schemas.microsoft.com/office/2006/metadata/properties"/>
@@ -13062,6 +15310,14 @@
     <ds:schemaRef ds:uri="http://schemas.microsoft.com/office/infopath/2007/PartnerControls"/>
     <ds:schemaRef ds:uri="http://purl.org/dc/terms/"/>
     <ds:schemaRef ds:uri="4873beb7-5857-4685-be1f-d57550cc96cc"/>
+  </ds:schemaRefs>
+</ds:datastoreItem>
+</file>
+
+<file path=customXml/itemProps2.xml><?xml version="1.0" encoding="utf-8"?>
+<ds:datastoreItem xmlns:ds="http://schemas.openxmlformats.org/officeDocument/2006/customXml" ds:itemID="{DCE864F3-A1EC-4046-9110-1C72B133CC3C}">
+  <ds:schemaRefs>
+    <ds:schemaRef ds:uri="http://schemas.microsoft.com/sharepoint/v3/contenttype/forms"/>
   </ds:schemaRefs>
 </ds:datastoreItem>
 </file>

</xml_diff>

<commit_message>
PP Finalizing Spotify Slides
</commit_message>
<xml_diff>
--- a/World Happiness Analysis- Group 4 Final Presentation.pptx
+++ b/World Happiness Analysis- Group 4 Final Presentation.pptx
@@ -5,31 +5,30 @@
     <p:sldMasterId id="2147483697" r:id="rId4"/>
   </p:sldMasterIdLst>
   <p:notesMasterIdLst>
-    <p:notesMasterId r:id="rId24"/>
+    <p:notesMasterId r:id="rId23"/>
   </p:notesMasterIdLst>
   <p:handoutMasterIdLst>
-    <p:handoutMasterId r:id="rId25"/>
+    <p:handoutMasterId r:id="rId24"/>
   </p:handoutMasterIdLst>
   <p:sldIdLst>
     <p:sldId id="289" r:id="rId5"/>
     <p:sldId id="291" r:id="rId6"/>
     <p:sldId id="323" r:id="rId7"/>
-    <p:sldId id="324" r:id="rId8"/>
-    <p:sldId id="327" r:id="rId9"/>
-    <p:sldId id="336" r:id="rId10"/>
-    <p:sldId id="335" r:id="rId11"/>
-    <p:sldId id="328" r:id="rId12"/>
-    <p:sldId id="325" r:id="rId13"/>
-    <p:sldId id="330" r:id="rId14"/>
-    <p:sldId id="331" r:id="rId15"/>
-    <p:sldId id="329" r:id="rId16"/>
-    <p:sldId id="333" r:id="rId17"/>
-    <p:sldId id="334" r:id="rId18"/>
-    <p:sldId id="337" r:id="rId19"/>
-    <p:sldId id="338" r:id="rId20"/>
-    <p:sldId id="339" r:id="rId21"/>
-    <p:sldId id="315" r:id="rId22"/>
-    <p:sldId id="340" r:id="rId23"/>
+    <p:sldId id="336" r:id="rId8"/>
+    <p:sldId id="335" r:id="rId9"/>
+    <p:sldId id="324" r:id="rId10"/>
+    <p:sldId id="328" r:id="rId11"/>
+    <p:sldId id="325" r:id="rId12"/>
+    <p:sldId id="330" r:id="rId13"/>
+    <p:sldId id="331" r:id="rId14"/>
+    <p:sldId id="329" r:id="rId15"/>
+    <p:sldId id="333" r:id="rId16"/>
+    <p:sldId id="334" r:id="rId17"/>
+    <p:sldId id="337" r:id="rId18"/>
+    <p:sldId id="338" r:id="rId19"/>
+    <p:sldId id="339" r:id="rId20"/>
+    <p:sldId id="315" r:id="rId21"/>
+    <p:sldId id="340" r:id="rId22"/>
   </p:sldIdLst>
   <p:sldSz cx="12192000" cy="6858000"/>
   <p:notesSz cx="6858000" cy="9144000"/>
@@ -811,7 +810,7 @@
     </p:spTree>
     <p:extLst>
       <p:ext uri="{BB962C8B-B14F-4D97-AF65-F5344CB8AC3E}">
-        <p14:creationId xmlns:p14="http://schemas.microsoft.com/office/powerpoint/2010/main" val="2320356112"/>
+        <p14:creationId xmlns:p14="http://schemas.microsoft.com/office/powerpoint/2010/main" val="2179791780"/>
       </p:ext>
     </p:extLst>
   </p:cSld>
@@ -895,7 +894,7 @@
     </p:spTree>
     <p:extLst>
       <p:ext uri="{BB962C8B-B14F-4D97-AF65-F5344CB8AC3E}">
-        <p14:creationId xmlns:p14="http://schemas.microsoft.com/office/powerpoint/2010/main" val="2179791780"/>
+        <p14:creationId xmlns:p14="http://schemas.microsoft.com/office/powerpoint/2010/main" val="3532561459"/>
       </p:ext>
     </p:extLst>
   </p:cSld>
@@ -979,7 +978,7 @@
     </p:spTree>
     <p:extLst>
       <p:ext uri="{BB962C8B-B14F-4D97-AF65-F5344CB8AC3E}">
-        <p14:creationId xmlns:p14="http://schemas.microsoft.com/office/powerpoint/2010/main" val="3532561459"/>
+        <p14:creationId xmlns:p14="http://schemas.microsoft.com/office/powerpoint/2010/main" val="978155930"/>
       </p:ext>
     </p:extLst>
   </p:cSld>
@@ -1063,7 +1062,7 @@
     </p:spTree>
     <p:extLst>
       <p:ext uri="{BB962C8B-B14F-4D97-AF65-F5344CB8AC3E}">
-        <p14:creationId xmlns:p14="http://schemas.microsoft.com/office/powerpoint/2010/main" val="978155930"/>
+        <p14:creationId xmlns:p14="http://schemas.microsoft.com/office/powerpoint/2010/main" val="2758602653"/>
       </p:ext>
     </p:extLst>
   </p:cSld>
@@ -1147,7 +1146,7 @@
     </p:spTree>
     <p:extLst>
       <p:ext uri="{BB962C8B-B14F-4D97-AF65-F5344CB8AC3E}">
-        <p14:creationId xmlns:p14="http://schemas.microsoft.com/office/powerpoint/2010/main" val="2758602653"/>
+        <p14:creationId xmlns:p14="http://schemas.microsoft.com/office/powerpoint/2010/main" val="970064993"/>
       </p:ext>
     </p:extLst>
   </p:cSld>
@@ -1231,7 +1230,7 @@
     </p:spTree>
     <p:extLst>
       <p:ext uri="{BB962C8B-B14F-4D97-AF65-F5344CB8AC3E}">
-        <p14:creationId xmlns:p14="http://schemas.microsoft.com/office/powerpoint/2010/main" val="970064993"/>
+        <p14:creationId xmlns:p14="http://schemas.microsoft.com/office/powerpoint/2010/main" val="1570823943"/>
       </p:ext>
     </p:extLst>
   </p:cSld>
@@ -1315,7 +1314,7 @@
     </p:spTree>
     <p:extLst>
       <p:ext uri="{BB962C8B-B14F-4D97-AF65-F5344CB8AC3E}">
-        <p14:creationId xmlns:p14="http://schemas.microsoft.com/office/powerpoint/2010/main" val="1570823943"/>
+        <p14:creationId xmlns:p14="http://schemas.microsoft.com/office/powerpoint/2010/main" val="1563162935"/>
       </p:ext>
     </p:extLst>
   </p:cSld>
@@ -1380,7 +1379,7 @@
             <a:spLocks noGrp="1"/>
           </p:cNvSpPr>
           <p:nvPr>
-            <p:ph type="sldNum" sz="quarter" idx="10"/>
+            <p:ph type="sldNum" sz="quarter" idx="5"/>
           </p:nvPr>
         </p:nvSpPr>
         <p:spPr/>
@@ -1399,7 +1398,7 @@
     </p:spTree>
     <p:extLst>
       <p:ext uri="{BB962C8B-B14F-4D97-AF65-F5344CB8AC3E}">
-        <p14:creationId xmlns:p14="http://schemas.microsoft.com/office/powerpoint/2010/main" val="1563162935"/>
+        <p14:creationId xmlns:p14="http://schemas.microsoft.com/office/powerpoint/2010/main" val="1486313915"/>
       </p:ext>
     </p:extLst>
   </p:cSld>
@@ -1475,90 +1474,6 @@
             <a:fld id="{D2D22BCB-3FB0-4AD6-9692-BE008A8F6B96}" type="slidenum">
               <a:rPr lang="en-US" smtClean="0"/>
               <a:t>18</a:t>
-            </a:fld>
-            <a:endParaRPr lang="en-US"/>
-          </a:p>
-        </p:txBody>
-      </p:sp>
-    </p:spTree>
-    <p:extLst>
-      <p:ext uri="{BB962C8B-B14F-4D97-AF65-F5344CB8AC3E}">
-        <p14:creationId xmlns:p14="http://schemas.microsoft.com/office/powerpoint/2010/main" val="1486313915"/>
-      </p:ext>
-    </p:extLst>
-  </p:cSld>
-  <p:clrMapOvr>
-    <a:masterClrMapping/>
-  </p:clrMapOvr>
-</p:notes>
-</file>
-
-<file path=ppt/notesSlides/notesSlide19.xml><?xml version="1.0" encoding="utf-8"?>
-<p:notes xmlns:a="http://schemas.openxmlformats.org/drawingml/2006/main" xmlns:r="http://schemas.openxmlformats.org/officeDocument/2006/relationships" xmlns:p="http://schemas.openxmlformats.org/presentationml/2006/main">
-  <p:cSld>
-    <p:spTree>
-      <p:nvGrpSpPr>
-        <p:cNvPr id="1" name=""/>
-        <p:cNvGrpSpPr/>
-        <p:nvPr/>
-      </p:nvGrpSpPr>
-      <p:grpSpPr>
-        <a:xfrm>
-          <a:off x="0" y="0"/>
-          <a:ext cx="0" cy="0"/>
-          <a:chOff x="0" y="0"/>
-          <a:chExt cx="0" cy="0"/>
-        </a:xfrm>
-      </p:grpSpPr>
-      <p:sp>
-        <p:nvSpPr>
-          <p:cNvPr id="2" name="Slide Image Placeholder 1"/>
-          <p:cNvSpPr>
-            <a:spLocks noGrp="1" noRot="1" noChangeAspect="1"/>
-          </p:cNvSpPr>
-          <p:nvPr>
-            <p:ph type="sldImg"/>
-          </p:nvPr>
-        </p:nvSpPr>
-        <p:spPr/>
-      </p:sp>
-      <p:sp>
-        <p:nvSpPr>
-          <p:cNvPr id="3" name="Notes Placeholder 2"/>
-          <p:cNvSpPr>
-            <a:spLocks noGrp="1"/>
-          </p:cNvSpPr>
-          <p:nvPr>
-            <p:ph type="body" idx="1"/>
-          </p:nvPr>
-        </p:nvSpPr>
-        <p:spPr/>
-        <p:txBody>
-          <a:bodyPr/>
-          <a:lstStyle/>
-          <a:p>
-            <a:endParaRPr lang="en-US" dirty="0"/>
-          </a:p>
-        </p:txBody>
-      </p:sp>
-      <p:sp>
-        <p:nvSpPr>
-          <p:cNvPr id="4" name="Slide Number Placeholder 3"/>
-          <p:cNvSpPr>
-            <a:spLocks noGrp="1"/>
-          </p:cNvSpPr>
-          <p:nvPr>
-            <p:ph type="sldNum" sz="quarter" idx="5"/>
-          </p:nvPr>
-        </p:nvSpPr>
-        <p:spPr/>
-        <p:txBody>
-          <a:bodyPr/>
-          <a:lstStyle/>
-          <a:p>
-            <a:fld id="{D2D22BCB-3FB0-4AD6-9692-BE008A8F6B96}" type="slidenum">
-              <a:rPr lang="en-US" smtClean="0"/>
-              <a:t>19</a:t>
             </a:fld>
             <a:endParaRPr lang="en-US"/>
           </a:p>
@@ -1819,7 +1734,7 @@
     </p:spTree>
     <p:extLst>
       <p:ext uri="{BB962C8B-B14F-4D97-AF65-F5344CB8AC3E}">
-        <p14:creationId xmlns:p14="http://schemas.microsoft.com/office/powerpoint/2010/main" val="1942583862"/>
+        <p14:creationId xmlns:p14="http://schemas.microsoft.com/office/powerpoint/2010/main" val="1579385004"/>
       </p:ext>
     </p:extLst>
   </p:cSld>
@@ -1903,7 +1818,7 @@
     </p:spTree>
     <p:extLst>
       <p:ext uri="{BB962C8B-B14F-4D97-AF65-F5344CB8AC3E}">
-        <p14:creationId xmlns:p14="http://schemas.microsoft.com/office/powerpoint/2010/main" val="1853965941"/>
+        <p14:creationId xmlns:p14="http://schemas.microsoft.com/office/powerpoint/2010/main" val="2110531827"/>
       </p:ext>
     </p:extLst>
   </p:cSld>
@@ -1987,7 +1902,7 @@
     </p:spTree>
     <p:extLst>
       <p:ext uri="{BB962C8B-B14F-4D97-AF65-F5344CB8AC3E}">
-        <p14:creationId xmlns:p14="http://schemas.microsoft.com/office/powerpoint/2010/main" val="1579385004"/>
+        <p14:creationId xmlns:p14="http://schemas.microsoft.com/office/powerpoint/2010/main" val="1942583862"/>
       </p:ext>
     </p:extLst>
   </p:cSld>
@@ -2071,7 +1986,7 @@
     </p:spTree>
     <p:extLst>
       <p:ext uri="{BB962C8B-B14F-4D97-AF65-F5344CB8AC3E}">
-        <p14:creationId xmlns:p14="http://schemas.microsoft.com/office/powerpoint/2010/main" val="2110531827"/>
+        <p14:creationId xmlns:p14="http://schemas.microsoft.com/office/powerpoint/2010/main" val="1333210431"/>
       </p:ext>
     </p:extLst>
   </p:cSld>
@@ -2155,7 +2070,7 @@
     </p:spTree>
     <p:extLst>
       <p:ext uri="{BB962C8B-B14F-4D97-AF65-F5344CB8AC3E}">
-        <p14:creationId xmlns:p14="http://schemas.microsoft.com/office/powerpoint/2010/main" val="1333210431"/>
+        <p14:creationId xmlns:p14="http://schemas.microsoft.com/office/powerpoint/2010/main" val="1581764307"/>
       </p:ext>
     </p:extLst>
   </p:cSld>
@@ -2239,7 +2154,7 @@
     </p:spTree>
     <p:extLst>
       <p:ext uri="{BB962C8B-B14F-4D97-AF65-F5344CB8AC3E}">
-        <p14:creationId xmlns:p14="http://schemas.microsoft.com/office/powerpoint/2010/main" val="1581764307"/>
+        <p14:creationId xmlns:p14="http://schemas.microsoft.com/office/powerpoint/2010/main" val="2320356112"/>
       </p:ext>
     </p:extLst>
   </p:cSld>
@@ -5550,23 +5465,23 @@
             </a:r>
             <a:r>
               <a:rPr lang="es-CO" dirty="0"/>
-              <a:t> are </a:t>
+              <a:t> Are </a:t>
             </a:r>
             <a:r>
               <a:rPr lang="es-CO" dirty="0" err="1"/>
-              <a:t>the</a:t>
+              <a:t>The</a:t>
             </a:r>
             <a:r>
               <a:rPr lang="es-CO" dirty="0"/>
-              <a:t> drivers </a:t>
+              <a:t> Drivers </a:t>
             </a:r>
             <a:r>
               <a:rPr lang="es-CO" dirty="0" err="1"/>
-              <a:t>of</a:t>
+              <a:t>Of</a:t>
             </a:r>
             <a:r>
               <a:rPr lang="es-CO" dirty="0"/>
-              <a:t> a </a:t>
+              <a:t> A </a:t>
             </a:r>
             <a:r>
               <a:rPr lang="es-CO" dirty="0" err="1"/>
@@ -5578,7 +5493,7 @@
             </a:r>
             <a:r>
               <a:rPr lang="es-CO" dirty="0" err="1"/>
-              <a:t>happiness</a:t>
+              <a:t>Happiness</a:t>
             </a:r>
             <a:r>
               <a:rPr lang="es-CO" dirty="0"/>
@@ -5747,13 +5662,8 @@
           <a:p>
             <a:r>
               <a:rPr lang="en-US" dirty="0"/>
-              <a:t>Exploration &amp; Analysis – </a:t>
-            </a:r>
-            <a:r>
-              <a:rPr lang="en-US" dirty="0" err="1"/>
-              <a:t>Wheather</a:t>
-            </a:r>
-            <a:endParaRPr lang="en-US" dirty="0"/>
+              <a:t>Exploration &amp; Analysis – Tourism</a:t>
+            </a:r>
           </a:p>
         </p:txBody>
       </p:sp>
@@ -6034,7 +5944,7 @@
     </p:spTree>
     <p:extLst>
       <p:ext uri="{BB962C8B-B14F-4D97-AF65-F5344CB8AC3E}">
-        <p14:creationId xmlns:p14="http://schemas.microsoft.com/office/powerpoint/2010/main" val="256757830"/>
+        <p14:creationId xmlns:p14="http://schemas.microsoft.com/office/powerpoint/2010/main" val="1512106024"/>
       </p:ext>
     </p:extLst>
   </p:cSld>
@@ -6118,7 +6028,7 @@
           <a:p>
             <a:r>
               <a:rPr lang="en-US" dirty="0"/>
-              <a:t>Exploration &amp; Analysis – Tourism</a:t>
+              <a:t>Exploration &amp; Analysis - Athletics</a:t>
             </a:r>
           </a:p>
         </p:txBody>
@@ -6400,7 +6310,7 @@
     </p:spTree>
     <p:extLst>
       <p:ext uri="{BB962C8B-B14F-4D97-AF65-F5344CB8AC3E}">
-        <p14:creationId xmlns:p14="http://schemas.microsoft.com/office/powerpoint/2010/main" val="1512106024"/>
+        <p14:creationId xmlns:p14="http://schemas.microsoft.com/office/powerpoint/2010/main" val="774039450"/>
       </p:ext>
     </p:extLst>
   </p:cSld>
@@ -6484,7 +6394,7 @@
           <a:p>
             <a:r>
               <a:rPr lang="en-US" dirty="0"/>
-              <a:t>Exploration &amp; Analysis - Athletics</a:t>
+              <a:t>Exploration &amp; Analysis – Economic Indicators</a:t>
             </a:r>
           </a:p>
         </p:txBody>
@@ -6766,7 +6676,7 @@
     </p:spTree>
     <p:extLst>
       <p:ext uri="{BB962C8B-B14F-4D97-AF65-F5344CB8AC3E}">
-        <p14:creationId xmlns:p14="http://schemas.microsoft.com/office/powerpoint/2010/main" val="774039450"/>
+        <p14:creationId xmlns:p14="http://schemas.microsoft.com/office/powerpoint/2010/main" val="440450912"/>
       </p:ext>
     </p:extLst>
   </p:cSld>
@@ -6815,14 +6725,116 @@
             <p:ph idx="1"/>
           </p:nvPr>
         </p:nvSpPr>
-        <p:spPr/>
+        <p:spPr>
+          <a:xfrm>
+            <a:off x="838200" y="2308699"/>
+            <a:ext cx="10515600" cy="3863502"/>
+          </a:xfrm>
+        </p:spPr>
         <p:txBody>
           <a:bodyPr>
             <a:normAutofit/>
           </a:bodyPr>
           <a:lstStyle/>
           <a:p>
+            <a:r>
+              <a:rPr lang="en-US" dirty="0"/>
+              <a:t>Three step process:</a:t>
+            </a:r>
+          </a:p>
+          <a:p>
+            <a:pPr lvl="1"/>
+            <a:r>
+              <a:rPr lang="en-US" dirty="0"/>
+              <a:t>Collect the top songs for different countries.</a:t>
+            </a:r>
+          </a:p>
+          <a:p>
+            <a:pPr lvl="2"/>
+            <a:r>
+              <a:rPr lang="en-US" dirty="0"/>
+              <a:t>Made a list of countries and dates to search for their top 200 songs. Chose to select one day a month for 66 countries that were available in </a:t>
+            </a:r>
+            <a:r>
+              <a:rPr lang="en-US" dirty="0" err="1"/>
+              <a:t>SpotifyCharts</a:t>
+            </a:r>
             <a:endParaRPr lang="en-US" dirty="0"/>
+          </a:p>
+          <a:p>
+            <a:pPr lvl="2"/>
+            <a:r>
+              <a:rPr lang="en-US" dirty="0"/>
+              <a:t>The </a:t>
+            </a:r>
+            <a:r>
+              <a:rPr lang="en-US" dirty="0" err="1"/>
+              <a:t>Api</a:t>
+            </a:r>
+            <a:r>
+              <a:rPr lang="en-US" dirty="0"/>
+              <a:t> does not allow for this, so we used some one else’s code. Installed a the code into PythonData</a:t>
+            </a:r>
+          </a:p>
+          <a:p>
+            <a:pPr lvl="2"/>
+            <a:r>
+              <a:rPr lang="en-US" dirty="0"/>
+              <a:t>Saved the results into a </a:t>
+            </a:r>
+            <a:r>
+              <a:rPr lang="en-US" dirty="0" err="1"/>
+              <a:t>cvs</a:t>
+            </a:r>
+            <a:r>
+              <a:rPr lang="en-US" dirty="0"/>
+              <a:t> file</a:t>
+            </a:r>
+          </a:p>
+          <a:p>
+            <a:pPr lvl="1"/>
+            <a:r>
+              <a:rPr lang="en-US" dirty="0"/>
+              <a:t>Classify each songs happiness, energy, danceability and </a:t>
+            </a:r>
+            <a:r>
+              <a:rPr lang="en-US" dirty="0" err="1"/>
+              <a:t>speechiness</a:t>
+            </a:r>
+            <a:r>
+              <a:rPr lang="en-US" dirty="0"/>
+              <a:t>.</a:t>
+            </a:r>
+          </a:p>
+          <a:p>
+            <a:pPr lvl="2"/>
+            <a:r>
+              <a:rPr lang="en-US" dirty="0"/>
+              <a:t>Used the </a:t>
+            </a:r>
+            <a:r>
+              <a:rPr lang="en-US" dirty="0" err="1"/>
+              <a:t>spotify</a:t>
+            </a:r>
+            <a:r>
+              <a:rPr lang="en-US" dirty="0"/>
+              <a:t> API for python called </a:t>
+            </a:r>
+            <a:r>
+              <a:rPr lang="en-US" dirty="0" err="1"/>
+              <a:t>Spotipy</a:t>
+            </a:r>
+            <a:r>
+              <a:rPr lang="en-US" dirty="0"/>
+              <a:t>. Classified each song collected.</a:t>
+            </a:r>
+          </a:p>
+          <a:p>
+            <a:pPr lvl="1"/>
+            <a:r>
+              <a:rPr lang="en-US" dirty="0"/>
+              <a:t>Compare against the World Happiness Index.</a:t>
+            </a:r>
           </a:p>
         </p:txBody>
       </p:sp>
@@ -6850,7 +6862,7 @@
           <a:p>
             <a:r>
               <a:rPr lang="en-US" dirty="0"/>
-              <a:t>Exploration &amp; Analysis – Economic Indicators</a:t>
+              <a:t>Exploration &amp; Analysis – Musical expression</a:t>
             </a:r>
           </a:p>
         </p:txBody>
@@ -6978,43 +6990,7 @@
                   </a:outerShdw>
                 </a:effectLst>
               </a:rPr>
-              <a:t> |   </a:t>
-            </a:r>
-            <a:r>
-              <a:rPr lang="en-US" dirty="0" err="1">
-                <a:ln w="0"/>
-                <a:solidFill>
-                  <a:schemeClr val="bg1">
-                    <a:lumMod val="65000"/>
-                  </a:schemeClr>
-                </a:solidFill>
-                <a:effectLst>
-                  <a:outerShdw blurRad="38100" dist="25400" dir="5400000" algn="ctr" rotWithShape="0">
-                    <a:srgbClr val="6E747A">
-                      <a:alpha val="43000"/>
-                    </a:srgbClr>
-                  </a:outerShdw>
-                </a:effectLst>
-              </a:rPr>
-              <a:t>Discusion</a:t>
-            </a:r>
-            <a:r>
-              <a:rPr lang="en-US" dirty="0">
-                <a:ln w="0"/>
-                <a:solidFill>
-                  <a:schemeClr val="bg1">
-                    <a:lumMod val="65000"/>
-                  </a:schemeClr>
-                </a:solidFill>
-                <a:effectLst>
-                  <a:outerShdw blurRad="38100" dist="25400" dir="5400000" algn="ctr" rotWithShape="0">
-                    <a:srgbClr val="6E747A">
-                      <a:alpha val="43000"/>
-                    </a:srgbClr>
-                  </a:outerShdw>
-                </a:effectLst>
-              </a:rPr>
-              <a:t>  |  </a:t>
+              <a:t> |   Discussion  |  </a:t>
             </a:r>
           </a:p>
         </p:txBody>
@@ -7132,7 +7108,7 @@
     </p:spTree>
     <p:extLst>
       <p:ext uri="{BB962C8B-B14F-4D97-AF65-F5344CB8AC3E}">
-        <p14:creationId xmlns:p14="http://schemas.microsoft.com/office/powerpoint/2010/main" val="440450912"/>
+        <p14:creationId xmlns:p14="http://schemas.microsoft.com/office/powerpoint/2010/main" val="2132611421"/>
       </p:ext>
     </p:extLst>
   </p:cSld>
@@ -7155,438 +7131,6 @@
 </file>
 
 <file path=ppt/slides/slide14.xml><?xml version="1.0" encoding="utf-8"?>
-<p:sld xmlns:a="http://schemas.openxmlformats.org/drawingml/2006/main" xmlns:r="http://schemas.openxmlformats.org/officeDocument/2006/relationships" xmlns:p="http://schemas.openxmlformats.org/presentationml/2006/main">
-  <p:cSld>
-    <p:spTree>
-      <p:nvGrpSpPr>
-        <p:cNvPr id="1" name=""/>
-        <p:cNvGrpSpPr/>
-        <p:nvPr/>
-      </p:nvGrpSpPr>
-      <p:grpSpPr>
-        <a:xfrm>
-          <a:off x="0" y="0"/>
-          <a:ext cx="0" cy="0"/>
-          <a:chOff x="0" y="0"/>
-          <a:chExt cx="0" cy="0"/>
-        </a:xfrm>
-      </p:grpSpPr>
-      <p:sp>
-        <p:nvSpPr>
-          <p:cNvPr id="3" name="Content Placeholder 2"/>
-          <p:cNvSpPr>
-            <a:spLocks noGrp="1"/>
-          </p:cNvSpPr>
-          <p:nvPr>
-            <p:ph idx="1"/>
-          </p:nvPr>
-        </p:nvSpPr>
-        <p:spPr>
-          <a:xfrm>
-            <a:off x="838200" y="2308699"/>
-            <a:ext cx="10515600" cy="3863502"/>
-          </a:xfrm>
-        </p:spPr>
-        <p:txBody>
-          <a:bodyPr>
-            <a:normAutofit/>
-          </a:bodyPr>
-          <a:lstStyle/>
-          <a:p>
-            <a:r>
-              <a:rPr lang="en-US" dirty="0"/>
-              <a:t>Three step process:</a:t>
-            </a:r>
-          </a:p>
-          <a:p>
-            <a:pPr lvl="1"/>
-            <a:r>
-              <a:rPr lang="en-US" dirty="0"/>
-              <a:t>Collect the top songs for different countries.</a:t>
-            </a:r>
-          </a:p>
-          <a:p>
-            <a:pPr lvl="2"/>
-            <a:r>
-              <a:rPr lang="en-US" dirty="0"/>
-              <a:t>Made a list of countries and dates to search for their top 200 songs. Chose to select one day a month for 66 countries that were available in </a:t>
-            </a:r>
-            <a:r>
-              <a:rPr lang="en-US" dirty="0" err="1"/>
-              <a:t>SpotifyCharts</a:t>
-            </a:r>
-            <a:endParaRPr lang="en-US" dirty="0"/>
-          </a:p>
-          <a:p>
-            <a:pPr lvl="2"/>
-            <a:r>
-              <a:rPr lang="en-US" dirty="0"/>
-              <a:t>The </a:t>
-            </a:r>
-            <a:r>
-              <a:rPr lang="en-US" dirty="0" err="1"/>
-              <a:t>Api</a:t>
-            </a:r>
-            <a:r>
-              <a:rPr lang="en-US" dirty="0"/>
-              <a:t> does not allow for this, so we used some one else’s code. Installed a the code into PythonData</a:t>
-            </a:r>
-          </a:p>
-          <a:p>
-            <a:pPr lvl="2"/>
-            <a:r>
-              <a:rPr lang="en-US" dirty="0"/>
-              <a:t>Saved the results into a </a:t>
-            </a:r>
-            <a:r>
-              <a:rPr lang="en-US" dirty="0" err="1"/>
-              <a:t>cvs</a:t>
-            </a:r>
-            <a:r>
-              <a:rPr lang="en-US" dirty="0"/>
-              <a:t> file</a:t>
-            </a:r>
-          </a:p>
-          <a:p>
-            <a:pPr lvl="1"/>
-            <a:r>
-              <a:rPr lang="en-US" dirty="0"/>
-              <a:t>Classify each songs happiness, energy, danceability and </a:t>
-            </a:r>
-            <a:r>
-              <a:rPr lang="en-US" dirty="0" err="1"/>
-              <a:t>speechiness</a:t>
-            </a:r>
-            <a:r>
-              <a:rPr lang="en-US" dirty="0"/>
-              <a:t>.</a:t>
-            </a:r>
-          </a:p>
-          <a:p>
-            <a:pPr lvl="2"/>
-            <a:r>
-              <a:rPr lang="en-US" dirty="0"/>
-              <a:t>Used the </a:t>
-            </a:r>
-            <a:r>
-              <a:rPr lang="en-US" dirty="0" err="1"/>
-              <a:t>spotify</a:t>
-            </a:r>
-            <a:r>
-              <a:rPr lang="en-US" dirty="0"/>
-              <a:t> API for python called </a:t>
-            </a:r>
-            <a:r>
-              <a:rPr lang="en-US" dirty="0" err="1"/>
-              <a:t>Spotipy</a:t>
-            </a:r>
-            <a:r>
-              <a:rPr lang="en-US" dirty="0"/>
-              <a:t>. Classified each song collected.</a:t>
-            </a:r>
-          </a:p>
-          <a:p>
-            <a:pPr lvl="1"/>
-            <a:r>
-              <a:rPr lang="en-US" dirty="0"/>
-              <a:t>Compare against the World Happiness Index.</a:t>
-            </a:r>
-          </a:p>
-        </p:txBody>
-      </p:sp>
-      <p:sp>
-        <p:nvSpPr>
-          <p:cNvPr id="2" name="Title 1"/>
-          <p:cNvSpPr>
-            <a:spLocks noGrp="1"/>
-          </p:cNvSpPr>
-          <p:nvPr>
-            <p:ph type="title"/>
-          </p:nvPr>
-        </p:nvSpPr>
-        <p:spPr>
-          <a:xfrm>
-            <a:off x="838200" y="1682750"/>
-            <a:ext cx="10515600" cy="535011"/>
-          </a:xfrm>
-        </p:spPr>
-        <p:txBody>
-          <a:bodyPr>
-            <a:normAutofit fontScale="90000"/>
-          </a:bodyPr>
-          <a:lstStyle/>
-          <a:p>
-            <a:r>
-              <a:rPr lang="en-US" dirty="0"/>
-              <a:t>Exploration &amp; Analysis – Musical expression</a:t>
-            </a:r>
-          </a:p>
-        </p:txBody>
-      </p:sp>
-      <p:sp>
-        <p:nvSpPr>
-          <p:cNvPr id="10" name="Round Diagonal Corner Rectangle 9"/>
-          <p:cNvSpPr/>
-          <p:nvPr/>
-        </p:nvSpPr>
-        <p:spPr>
-          <a:xfrm>
-            <a:off x="1076885" y="6426201"/>
-            <a:ext cx="8933627" cy="364208"/>
-          </a:xfrm>
-          <a:prstGeom prst="round2DiagRect">
-            <a:avLst/>
-          </a:prstGeom>
-          <a:solidFill>
-            <a:srgbClr val="9E2936"/>
-          </a:solidFill>
-        </p:spPr>
-        <p:style>
-          <a:lnRef idx="1">
-            <a:schemeClr val="accent2"/>
-          </a:lnRef>
-          <a:fillRef idx="2">
-            <a:schemeClr val="accent2"/>
-          </a:fillRef>
-          <a:effectRef idx="1">
-            <a:schemeClr val="accent2"/>
-          </a:effectRef>
-          <a:fontRef idx="minor">
-            <a:schemeClr val="dk1"/>
-          </a:fontRef>
-        </p:style>
-        <p:txBody>
-          <a:bodyPr rtlCol="0" anchor="ctr"/>
-          <a:lstStyle/>
-          <a:p>
-            <a:pPr algn="ctr"/>
-            <a:r>
-              <a:rPr lang="es-CO" dirty="0" err="1">
-                <a:solidFill>
-                  <a:schemeClr val="bg1">
-                    <a:lumMod val="65000"/>
-                  </a:schemeClr>
-                </a:solidFill>
-              </a:rPr>
-              <a:t>Hypothesis</a:t>
-            </a:r>
-            <a:r>
-              <a:rPr lang="es-CO" dirty="0">
-                <a:solidFill>
-                  <a:schemeClr val="bg1">
-                    <a:lumMod val="65000"/>
-                  </a:schemeClr>
-                </a:solidFill>
-              </a:rPr>
-              <a:t> </a:t>
-            </a:r>
-            <a:r>
-              <a:rPr lang="en-US" dirty="0">
-                <a:ln w="0"/>
-                <a:solidFill>
-                  <a:schemeClr val="bg1"/>
-                </a:solidFill>
-                <a:effectLst>
-                  <a:outerShdw blurRad="38100" dist="25400" dir="5400000" algn="ctr" rotWithShape="0">
-                    <a:srgbClr val="6E747A">
-                      <a:alpha val="43000"/>
-                    </a:srgbClr>
-                  </a:outerShdw>
-                </a:effectLst>
-              </a:rPr>
-              <a:t> </a:t>
-            </a:r>
-            <a:r>
-              <a:rPr lang="en-US" dirty="0">
-                <a:ln w="0"/>
-                <a:solidFill>
-                  <a:schemeClr val="bg1">
-                    <a:lumMod val="65000"/>
-                  </a:schemeClr>
-                </a:solidFill>
-                <a:effectLst>
-                  <a:outerShdw blurRad="38100" dist="25400" dir="5400000" algn="ctr" rotWithShape="0">
-                    <a:srgbClr val="6E747A">
-                      <a:alpha val="43000"/>
-                    </a:srgbClr>
-                  </a:outerShdw>
-                </a:effectLst>
-              </a:rPr>
-              <a:t>|   Data |   </a:t>
-            </a:r>
-            <a:r>
-              <a:rPr lang="en-US" dirty="0">
-                <a:ln w="0"/>
-                <a:solidFill>
-                  <a:schemeClr val="bg1"/>
-                </a:solidFill>
-                <a:effectLst>
-                  <a:outerShdw blurRad="38100" dist="25400" dir="5400000" algn="ctr" rotWithShape="0">
-                    <a:srgbClr val="6E747A">
-                      <a:alpha val="43000"/>
-                    </a:srgbClr>
-                  </a:outerShdw>
-                </a:effectLst>
-              </a:rPr>
-              <a:t>Exploration &amp; analysis</a:t>
-            </a:r>
-            <a:r>
-              <a:rPr lang="en-US" dirty="0">
-                <a:ln w="0"/>
-                <a:solidFill>
-                  <a:schemeClr val="bg1">
-                    <a:lumMod val="65000"/>
-                  </a:schemeClr>
-                </a:solidFill>
-                <a:effectLst>
-                  <a:outerShdw blurRad="38100" dist="25400" dir="5400000" algn="ctr" rotWithShape="0">
-                    <a:srgbClr val="6E747A">
-                      <a:alpha val="43000"/>
-                    </a:srgbClr>
-                  </a:outerShdw>
-                </a:effectLst>
-              </a:rPr>
-              <a:t> |   Discussion  |  </a:t>
-            </a:r>
-          </a:p>
-        </p:txBody>
-      </p:sp>
-      <p:pic>
-        <p:nvPicPr>
-          <p:cNvPr id="12" name="Picture 11"/>
-          <p:cNvPicPr>
-            <a:picLocks noChangeAspect="1"/>
-          </p:cNvPicPr>
-          <p:nvPr/>
-        </p:nvPicPr>
-        <p:blipFill>
-          <a:blip r:embed="rId3">
-            <a:extLst>
-              <a:ext uri="{BEBA8EAE-BF5A-486C-A8C5-ECC9F3942E4B}">
-                <a14:imgProps xmlns:a14="http://schemas.microsoft.com/office/drawing/2010/main">
-                  <a14:imgLayer r:embed="rId4">
-                    <a14:imgEffect>
-                      <a14:saturation sat="0"/>
-                    </a14:imgEffect>
-                  </a14:imgLayer>
-                </a14:imgProps>
-              </a:ext>
-              <a:ext uri="{28A0092B-C50C-407E-A947-70E740481C1C}">
-                <a14:useLocalDpi xmlns:a14="http://schemas.microsoft.com/office/drawing/2010/main" val="0"/>
-              </a:ext>
-            </a:extLst>
-          </a:blip>
-          <a:stretch>
-            <a:fillRect/>
-          </a:stretch>
-        </p:blipFill>
-        <p:spPr>
-          <a:xfrm>
-            <a:off x="4584700" y="31442"/>
-            <a:ext cx="7607300" cy="1397965"/>
-          </a:xfrm>
-          <a:prstGeom prst="rect">
-            <a:avLst/>
-          </a:prstGeom>
-          <a:effectLst>
-            <a:softEdge rad="50800"/>
-          </a:effectLst>
-        </p:spPr>
-      </p:pic>
-      <p:sp>
-        <p:nvSpPr>
-          <p:cNvPr id="8" name="Title 1">
-            <a:extLst>
-              <a:ext uri="{FF2B5EF4-FFF2-40B4-BE49-F238E27FC236}">
-                <a16:creationId xmlns:a16="http://schemas.microsoft.com/office/drawing/2014/main" id="{984A60E7-48A8-4B8E-AD9F-0A37136405B5}"/>
-              </a:ext>
-            </a:extLst>
-          </p:cNvPr>
-          <p:cNvSpPr txBox="1">
-            <a:spLocks/>
-          </p:cNvSpPr>
-          <p:nvPr/>
-        </p:nvSpPr>
-        <p:spPr>
-          <a:xfrm>
-            <a:off x="0" y="142875"/>
-            <a:ext cx="5076967" cy="1179512"/>
-          </a:xfrm>
-          <a:prstGeom prst="rect">
-            <a:avLst/>
-          </a:prstGeom>
-        </p:spPr>
-        <p:txBody>
-          <a:bodyPr vert="horz" lIns="91440" tIns="45720" rIns="91440" bIns="45720" rtlCol="0" anchor="ctr">
-            <a:normAutofit/>
-          </a:bodyPr>
-          <a:lstStyle>
-            <a:lvl1pPr algn="l" defTabSz="914400" rtl="0" eaLnBrk="1" latinLnBrk="0" hangingPunct="1">
-              <a:spcBef>
-                <a:spcPct val="0"/>
-              </a:spcBef>
-              <a:buNone/>
-              <a:defRPr sz="4400" kern="1200">
-                <a:solidFill>
-                  <a:schemeClr val="accent2"/>
-                </a:solidFill>
-                <a:latin typeface="+mj-lt"/>
-                <a:ea typeface="+mj-ea"/>
-                <a:cs typeface="+mj-cs"/>
-              </a:defRPr>
-            </a:lvl1pPr>
-          </a:lstStyle>
-          <a:p>
-            <a:r>
-              <a:rPr lang="es-CO" sz="3200" dirty="0" err="1"/>
-              <a:t>World</a:t>
-            </a:r>
-            <a:r>
-              <a:rPr lang="es-CO" sz="3200" dirty="0"/>
-              <a:t> </a:t>
-            </a:r>
-            <a:r>
-              <a:rPr lang="es-CO" sz="3200" dirty="0" err="1"/>
-              <a:t>Happines</a:t>
-            </a:r>
-            <a:r>
-              <a:rPr lang="es-CO" sz="3200" dirty="0"/>
-              <a:t> </a:t>
-            </a:r>
-            <a:r>
-              <a:rPr lang="es-CO" sz="3200" dirty="0" err="1"/>
-              <a:t>Analysis</a:t>
-            </a:r>
-            <a:endParaRPr lang="en-US" sz="3000" dirty="0"/>
-          </a:p>
-        </p:txBody>
-      </p:sp>
-    </p:spTree>
-    <p:extLst>
-      <p:ext uri="{BB962C8B-B14F-4D97-AF65-F5344CB8AC3E}">
-        <p14:creationId xmlns:p14="http://schemas.microsoft.com/office/powerpoint/2010/main" val="2132611421"/>
-      </p:ext>
-    </p:extLst>
-  </p:cSld>
-  <p:clrMapOvr>
-    <a:masterClrMapping/>
-  </p:clrMapOvr>
-  <mc:AlternateContent xmlns:mc="http://schemas.openxmlformats.org/markup-compatibility/2006" xmlns:p14="http://schemas.microsoft.com/office/powerpoint/2010/main">
-    <mc:Choice Requires="p14">
-      <p:transition spd="med" p14:dur="700">
-        <p:fade/>
-      </p:transition>
-    </mc:Choice>
-    <mc:Fallback xmlns="">
-      <p:transition spd="med">
-        <p:fade/>
-      </p:transition>
-    </mc:Fallback>
-  </mc:AlternateContent>
-</p:sld>
-</file>
-
-<file path=ppt/slides/slide15.xml><?xml version="1.0" encoding="utf-8"?>
 <p:sld xmlns:a="http://schemas.openxmlformats.org/drawingml/2006/main" xmlns:r="http://schemas.openxmlformats.org/officeDocument/2006/relationships" xmlns:p="http://schemas.openxmlformats.org/presentationml/2006/main">
   <p:cSld>
     <p:spTree>
@@ -8053,7 +7597,7 @@
 </p:sld>
 </file>
 
-<file path=ppt/slides/slide16.xml><?xml version="1.0" encoding="utf-8"?>
+<file path=ppt/slides/slide15.xml><?xml version="1.0" encoding="utf-8"?>
 <p:sld xmlns:a="http://schemas.openxmlformats.org/drawingml/2006/main" xmlns:r="http://schemas.openxmlformats.org/officeDocument/2006/relationships" xmlns:p="http://schemas.openxmlformats.org/presentationml/2006/main">
   <p:cSld>
     <p:spTree>
@@ -8520,7 +8064,7 @@
 </p:sld>
 </file>
 
-<file path=ppt/slides/slide17.xml><?xml version="1.0" encoding="utf-8"?>
+<file path=ppt/slides/slide16.xml><?xml version="1.0" encoding="utf-8"?>
 <p:sld xmlns:a="http://schemas.openxmlformats.org/drawingml/2006/main" xmlns:r="http://schemas.openxmlformats.org/officeDocument/2006/relationships" xmlns:p="http://schemas.openxmlformats.org/presentationml/2006/main">
   <p:cSld>
     <p:spTree>
@@ -9269,7 +8813,7 @@
 </p:sld>
 </file>
 
-<file path=ppt/slides/slide18.xml><?xml version="1.0" encoding="utf-8"?>
+<file path=ppt/slides/slide17.xml><?xml version="1.0" encoding="utf-8"?>
 <p:sld xmlns:a="http://schemas.openxmlformats.org/drawingml/2006/main" xmlns:r="http://schemas.openxmlformats.org/officeDocument/2006/relationships" xmlns:p="http://schemas.openxmlformats.org/presentationml/2006/main">
   <p:cSld>
     <p:spTree>
@@ -9639,7 +9183,7 @@
 </p:sld>
 </file>
 
-<file path=ppt/slides/slide19.xml><?xml version="1.0" encoding="utf-8"?>
+<file path=ppt/slides/slide18.xml><?xml version="1.0" encoding="utf-8"?>
 <p:sld xmlns:a="http://schemas.openxmlformats.org/drawingml/2006/main" xmlns:r="http://schemas.openxmlformats.org/officeDocument/2006/relationships" xmlns:p="http://schemas.openxmlformats.org/presentationml/2006/main">
   <p:cSld>
     <p:spTree>
@@ -10337,7 +9881,7 @@
           <a:p>
             <a:r>
               <a:rPr lang="en-US" dirty="0"/>
-              <a:t>What are the drivers of a countries happiness?</a:t>
+              <a:t>What are the drivers of a country’s happiness?</a:t>
             </a:r>
           </a:p>
           <a:p>
@@ -10353,7 +9897,7 @@
             <a:pPr lvl="1"/>
             <a:r>
               <a:rPr lang="en-US" dirty="0"/>
-              <a:t> The county’s economic indicators. The healthier the economic indicator the happier the happiness index.</a:t>
+              <a:t> The country’s economic indicators. The healthier the economic indicators the happier the happier the country will be.</a:t>
             </a:r>
           </a:p>
           <a:p>
@@ -10381,7 +9925,15 @@
             <a:pPr lvl="1"/>
             <a:r>
               <a:rPr lang="en-US" dirty="0"/>
-              <a:t>Their athletes. The happier the country the more Olympic athletes will represent them.</a:t>
+              <a:t>Their athletes. The happier the country the more </a:t>
+            </a:r>
+            <a:r>
+              <a:rPr lang="en-US" dirty="0" err="1"/>
+              <a:t>olympic</a:t>
+            </a:r>
+            <a:r>
+              <a:rPr lang="en-US" dirty="0"/>
+              <a:t> athletes will represent them.</a:t>
             </a:r>
           </a:p>
           <a:p>
@@ -10749,18 +10301,15 @@
             </a:pPr>
             <a:r>
               <a:rPr lang="en-US" dirty="0"/>
-              <a:t>  Data: World Happiness Report: http://worldhappiness.report/ed/2018/ </a:t>
-            </a:r>
-          </a:p>
-          <a:p>
-            <a:r>
-              <a:rPr lang="en-US" dirty="0"/>
-              <a:t>2. </a:t>
-            </a:r>
-            <a:r>
-              <a:rPr lang="en-US" i="1" dirty="0"/>
-              <a:t>How does happiness correlate with economic indicators:</a:t>
-            </a:r>
+              <a:t>  Data: World Happiness Report: </a:t>
+            </a:r>
+            <a:r>
+              <a:rPr lang="en-US" dirty="0">
+                <a:hlinkClick r:id="rId3"/>
+              </a:rPr>
+              <a:t>http://worldhappiness.report/ed/2018/</a:t>
+            </a:r>
+            <a:endParaRPr lang="en-US" dirty="0"/>
           </a:p>
           <a:p>
             <a:pPr marL="457200" lvl="1" indent="0">
@@ -10768,7 +10317,17 @@
             </a:pPr>
             <a:r>
               <a:rPr lang="en-US" dirty="0"/>
-              <a:t>  Data: World Happiness Report: http://worldhappiness.report/ed/2018/ </a:t>
+              <a:t> </a:t>
+            </a:r>
+          </a:p>
+          <a:p>
+            <a:r>
+              <a:rPr lang="en-US" dirty="0"/>
+              <a:t>2. </a:t>
+            </a:r>
+            <a:r>
+              <a:rPr lang="en-US" i="1" dirty="0"/>
+              <a:t>How does happiness correlate with weather:</a:t>
             </a:r>
           </a:p>
           <a:p>
@@ -10777,7 +10336,437 @@
             </a:pPr>
             <a:r>
               <a:rPr lang="en-US" dirty="0"/>
-              <a:t>  Data: The world bank indicators API http://api.worldbank.org </a:t>
+              <a:t>  Data: Open Weather API</a:t>
+            </a:r>
+          </a:p>
+          <a:p>
+            <a:pPr marL="0" indent="0">
+              <a:buNone/>
+            </a:pPr>
+            <a:r>
+              <a:rPr lang="en-US" dirty="0"/>
+              <a:t>		</a:t>
+            </a:r>
+          </a:p>
+        </p:txBody>
+      </p:sp>
+      <p:sp>
+        <p:nvSpPr>
+          <p:cNvPr id="2" name="Title 1"/>
+          <p:cNvSpPr>
+            <a:spLocks noGrp="1"/>
+          </p:cNvSpPr>
+          <p:nvPr>
+            <p:ph type="title"/>
+          </p:nvPr>
+        </p:nvSpPr>
+        <p:spPr>
+          <a:xfrm>
+            <a:off x="838200" y="1682750"/>
+            <a:ext cx="10515600" cy="528187"/>
+          </a:xfrm>
+        </p:spPr>
+        <p:txBody>
+          <a:bodyPr>
+            <a:normAutofit fontScale="90000"/>
+          </a:bodyPr>
+          <a:lstStyle/>
+          <a:p>
+            <a:r>
+              <a:rPr lang="en-US" dirty="0"/>
+              <a:t>Data</a:t>
+            </a:r>
+          </a:p>
+        </p:txBody>
+      </p:sp>
+      <p:sp>
+        <p:nvSpPr>
+          <p:cNvPr id="10" name="Round Diagonal Corner Rectangle 9"/>
+          <p:cNvSpPr/>
+          <p:nvPr/>
+        </p:nvSpPr>
+        <p:spPr>
+          <a:xfrm>
+            <a:off x="1076885" y="6426201"/>
+            <a:ext cx="8933627" cy="364208"/>
+          </a:xfrm>
+          <a:prstGeom prst="round2DiagRect">
+            <a:avLst/>
+          </a:prstGeom>
+          <a:solidFill>
+            <a:srgbClr val="9E2936"/>
+          </a:solidFill>
+        </p:spPr>
+        <p:style>
+          <a:lnRef idx="1">
+            <a:schemeClr val="accent2"/>
+          </a:lnRef>
+          <a:fillRef idx="2">
+            <a:schemeClr val="accent2"/>
+          </a:fillRef>
+          <a:effectRef idx="1">
+            <a:schemeClr val="accent2"/>
+          </a:effectRef>
+          <a:fontRef idx="minor">
+            <a:schemeClr val="dk1"/>
+          </a:fontRef>
+        </p:style>
+        <p:txBody>
+          <a:bodyPr rtlCol="0" anchor="ctr"/>
+          <a:lstStyle/>
+          <a:p>
+            <a:pPr algn="ctr"/>
+            <a:r>
+              <a:rPr lang="es-CO" dirty="0" err="1">
+                <a:solidFill>
+                  <a:schemeClr val="bg1">
+                    <a:lumMod val="65000"/>
+                  </a:schemeClr>
+                </a:solidFill>
+              </a:rPr>
+              <a:t>Hypothesis</a:t>
+            </a:r>
+            <a:r>
+              <a:rPr lang="es-CO" dirty="0">
+                <a:solidFill>
+                  <a:schemeClr val="bg1">
+                    <a:lumMod val="65000"/>
+                  </a:schemeClr>
+                </a:solidFill>
+              </a:rPr>
+              <a:t> </a:t>
+            </a:r>
+            <a:r>
+              <a:rPr lang="en-US" dirty="0">
+                <a:ln w="0"/>
+                <a:solidFill>
+                  <a:schemeClr val="bg1"/>
+                </a:solidFill>
+                <a:effectLst>
+                  <a:outerShdw blurRad="38100" dist="25400" dir="5400000" algn="ctr" rotWithShape="0">
+                    <a:srgbClr val="6E747A">
+                      <a:alpha val="43000"/>
+                    </a:srgbClr>
+                  </a:outerShdw>
+                </a:effectLst>
+              </a:rPr>
+              <a:t> </a:t>
+            </a:r>
+            <a:r>
+              <a:rPr lang="en-US" dirty="0">
+                <a:ln w="0"/>
+                <a:solidFill>
+                  <a:schemeClr val="bg1">
+                    <a:lumMod val="65000"/>
+                  </a:schemeClr>
+                </a:solidFill>
+                <a:effectLst>
+                  <a:outerShdw blurRad="38100" dist="25400" dir="5400000" algn="ctr" rotWithShape="0">
+                    <a:srgbClr val="6E747A">
+                      <a:alpha val="43000"/>
+                    </a:srgbClr>
+                  </a:outerShdw>
+                </a:effectLst>
+              </a:rPr>
+              <a:t>|   </a:t>
+            </a:r>
+            <a:r>
+              <a:rPr lang="en-US" dirty="0">
+                <a:ln w="0"/>
+                <a:solidFill>
+                  <a:schemeClr val="bg1"/>
+                </a:solidFill>
+                <a:effectLst>
+                  <a:outerShdw blurRad="38100" dist="25400" dir="5400000" algn="ctr" rotWithShape="0">
+                    <a:srgbClr val="6E747A">
+                      <a:alpha val="43000"/>
+                    </a:srgbClr>
+                  </a:outerShdw>
+                </a:effectLst>
+              </a:rPr>
+              <a:t>Data</a:t>
+            </a:r>
+            <a:r>
+              <a:rPr lang="en-US" dirty="0">
+                <a:ln w="0"/>
+                <a:solidFill>
+                  <a:schemeClr val="bg1">
+                    <a:lumMod val="65000"/>
+                  </a:schemeClr>
+                </a:solidFill>
+                <a:effectLst>
+                  <a:outerShdw blurRad="38100" dist="25400" dir="5400000" algn="ctr" rotWithShape="0">
+                    <a:srgbClr val="6E747A">
+                      <a:alpha val="43000"/>
+                    </a:srgbClr>
+                  </a:outerShdw>
+                </a:effectLst>
+              </a:rPr>
+              <a:t> |   Exploration  |   Analysis  |   </a:t>
+            </a:r>
+            <a:r>
+              <a:rPr lang="en-US" dirty="0" err="1">
+                <a:ln w="0"/>
+                <a:solidFill>
+                  <a:schemeClr val="bg1">
+                    <a:lumMod val="65000"/>
+                  </a:schemeClr>
+                </a:solidFill>
+                <a:effectLst>
+                  <a:outerShdw blurRad="38100" dist="25400" dir="5400000" algn="ctr" rotWithShape="0">
+                    <a:srgbClr val="6E747A">
+                      <a:alpha val="43000"/>
+                    </a:srgbClr>
+                  </a:outerShdw>
+                </a:effectLst>
+              </a:rPr>
+              <a:t>Discusion</a:t>
+            </a:r>
+            <a:r>
+              <a:rPr lang="en-US" dirty="0">
+                <a:ln w="0"/>
+                <a:solidFill>
+                  <a:schemeClr val="bg1">
+                    <a:lumMod val="65000"/>
+                  </a:schemeClr>
+                </a:solidFill>
+                <a:effectLst>
+                  <a:outerShdw blurRad="38100" dist="25400" dir="5400000" algn="ctr" rotWithShape="0">
+                    <a:srgbClr val="6E747A">
+                      <a:alpha val="43000"/>
+                    </a:srgbClr>
+                  </a:outerShdw>
+                </a:effectLst>
+              </a:rPr>
+              <a:t>  |  </a:t>
+            </a:r>
+          </a:p>
+        </p:txBody>
+      </p:sp>
+      <p:pic>
+        <p:nvPicPr>
+          <p:cNvPr id="12" name="Picture 11"/>
+          <p:cNvPicPr>
+            <a:picLocks noChangeAspect="1"/>
+          </p:cNvPicPr>
+          <p:nvPr/>
+        </p:nvPicPr>
+        <p:blipFill>
+          <a:blip r:embed="rId4">
+            <a:extLst>
+              <a:ext uri="{BEBA8EAE-BF5A-486C-A8C5-ECC9F3942E4B}">
+                <a14:imgProps xmlns:a14="http://schemas.microsoft.com/office/drawing/2010/main">
+                  <a14:imgLayer r:embed="rId5">
+                    <a14:imgEffect>
+                      <a14:saturation sat="0"/>
+                    </a14:imgEffect>
+                  </a14:imgLayer>
+                </a14:imgProps>
+              </a:ext>
+              <a:ext uri="{28A0092B-C50C-407E-A947-70E740481C1C}">
+                <a14:useLocalDpi xmlns:a14="http://schemas.microsoft.com/office/drawing/2010/main" val="0"/>
+              </a:ext>
+            </a:extLst>
+          </a:blip>
+          <a:stretch>
+            <a:fillRect/>
+          </a:stretch>
+        </p:blipFill>
+        <p:spPr>
+          <a:xfrm>
+            <a:off x="4584700" y="31442"/>
+            <a:ext cx="7607300" cy="1397965"/>
+          </a:xfrm>
+          <a:prstGeom prst="rect">
+            <a:avLst/>
+          </a:prstGeom>
+          <a:effectLst>
+            <a:softEdge rad="50800"/>
+          </a:effectLst>
+        </p:spPr>
+      </p:pic>
+      <p:sp>
+        <p:nvSpPr>
+          <p:cNvPr id="8" name="Title 1">
+            <a:extLst>
+              <a:ext uri="{FF2B5EF4-FFF2-40B4-BE49-F238E27FC236}">
+                <a16:creationId xmlns:a16="http://schemas.microsoft.com/office/drawing/2014/main" id="{984A60E7-48A8-4B8E-AD9F-0A37136405B5}"/>
+              </a:ext>
+            </a:extLst>
+          </p:cNvPr>
+          <p:cNvSpPr txBox="1">
+            <a:spLocks/>
+          </p:cNvSpPr>
+          <p:nvPr/>
+        </p:nvSpPr>
+        <p:spPr>
+          <a:xfrm>
+            <a:off x="0" y="142875"/>
+            <a:ext cx="5076967" cy="1179512"/>
+          </a:xfrm>
+          <a:prstGeom prst="rect">
+            <a:avLst/>
+          </a:prstGeom>
+        </p:spPr>
+        <p:txBody>
+          <a:bodyPr vert="horz" lIns="91440" tIns="45720" rIns="91440" bIns="45720" rtlCol="0" anchor="ctr">
+            <a:normAutofit/>
+          </a:bodyPr>
+          <a:lstStyle>
+            <a:lvl1pPr algn="l" defTabSz="914400" rtl="0" eaLnBrk="1" latinLnBrk="0" hangingPunct="1">
+              <a:spcBef>
+                <a:spcPct val="0"/>
+              </a:spcBef>
+              <a:buNone/>
+              <a:defRPr sz="4400" kern="1200">
+                <a:solidFill>
+                  <a:schemeClr val="accent2"/>
+                </a:solidFill>
+                <a:latin typeface="+mj-lt"/>
+                <a:ea typeface="+mj-ea"/>
+                <a:cs typeface="+mj-cs"/>
+              </a:defRPr>
+            </a:lvl1pPr>
+          </a:lstStyle>
+          <a:p>
+            <a:r>
+              <a:rPr lang="es-CO" sz="3200" dirty="0" err="1"/>
+              <a:t>World</a:t>
+            </a:r>
+            <a:r>
+              <a:rPr lang="es-CO" sz="3200" dirty="0"/>
+              <a:t> </a:t>
+            </a:r>
+            <a:r>
+              <a:rPr lang="es-CO" sz="3200" dirty="0" err="1"/>
+              <a:t>Happines</a:t>
+            </a:r>
+            <a:r>
+              <a:rPr lang="es-CO" sz="3200" dirty="0"/>
+              <a:t> </a:t>
+            </a:r>
+            <a:r>
+              <a:rPr lang="es-CO" sz="3200" dirty="0" err="1"/>
+              <a:t>Analysis</a:t>
+            </a:r>
+            <a:endParaRPr lang="en-US" sz="3000" dirty="0"/>
+          </a:p>
+        </p:txBody>
+      </p:sp>
+    </p:spTree>
+    <p:extLst>
+      <p:ext uri="{BB962C8B-B14F-4D97-AF65-F5344CB8AC3E}">
+        <p14:creationId xmlns:p14="http://schemas.microsoft.com/office/powerpoint/2010/main" val="2317940191"/>
+      </p:ext>
+    </p:extLst>
+  </p:cSld>
+  <p:clrMapOvr>
+    <a:masterClrMapping/>
+  </p:clrMapOvr>
+  <mc:AlternateContent xmlns:mc="http://schemas.openxmlformats.org/markup-compatibility/2006" xmlns:p14="http://schemas.microsoft.com/office/powerpoint/2010/main">
+    <mc:Choice Requires="p14">
+      <p:transition spd="med" p14:dur="700">
+        <p:fade/>
+      </p:transition>
+    </mc:Choice>
+    <mc:Fallback xmlns="">
+      <p:transition spd="med">
+        <p:fade/>
+      </p:transition>
+    </mc:Fallback>
+  </mc:AlternateContent>
+</p:sld>
+</file>
+
+<file path=ppt/slides/slide5.xml><?xml version="1.0" encoding="utf-8"?>
+<p:sld xmlns:a="http://schemas.openxmlformats.org/drawingml/2006/main" xmlns:r="http://schemas.openxmlformats.org/officeDocument/2006/relationships" xmlns:p="http://schemas.openxmlformats.org/presentationml/2006/main">
+  <p:cSld>
+    <p:spTree>
+      <p:nvGrpSpPr>
+        <p:cNvPr id="1" name=""/>
+        <p:cNvGrpSpPr/>
+        <p:nvPr/>
+      </p:nvGrpSpPr>
+      <p:grpSpPr>
+        <a:xfrm>
+          <a:off x="0" y="0"/>
+          <a:ext cx="0" cy="0"/>
+          <a:chOff x="0" y="0"/>
+          <a:chExt cx="0" cy="0"/>
+        </a:xfrm>
+      </p:grpSpPr>
+      <p:sp>
+        <p:nvSpPr>
+          <p:cNvPr id="3" name="Content Placeholder 2"/>
+          <p:cNvSpPr>
+            <a:spLocks noGrp="1"/>
+          </p:cNvSpPr>
+          <p:nvPr>
+            <p:ph idx="1"/>
+          </p:nvPr>
+        </p:nvSpPr>
+        <p:spPr>
+          <a:xfrm>
+            <a:off x="537949" y="2380421"/>
+            <a:ext cx="10515600" cy="3890725"/>
+          </a:xfrm>
+        </p:spPr>
+        <p:txBody>
+          <a:bodyPr>
+            <a:normAutofit/>
+          </a:bodyPr>
+          <a:lstStyle/>
+          <a:p>
+            <a:pPr marL="0" indent="0">
+              <a:buNone/>
+            </a:pPr>
+            <a:r>
+              <a:rPr lang="en-US" dirty="0"/>
+              <a:t>Questions we asked:</a:t>
+            </a:r>
+          </a:p>
+          <a:p>
+            <a:r>
+              <a:rPr lang="en-US" dirty="0"/>
+              <a:t>3. </a:t>
+            </a:r>
+            <a:r>
+              <a:rPr lang="en-US" i="1" dirty="0"/>
+              <a:t>How does tourism correlate with happiness?</a:t>
+            </a:r>
+          </a:p>
+          <a:p>
+            <a:pPr marL="457200" lvl="1" indent="0">
+              <a:buNone/>
+            </a:pPr>
+            <a:r>
+              <a:rPr lang="en-US" dirty="0"/>
+              <a:t>  Data:</a:t>
+            </a:r>
+          </a:p>
+          <a:p>
+            <a:pPr marL="457200" lvl="1" indent="0">
+              <a:buNone/>
+            </a:pPr>
+            <a:endParaRPr lang="en-US" dirty="0"/>
+          </a:p>
+          <a:p>
+            <a:r>
+              <a:rPr lang="en-US" dirty="0"/>
+              <a:t>4. </a:t>
+            </a:r>
+            <a:r>
+              <a:rPr lang="en-US" i="1" dirty="0"/>
+              <a:t>How does athletics correlate with happiness?</a:t>
+            </a:r>
+          </a:p>
+          <a:p>
+            <a:pPr marL="457200" lvl="1" indent="0">
+              <a:buNone/>
+            </a:pPr>
+            <a:r>
+              <a:rPr lang="en-US" dirty="0"/>
+              <a:t>  Data:</a:t>
             </a:r>
           </a:p>
           <a:p>
@@ -11097,7 +11086,7 @@
     </p:spTree>
     <p:extLst>
       <p:ext uri="{BB962C8B-B14F-4D97-AF65-F5344CB8AC3E}">
-        <p14:creationId xmlns:p14="http://schemas.microsoft.com/office/powerpoint/2010/main" val="4127654187"/>
+        <p14:creationId xmlns:p14="http://schemas.microsoft.com/office/powerpoint/2010/main" val="1385341723"/>
       </p:ext>
     </p:extLst>
   </p:cSld>
@@ -11119,7 +11108,7 @@
 </p:sld>
 </file>
 
-<file path=ppt/slides/slide5.xml><?xml version="1.0" encoding="utf-8"?>
+<file path=ppt/slides/slide6.xml><?xml version="1.0" encoding="utf-8"?>
 <p:sld xmlns:a="http://schemas.openxmlformats.org/drawingml/2006/main" xmlns:r="http://schemas.openxmlformats.org/officeDocument/2006/relationships" xmlns:p="http://schemas.openxmlformats.org/presentationml/2006/main">
   <p:cSld>
     <p:spTree>
@@ -11163,17 +11152,11 @@
             </a:pPr>
             <a:r>
               <a:rPr lang="en-US" dirty="0"/>
-              <a:t>Questions we asked:</a:t>
-            </a:r>
-          </a:p>
-          <a:p>
-            <a:r>
-              <a:rPr lang="en-US" dirty="0"/>
-              <a:t>3. </a:t>
+              <a:t>5. </a:t>
             </a:r>
             <a:r>
               <a:rPr lang="en-US" i="1" dirty="0"/>
-              <a:t>How does tourism correlate with happiness?</a:t>
+              <a:t>How does happiness correlate with economic indicators:</a:t>
             </a:r>
           </a:p>
           <a:p>
@@ -11182,17 +11165,7 @@
             </a:pPr>
             <a:r>
               <a:rPr lang="en-US" dirty="0"/>
-              <a:t>  Data:</a:t>
-            </a:r>
-          </a:p>
-          <a:p>
-            <a:r>
-              <a:rPr lang="en-US" dirty="0"/>
-              <a:t>4. </a:t>
-            </a:r>
-            <a:r>
-              <a:rPr lang="en-US" i="1" dirty="0"/>
-              <a:t>How does happiness correlate with weather:</a:t>
+              <a:t>  Data: World Happiness Report: http://worldhappiness.report/ed/2018/ </a:t>
             </a:r>
           </a:p>
           <a:p>
@@ -11201,16 +11174,7 @@
             </a:pPr>
             <a:r>
               <a:rPr lang="en-US" dirty="0"/>
-              <a:t>  Data: Open Weather API</a:t>
-            </a:r>
-          </a:p>
-          <a:p>
-            <a:pPr marL="457200" lvl="1" indent="0">
-              <a:buNone/>
-            </a:pPr>
-            <a:r>
-              <a:rPr lang="en-US" dirty="0"/>
-              <a:t>  </a:t>
+              <a:t>  Data: The world bank indicators API http://api.worldbank.org </a:t>
             </a:r>
           </a:p>
           <a:p>
@@ -11530,7 +11494,7 @@
     </p:spTree>
     <p:extLst>
       <p:ext uri="{BB962C8B-B14F-4D97-AF65-F5344CB8AC3E}">
-        <p14:creationId xmlns:p14="http://schemas.microsoft.com/office/powerpoint/2010/main" val="3754556850"/>
+        <p14:creationId xmlns:p14="http://schemas.microsoft.com/office/powerpoint/2010/main" val="4127654187"/>
       </p:ext>
     </p:extLst>
   </p:cSld>
@@ -11552,7 +11516,7 @@
 </p:sld>
 </file>
 
-<file path=ppt/slides/slide6.xml><?xml version="1.0" encoding="utf-8"?>
+<file path=ppt/slides/slide7.xml><?xml version="1.0" encoding="utf-8"?>
 <p:sld xmlns:a="http://schemas.openxmlformats.org/drawingml/2006/main" xmlns:r="http://schemas.openxmlformats.org/officeDocument/2006/relationships" xmlns:p="http://schemas.openxmlformats.org/presentationml/2006/main">
   <p:cSld>
     <p:spTree>
@@ -11587,7 +11551,7 @@
         </p:spPr>
         <p:txBody>
           <a:bodyPr>
-            <a:normAutofit/>
+            <a:normAutofit fontScale="85000" lnSpcReduction="20000"/>
           </a:bodyPr>
           <a:lstStyle/>
           <a:p>
@@ -11602,40 +11566,52 @@
           <a:p>
             <a:r>
               <a:rPr lang="en-US" dirty="0"/>
-              <a:t>1. </a:t>
+              <a:t>6. </a:t>
             </a:r>
             <a:r>
               <a:rPr lang="en-US" i="1" dirty="0"/>
-              <a:t>How happy is the world?</a:t>
-            </a:r>
+              <a:t>Is there are relationship between how happy the country and the kind of music they choose to listen and preferer?</a:t>
+            </a:r>
+          </a:p>
+          <a:p>
+            <a:endParaRPr lang="en-US" i="1" dirty="0"/>
           </a:p>
           <a:p>
             <a:pPr marL="457200" lvl="1" indent="0">
               <a:buNone/>
             </a:pPr>
             <a:r>
-              <a:rPr lang="en-US" dirty="0"/>
-              <a:t>  Data: World Happiness Report: http://worldhappiness.report/ed/2018/ </a:t>
-            </a:r>
-          </a:p>
-          <a:p>
-            <a:r>
-              <a:rPr lang="en-US" dirty="0"/>
-              <a:t>2. </a:t>
-            </a:r>
-            <a:r>
               <a:rPr lang="en-US" i="1" dirty="0"/>
-              <a:t>How does happiness correlate with economic indicators:</a:t>
+              <a:t>Data needed: </a:t>
+            </a:r>
+          </a:p>
+          <a:p>
+            <a:pPr lvl="1"/>
+            <a:r>
+              <a:rPr lang="en-US" i="1" dirty="0"/>
+              <a:t>Representative sample of top songs per country through out the year.</a:t>
+            </a:r>
+          </a:p>
+          <a:p>
+            <a:pPr lvl="1"/>
+            <a:r>
+              <a:rPr lang="en-US" i="1" dirty="0"/>
+              <a:t>Characteristics of each song rating: happiness, energy, </a:t>
+            </a:r>
+            <a:r>
+              <a:rPr lang="en-US" i="1" dirty="0" err="1"/>
+              <a:t>speechiness</a:t>
+            </a:r>
+            <a:r>
+              <a:rPr lang="en-US" i="1" dirty="0"/>
+              <a:t> and </a:t>
             </a:r>
           </a:p>
           <a:p>
             <a:pPr marL="457200" lvl="1" indent="0">
               <a:buNone/>
             </a:pPr>
-            <a:r>
-              <a:rPr lang="en-US" dirty="0"/>
-              <a:t>  Data: World Happiness Report: http://worldhappiness.report/ed/2018/ </a:t>
-            </a:r>
+            <a:endParaRPr lang="en-US" dirty="0"/>
           </a:p>
           <a:p>
             <a:pPr marL="457200" lvl="1" indent="0">
@@ -11643,7 +11619,31 @@
             </a:pPr>
             <a:r>
               <a:rPr lang="en-US" dirty="0"/>
-              <a:t>  Data: The world bank indicators API http://api.worldbank.org </a:t>
+              <a:t>Data sources: </a:t>
+            </a:r>
+          </a:p>
+          <a:p>
+            <a:pPr lvl="1"/>
+            <a:r>
+              <a:rPr lang="en-US" dirty="0"/>
+              <a:t>Spotify, </a:t>
+            </a:r>
+            <a:r>
+              <a:rPr lang="en-US" dirty="0" err="1"/>
+              <a:t>Spotypy</a:t>
+            </a:r>
+            <a:r>
+              <a:rPr lang="en-US" dirty="0"/>
+              <a:t> API</a:t>
+            </a:r>
+          </a:p>
+          <a:p>
+            <a:pPr marL="457200" lvl="1" indent="0">
+              <a:buNone/>
+            </a:pPr>
+            <a:r>
+              <a:rPr lang="en-US" dirty="0"/>
+              <a:t>  </a:t>
             </a:r>
           </a:p>
           <a:p>
@@ -11963,7 +11963,7 @@
     </p:spTree>
     <p:extLst>
       <p:ext uri="{BB962C8B-B14F-4D97-AF65-F5344CB8AC3E}">
-        <p14:creationId xmlns:p14="http://schemas.microsoft.com/office/powerpoint/2010/main" val="2317940191"/>
+        <p14:creationId xmlns:p14="http://schemas.microsoft.com/office/powerpoint/2010/main" val="3762565235"/>
       </p:ext>
     </p:extLst>
   </p:cSld>
@@ -11985,7 +11985,7 @@
 </p:sld>
 </file>
 
-<file path=ppt/slides/slide7.xml><?xml version="1.0" encoding="utf-8"?>
+<file path=ppt/slides/slide8.xml><?xml version="1.0" encoding="utf-8"?>
 <p:sld xmlns:a="http://schemas.openxmlformats.org/drawingml/2006/main" xmlns:r="http://schemas.openxmlformats.org/officeDocument/2006/relationships" xmlns:p="http://schemas.openxmlformats.org/presentationml/2006/main">
   <p:cSld>
     <p:spTree>
@@ -12002,94 +12002,41 @@
           <a:chExt cx="0" cy="0"/>
         </a:xfrm>
       </p:grpSpPr>
-      <p:sp>
-        <p:nvSpPr>
-          <p:cNvPr id="3" name="Content Placeholder 2"/>
-          <p:cNvSpPr>
-            <a:spLocks noGrp="1"/>
-          </p:cNvSpPr>
+      <p:pic>
+        <p:nvPicPr>
+          <p:cNvPr id="5" name="Content Placeholder 4" descr="A screenshot of a cell phone&#10;&#10;Description automatically generated">
+            <a:extLst>
+              <a:ext uri="{FF2B5EF4-FFF2-40B4-BE49-F238E27FC236}">
+                <a16:creationId xmlns:a16="http://schemas.microsoft.com/office/drawing/2014/main" id="{DC7C85E5-6604-4226-BBCA-D35ACAF135F8}"/>
+              </a:ext>
+            </a:extLst>
+          </p:cNvPr>
+          <p:cNvPicPr>
+            <a:picLocks noGrp="1" noChangeAspect="1"/>
+          </p:cNvPicPr>
           <p:nvPr>
             <p:ph idx="1"/>
           </p:nvPr>
-        </p:nvSpPr>
+        </p:nvPicPr>
+        <p:blipFill>
+          <a:blip r:embed="rId3">
+            <a:extLst>
+              <a:ext uri="{28A0092B-C50C-407E-A947-70E740481C1C}">
+                <a14:useLocalDpi xmlns:a14="http://schemas.microsoft.com/office/drawing/2010/main" val="0"/>
+              </a:ext>
+            </a:extLst>
+          </a:blip>
+          <a:stretch>
+            <a:fillRect/>
+          </a:stretch>
+        </p:blipFill>
         <p:spPr>
           <a:xfrm>
-            <a:off x="537949" y="2380421"/>
-            <a:ext cx="10515600" cy="3890725"/>
+            <a:off x="3352175" y="2424490"/>
+            <a:ext cx="5487650" cy="3658433"/>
           </a:xfrm>
         </p:spPr>
-        <p:txBody>
-          <a:bodyPr>
-            <a:normAutofit/>
-          </a:bodyPr>
-          <a:lstStyle/>
-          <a:p>
-            <a:pPr marL="0" indent="0">
-              <a:buNone/>
-            </a:pPr>
-            <a:r>
-              <a:rPr lang="en-US" dirty="0"/>
-              <a:t>Questions we asked:</a:t>
-            </a:r>
-          </a:p>
-          <a:p>
-            <a:r>
-              <a:rPr lang="en-US" dirty="0"/>
-              <a:t>3. </a:t>
-            </a:r>
-            <a:r>
-              <a:rPr lang="en-US" i="1" dirty="0"/>
-              <a:t>How does tourism correlate with happiness?</a:t>
-            </a:r>
-          </a:p>
-          <a:p>
-            <a:pPr marL="457200" lvl="1" indent="0">
-              <a:buNone/>
-            </a:pPr>
-            <a:r>
-              <a:rPr lang="en-US" dirty="0"/>
-              <a:t>  Data:</a:t>
-            </a:r>
-          </a:p>
-          <a:p>
-            <a:r>
-              <a:rPr lang="en-US" dirty="0"/>
-              <a:t>4. </a:t>
-            </a:r>
-            <a:r>
-              <a:rPr lang="en-US" i="1" dirty="0"/>
-              <a:t>How does happiness correlate with weather:</a:t>
-            </a:r>
-          </a:p>
-          <a:p>
-            <a:pPr marL="457200" lvl="1" indent="0">
-              <a:buNone/>
-            </a:pPr>
-            <a:r>
-              <a:rPr lang="en-US" dirty="0"/>
-              <a:t>  Data: Open Weather API</a:t>
-            </a:r>
-          </a:p>
-          <a:p>
-            <a:pPr marL="457200" lvl="1" indent="0">
-              <a:buNone/>
-            </a:pPr>
-            <a:r>
-              <a:rPr lang="en-US" dirty="0"/>
-              <a:t>  </a:t>
-            </a:r>
-          </a:p>
-          <a:p>
-            <a:pPr marL="457200" lvl="1" indent="0">
-              <a:buNone/>
-            </a:pPr>
-            <a:r>
-              <a:rPr lang="en-US" dirty="0"/>
-              <a:t>		</a:t>
-            </a:r>
-          </a:p>
-        </p:txBody>
-      </p:sp>
+      </p:pic>
       <p:sp>
         <p:nvSpPr>
           <p:cNvPr id="2" name="Title 1"/>
@@ -12103,7 +12050,7 @@
         <p:spPr>
           <a:xfrm>
             <a:off x="838200" y="1682750"/>
-            <a:ext cx="10515600" cy="528187"/>
+            <a:ext cx="10515600" cy="535011"/>
           </a:xfrm>
         </p:spPr>
         <p:txBody>
@@ -12114,7 +12061,7 @@
           <a:p>
             <a:r>
               <a:rPr lang="en-US" dirty="0"/>
-              <a:t>Data</a:t>
+              <a:t>Exploration &amp; Analysis – Happiness Index</a:t>
             </a:r>
           </a:p>
         </p:txBody>
@@ -12208,7 +12155,7 @@
                   </a:outerShdw>
                 </a:effectLst>
               </a:rPr>
-              <a:t>|   </a:t>
+              <a:t>|   Data |   </a:t>
             </a:r>
             <a:r>
               <a:rPr lang="en-US" dirty="0">
@@ -12224,7 +12171,7 @@
                   </a:outerShdw>
                 </a:effectLst>
               </a:rPr>
-              <a:t>Data</a:t>
+              <a:t>Exploration &amp; analysis</a:t>
             </a:r>
             <a:r>
               <a:rPr lang="en-US" dirty="0">
@@ -12242,7 +12189,378 @@
                   </a:outerShdw>
                 </a:effectLst>
               </a:rPr>
-              <a:t> |   Exploration  |   Analysis  |   </a:t>
+              <a:t> |   </a:t>
+            </a:r>
+            <a:r>
+              <a:rPr lang="en-US" dirty="0" err="1">
+                <a:ln w="0"/>
+                <a:solidFill>
+                  <a:schemeClr val="bg1">
+                    <a:lumMod val="65000"/>
+                  </a:schemeClr>
+                </a:solidFill>
+                <a:effectLst>
+                  <a:outerShdw blurRad="38100" dist="25400" dir="5400000" algn="ctr" rotWithShape="0">
+                    <a:srgbClr val="6E747A">
+                      <a:alpha val="43000"/>
+                    </a:srgbClr>
+                  </a:outerShdw>
+                </a:effectLst>
+              </a:rPr>
+              <a:t>Discusion</a:t>
+            </a:r>
+            <a:r>
+              <a:rPr lang="en-US" dirty="0">
+                <a:ln w="0"/>
+                <a:solidFill>
+                  <a:schemeClr val="bg1">
+                    <a:lumMod val="65000"/>
+                  </a:schemeClr>
+                </a:solidFill>
+                <a:effectLst>
+                  <a:outerShdw blurRad="38100" dist="25400" dir="5400000" algn="ctr" rotWithShape="0">
+                    <a:srgbClr val="6E747A">
+                      <a:alpha val="43000"/>
+                    </a:srgbClr>
+                  </a:outerShdw>
+                </a:effectLst>
+              </a:rPr>
+              <a:t>  |  </a:t>
+            </a:r>
+          </a:p>
+        </p:txBody>
+      </p:sp>
+      <p:pic>
+        <p:nvPicPr>
+          <p:cNvPr id="12" name="Picture 11"/>
+          <p:cNvPicPr>
+            <a:picLocks noChangeAspect="1"/>
+          </p:cNvPicPr>
+          <p:nvPr/>
+        </p:nvPicPr>
+        <p:blipFill>
+          <a:blip r:embed="rId4">
+            <a:extLst>
+              <a:ext uri="{BEBA8EAE-BF5A-486C-A8C5-ECC9F3942E4B}">
+                <a14:imgProps xmlns:a14="http://schemas.microsoft.com/office/drawing/2010/main">
+                  <a14:imgLayer r:embed="rId5">
+                    <a14:imgEffect>
+                      <a14:saturation sat="0"/>
+                    </a14:imgEffect>
+                  </a14:imgLayer>
+                </a14:imgProps>
+              </a:ext>
+              <a:ext uri="{28A0092B-C50C-407E-A947-70E740481C1C}">
+                <a14:useLocalDpi xmlns:a14="http://schemas.microsoft.com/office/drawing/2010/main" val="0"/>
+              </a:ext>
+            </a:extLst>
+          </a:blip>
+          <a:stretch>
+            <a:fillRect/>
+          </a:stretch>
+        </p:blipFill>
+        <p:spPr>
+          <a:xfrm>
+            <a:off x="4584700" y="31442"/>
+            <a:ext cx="7607300" cy="1397965"/>
+          </a:xfrm>
+          <a:prstGeom prst="rect">
+            <a:avLst/>
+          </a:prstGeom>
+          <a:effectLst>
+            <a:softEdge rad="50800"/>
+          </a:effectLst>
+        </p:spPr>
+      </p:pic>
+      <p:sp>
+        <p:nvSpPr>
+          <p:cNvPr id="8" name="Title 1">
+            <a:extLst>
+              <a:ext uri="{FF2B5EF4-FFF2-40B4-BE49-F238E27FC236}">
+                <a16:creationId xmlns:a16="http://schemas.microsoft.com/office/drawing/2014/main" id="{984A60E7-48A8-4B8E-AD9F-0A37136405B5}"/>
+              </a:ext>
+            </a:extLst>
+          </p:cNvPr>
+          <p:cNvSpPr txBox="1">
+            <a:spLocks/>
+          </p:cNvSpPr>
+          <p:nvPr/>
+        </p:nvSpPr>
+        <p:spPr>
+          <a:xfrm>
+            <a:off x="0" y="142875"/>
+            <a:ext cx="5076967" cy="1179512"/>
+          </a:xfrm>
+          <a:prstGeom prst="rect">
+            <a:avLst/>
+          </a:prstGeom>
+        </p:spPr>
+        <p:txBody>
+          <a:bodyPr vert="horz" lIns="91440" tIns="45720" rIns="91440" bIns="45720" rtlCol="0" anchor="ctr">
+            <a:normAutofit/>
+          </a:bodyPr>
+          <a:lstStyle>
+            <a:lvl1pPr algn="l" defTabSz="914400" rtl="0" eaLnBrk="1" latinLnBrk="0" hangingPunct="1">
+              <a:spcBef>
+                <a:spcPct val="0"/>
+              </a:spcBef>
+              <a:buNone/>
+              <a:defRPr sz="4400" kern="1200">
+                <a:solidFill>
+                  <a:schemeClr val="accent2"/>
+                </a:solidFill>
+                <a:latin typeface="+mj-lt"/>
+                <a:ea typeface="+mj-ea"/>
+                <a:cs typeface="+mj-cs"/>
+              </a:defRPr>
+            </a:lvl1pPr>
+          </a:lstStyle>
+          <a:p>
+            <a:r>
+              <a:rPr lang="es-CO" sz="3200" dirty="0" err="1"/>
+              <a:t>World</a:t>
+            </a:r>
+            <a:r>
+              <a:rPr lang="es-CO" sz="3200" dirty="0"/>
+              <a:t> </a:t>
+            </a:r>
+            <a:r>
+              <a:rPr lang="es-CO" sz="3200" dirty="0" err="1"/>
+              <a:t>Happines</a:t>
+            </a:r>
+            <a:r>
+              <a:rPr lang="es-CO" sz="3200" dirty="0"/>
+              <a:t> </a:t>
+            </a:r>
+            <a:r>
+              <a:rPr lang="es-CO" sz="3200" dirty="0" err="1"/>
+              <a:t>Analysis</a:t>
+            </a:r>
+            <a:endParaRPr lang="en-US" sz="3000" dirty="0"/>
+          </a:p>
+        </p:txBody>
+      </p:sp>
+    </p:spTree>
+    <p:extLst>
+      <p:ext uri="{BB962C8B-B14F-4D97-AF65-F5344CB8AC3E}">
+        <p14:creationId xmlns:p14="http://schemas.microsoft.com/office/powerpoint/2010/main" val="1974974057"/>
+      </p:ext>
+    </p:extLst>
+  </p:cSld>
+  <p:clrMapOvr>
+    <a:masterClrMapping/>
+  </p:clrMapOvr>
+  <mc:AlternateContent xmlns:mc="http://schemas.openxmlformats.org/markup-compatibility/2006" xmlns:p14="http://schemas.microsoft.com/office/powerpoint/2010/main">
+    <mc:Choice Requires="p14">
+      <p:transition spd="med" p14:dur="700">
+        <p:fade/>
+      </p:transition>
+    </mc:Choice>
+    <mc:Fallback xmlns="">
+      <p:transition spd="med">
+        <p:fade/>
+      </p:transition>
+    </mc:Fallback>
+  </mc:AlternateContent>
+</p:sld>
+</file>
+
+<file path=ppt/slides/slide9.xml><?xml version="1.0" encoding="utf-8"?>
+<p:sld xmlns:a="http://schemas.openxmlformats.org/drawingml/2006/main" xmlns:r="http://schemas.openxmlformats.org/officeDocument/2006/relationships" xmlns:p="http://schemas.openxmlformats.org/presentationml/2006/main">
+  <p:cSld>
+    <p:spTree>
+      <p:nvGrpSpPr>
+        <p:cNvPr id="1" name=""/>
+        <p:cNvGrpSpPr/>
+        <p:nvPr/>
+      </p:nvGrpSpPr>
+      <p:grpSpPr>
+        <a:xfrm>
+          <a:off x="0" y="0"/>
+          <a:ext cx="0" cy="0"/>
+          <a:chOff x="0" y="0"/>
+          <a:chExt cx="0" cy="0"/>
+        </a:xfrm>
+      </p:grpSpPr>
+      <p:sp>
+        <p:nvSpPr>
+          <p:cNvPr id="3" name="Content Placeholder 2"/>
+          <p:cNvSpPr>
+            <a:spLocks noGrp="1"/>
+          </p:cNvSpPr>
+          <p:nvPr>
+            <p:ph idx="1"/>
+          </p:nvPr>
+        </p:nvSpPr>
+        <p:spPr/>
+        <p:txBody>
+          <a:bodyPr>
+            <a:normAutofit/>
+          </a:bodyPr>
+          <a:lstStyle/>
+          <a:p>
+            <a:endParaRPr lang="en-US" dirty="0"/>
+          </a:p>
+        </p:txBody>
+      </p:sp>
+      <p:sp>
+        <p:nvSpPr>
+          <p:cNvPr id="2" name="Title 1"/>
+          <p:cNvSpPr>
+            <a:spLocks noGrp="1"/>
+          </p:cNvSpPr>
+          <p:nvPr>
+            <p:ph type="title"/>
+          </p:nvPr>
+        </p:nvSpPr>
+        <p:spPr>
+          <a:xfrm>
+            <a:off x="838200" y="1682750"/>
+            <a:ext cx="10515600" cy="535011"/>
+          </a:xfrm>
+        </p:spPr>
+        <p:txBody>
+          <a:bodyPr>
+            <a:normAutofit fontScale="90000"/>
+          </a:bodyPr>
+          <a:lstStyle/>
+          <a:p>
+            <a:r>
+              <a:rPr lang="en-US" dirty="0"/>
+              <a:t>Exploration &amp; Analysis – </a:t>
+            </a:r>
+            <a:r>
+              <a:rPr lang="en-US" dirty="0" err="1"/>
+              <a:t>Wheather</a:t>
+            </a:r>
+            <a:endParaRPr lang="en-US" dirty="0"/>
+          </a:p>
+        </p:txBody>
+      </p:sp>
+      <p:sp>
+        <p:nvSpPr>
+          <p:cNvPr id="10" name="Round Diagonal Corner Rectangle 9"/>
+          <p:cNvSpPr/>
+          <p:nvPr/>
+        </p:nvSpPr>
+        <p:spPr>
+          <a:xfrm>
+            <a:off x="1076885" y="6426201"/>
+            <a:ext cx="8933627" cy="364208"/>
+          </a:xfrm>
+          <a:prstGeom prst="round2DiagRect">
+            <a:avLst/>
+          </a:prstGeom>
+          <a:solidFill>
+            <a:srgbClr val="9E2936"/>
+          </a:solidFill>
+        </p:spPr>
+        <p:style>
+          <a:lnRef idx="1">
+            <a:schemeClr val="accent2"/>
+          </a:lnRef>
+          <a:fillRef idx="2">
+            <a:schemeClr val="accent2"/>
+          </a:fillRef>
+          <a:effectRef idx="1">
+            <a:schemeClr val="accent2"/>
+          </a:effectRef>
+          <a:fontRef idx="minor">
+            <a:schemeClr val="dk1"/>
+          </a:fontRef>
+        </p:style>
+        <p:txBody>
+          <a:bodyPr rtlCol="0" anchor="ctr"/>
+          <a:lstStyle/>
+          <a:p>
+            <a:pPr algn="ctr"/>
+            <a:r>
+              <a:rPr lang="es-CO" dirty="0" err="1">
+                <a:solidFill>
+                  <a:schemeClr val="bg1">
+                    <a:lumMod val="65000"/>
+                  </a:schemeClr>
+                </a:solidFill>
+              </a:rPr>
+              <a:t>Hypothesis</a:t>
+            </a:r>
+            <a:r>
+              <a:rPr lang="es-CO" dirty="0">
+                <a:solidFill>
+                  <a:schemeClr val="bg1">
+                    <a:lumMod val="65000"/>
+                  </a:schemeClr>
+                </a:solidFill>
+              </a:rPr>
+              <a:t> </a:t>
+            </a:r>
+            <a:r>
+              <a:rPr lang="en-US" dirty="0">
+                <a:ln w="0"/>
+                <a:solidFill>
+                  <a:schemeClr val="bg1"/>
+                </a:solidFill>
+                <a:effectLst>
+                  <a:outerShdw blurRad="38100" dist="25400" dir="5400000" algn="ctr" rotWithShape="0">
+                    <a:srgbClr val="6E747A">
+                      <a:alpha val="43000"/>
+                    </a:srgbClr>
+                  </a:outerShdw>
+                </a:effectLst>
+              </a:rPr>
+              <a:t> </a:t>
+            </a:r>
+            <a:r>
+              <a:rPr lang="en-US" dirty="0">
+                <a:ln w="0"/>
+                <a:solidFill>
+                  <a:schemeClr val="bg1">
+                    <a:lumMod val="65000"/>
+                  </a:schemeClr>
+                </a:solidFill>
+                <a:effectLst>
+                  <a:outerShdw blurRad="38100" dist="25400" dir="5400000" algn="ctr" rotWithShape="0">
+                    <a:srgbClr val="6E747A">
+                      <a:alpha val="43000"/>
+                    </a:srgbClr>
+                  </a:outerShdw>
+                </a:effectLst>
+              </a:rPr>
+              <a:t>|   Data |   </a:t>
+            </a:r>
+            <a:r>
+              <a:rPr lang="en-US" dirty="0">
+                <a:ln w="0"/>
+                <a:solidFill>
+                  <a:schemeClr val="bg1"/>
+                </a:solidFill>
+                <a:effectLst>
+                  <a:outerShdw blurRad="38100" dist="25400" dir="5400000" algn="ctr" rotWithShape="0">
+                    <a:srgbClr val="6E747A">
+                      <a:alpha val="43000"/>
+                    </a:srgbClr>
+                  </a:outerShdw>
+                </a:effectLst>
+              </a:rPr>
+              <a:t>Exploration &amp; analysis</a:t>
+            </a:r>
+            <a:r>
+              <a:rPr lang="en-US" dirty="0">
+                <a:ln w="0"/>
+                <a:solidFill>
+                  <a:schemeClr val="bg1">
+                    <a:lumMod val="65000"/>
+                  </a:schemeClr>
+                </a:solidFill>
+                <a:effectLst>
+                  <a:outerShdw blurRad="38100" dist="25400" dir="5400000" algn="ctr" rotWithShape="0">
+                    <a:srgbClr val="6E747A">
+                      <a:alpha val="43000"/>
+                    </a:srgbClr>
+                  </a:outerShdw>
+                </a:effectLst>
+              </a:rPr>
+              <a:t> |   </a:t>
             </a:r>
             <a:r>
               <a:rPr lang="en-US" dirty="0" err="1">
@@ -12396,866 +12714,7 @@
     </p:spTree>
     <p:extLst>
       <p:ext uri="{BB962C8B-B14F-4D97-AF65-F5344CB8AC3E}">
-        <p14:creationId xmlns:p14="http://schemas.microsoft.com/office/powerpoint/2010/main" val="1385341723"/>
-      </p:ext>
-    </p:extLst>
-  </p:cSld>
-  <p:clrMapOvr>
-    <a:masterClrMapping/>
-  </p:clrMapOvr>
-  <mc:AlternateContent xmlns:mc="http://schemas.openxmlformats.org/markup-compatibility/2006" xmlns:p14="http://schemas.microsoft.com/office/powerpoint/2010/main">
-    <mc:Choice Requires="p14">
-      <p:transition spd="med" p14:dur="700">
-        <p:fade/>
-      </p:transition>
-    </mc:Choice>
-    <mc:Fallback xmlns="">
-      <p:transition spd="med">
-        <p:fade/>
-      </p:transition>
-    </mc:Fallback>
-  </mc:AlternateContent>
-</p:sld>
-</file>
-
-<file path=ppt/slides/slide8.xml><?xml version="1.0" encoding="utf-8"?>
-<p:sld xmlns:a="http://schemas.openxmlformats.org/drawingml/2006/main" xmlns:r="http://schemas.openxmlformats.org/officeDocument/2006/relationships" xmlns:p="http://schemas.openxmlformats.org/presentationml/2006/main">
-  <p:cSld>
-    <p:spTree>
-      <p:nvGrpSpPr>
-        <p:cNvPr id="1" name=""/>
-        <p:cNvGrpSpPr/>
-        <p:nvPr/>
-      </p:nvGrpSpPr>
-      <p:grpSpPr>
-        <a:xfrm>
-          <a:off x="0" y="0"/>
-          <a:ext cx="0" cy="0"/>
-          <a:chOff x="0" y="0"/>
-          <a:chExt cx="0" cy="0"/>
-        </a:xfrm>
-      </p:grpSpPr>
-      <p:sp>
-        <p:nvSpPr>
-          <p:cNvPr id="3" name="Content Placeholder 2"/>
-          <p:cNvSpPr>
-            <a:spLocks noGrp="1"/>
-          </p:cNvSpPr>
-          <p:nvPr>
-            <p:ph idx="1"/>
-          </p:nvPr>
-        </p:nvSpPr>
-        <p:spPr>
-          <a:xfrm>
-            <a:off x="537949" y="2380421"/>
-            <a:ext cx="10515600" cy="3890725"/>
-          </a:xfrm>
-        </p:spPr>
-        <p:txBody>
-          <a:bodyPr>
-            <a:normAutofit fontScale="85000" lnSpcReduction="20000"/>
-          </a:bodyPr>
-          <a:lstStyle/>
-          <a:p>
-            <a:pPr marL="0" indent="0">
-              <a:buNone/>
-            </a:pPr>
-            <a:r>
-              <a:rPr lang="en-US" dirty="0"/>
-              <a:t>Questions we asked:</a:t>
-            </a:r>
-          </a:p>
-          <a:p>
-            <a:r>
-              <a:rPr lang="en-US" dirty="0"/>
-              <a:t>5. </a:t>
-            </a:r>
-            <a:r>
-              <a:rPr lang="en-US" i="1" dirty="0"/>
-              <a:t>Is there are relationship between how happy the country and the kind of music they choose to listen and </a:t>
-            </a:r>
-            <a:r>
-              <a:rPr lang="en-US" i="1" dirty="0" err="1"/>
-              <a:t>prefere</a:t>
-            </a:r>
-            <a:r>
-              <a:rPr lang="en-US" i="1" dirty="0"/>
-              <a:t>?</a:t>
-            </a:r>
-          </a:p>
-          <a:p>
-            <a:endParaRPr lang="en-US" i="1" dirty="0"/>
-          </a:p>
-          <a:p>
-            <a:pPr marL="457200" lvl="1" indent="0">
-              <a:buNone/>
-            </a:pPr>
-            <a:r>
-              <a:rPr lang="en-US" i="1" dirty="0"/>
-              <a:t>  Data needed: </a:t>
-            </a:r>
-          </a:p>
-          <a:p>
-            <a:pPr lvl="1"/>
-            <a:r>
-              <a:rPr lang="en-US" i="1" dirty="0"/>
-              <a:t>Representative sample of top songs per country through out the year.</a:t>
-            </a:r>
-          </a:p>
-          <a:p>
-            <a:pPr lvl="1"/>
-            <a:r>
-              <a:rPr lang="en-US" i="1" dirty="0"/>
-              <a:t>Characteristics of each song rating: happiness, energy, </a:t>
-            </a:r>
-            <a:r>
-              <a:rPr lang="en-US" i="1" dirty="0" err="1"/>
-              <a:t>speachiness</a:t>
-            </a:r>
-            <a:r>
-              <a:rPr lang="en-US" i="1" dirty="0"/>
-              <a:t> and </a:t>
-            </a:r>
-            <a:r>
-              <a:rPr lang="en-US" i="1" dirty="0" err="1"/>
-              <a:t>istrumentalness</a:t>
-            </a:r>
-            <a:r>
-              <a:rPr lang="en-US" i="1" dirty="0"/>
-              <a:t>.</a:t>
-            </a:r>
-          </a:p>
-          <a:p>
-            <a:pPr marL="457200" lvl="1" indent="0">
-              <a:buNone/>
-            </a:pPr>
-            <a:r>
-              <a:rPr lang="en-US" dirty="0"/>
-              <a:t>  Data sources: </a:t>
-            </a:r>
-          </a:p>
-          <a:p>
-            <a:pPr lvl="1"/>
-            <a:r>
-              <a:rPr lang="en-US" dirty="0"/>
-              <a:t>Spotify, </a:t>
-            </a:r>
-            <a:r>
-              <a:rPr lang="en-US" dirty="0" err="1"/>
-              <a:t>Spotypy</a:t>
-            </a:r>
-            <a:r>
-              <a:rPr lang="en-US" dirty="0"/>
-              <a:t> API</a:t>
-            </a:r>
-          </a:p>
-          <a:p>
-            <a:pPr marL="457200" lvl="1" indent="0">
-              <a:buNone/>
-            </a:pPr>
-            <a:r>
-              <a:rPr lang="en-US" dirty="0"/>
-              <a:t>  </a:t>
-            </a:r>
-          </a:p>
-          <a:p>
-            <a:pPr marL="457200" lvl="1" indent="0">
-              <a:buNone/>
-            </a:pPr>
-            <a:r>
-              <a:rPr lang="en-US" dirty="0"/>
-              <a:t>		</a:t>
-            </a:r>
-          </a:p>
-        </p:txBody>
-      </p:sp>
-      <p:sp>
-        <p:nvSpPr>
-          <p:cNvPr id="2" name="Title 1"/>
-          <p:cNvSpPr>
-            <a:spLocks noGrp="1"/>
-          </p:cNvSpPr>
-          <p:nvPr>
-            <p:ph type="title"/>
-          </p:nvPr>
-        </p:nvSpPr>
-        <p:spPr>
-          <a:xfrm>
-            <a:off x="838200" y="1682750"/>
-            <a:ext cx="10515600" cy="528187"/>
-          </a:xfrm>
-        </p:spPr>
-        <p:txBody>
-          <a:bodyPr>
-            <a:normAutofit fontScale="90000"/>
-          </a:bodyPr>
-          <a:lstStyle/>
-          <a:p>
-            <a:r>
-              <a:rPr lang="en-US" dirty="0"/>
-              <a:t>Data</a:t>
-            </a:r>
-          </a:p>
-        </p:txBody>
-      </p:sp>
-      <p:sp>
-        <p:nvSpPr>
-          <p:cNvPr id="10" name="Round Diagonal Corner Rectangle 9"/>
-          <p:cNvSpPr/>
-          <p:nvPr/>
-        </p:nvSpPr>
-        <p:spPr>
-          <a:xfrm>
-            <a:off x="1076885" y="6426201"/>
-            <a:ext cx="8933627" cy="364208"/>
-          </a:xfrm>
-          <a:prstGeom prst="round2DiagRect">
-            <a:avLst/>
-          </a:prstGeom>
-          <a:solidFill>
-            <a:srgbClr val="9E2936"/>
-          </a:solidFill>
-        </p:spPr>
-        <p:style>
-          <a:lnRef idx="1">
-            <a:schemeClr val="accent2"/>
-          </a:lnRef>
-          <a:fillRef idx="2">
-            <a:schemeClr val="accent2"/>
-          </a:fillRef>
-          <a:effectRef idx="1">
-            <a:schemeClr val="accent2"/>
-          </a:effectRef>
-          <a:fontRef idx="minor">
-            <a:schemeClr val="dk1"/>
-          </a:fontRef>
-        </p:style>
-        <p:txBody>
-          <a:bodyPr rtlCol="0" anchor="ctr"/>
-          <a:lstStyle/>
-          <a:p>
-            <a:pPr algn="ctr"/>
-            <a:r>
-              <a:rPr lang="es-CO" dirty="0" err="1">
-                <a:solidFill>
-                  <a:schemeClr val="bg1">
-                    <a:lumMod val="65000"/>
-                  </a:schemeClr>
-                </a:solidFill>
-              </a:rPr>
-              <a:t>Hypothesis</a:t>
-            </a:r>
-            <a:r>
-              <a:rPr lang="es-CO" dirty="0">
-                <a:solidFill>
-                  <a:schemeClr val="bg1">
-                    <a:lumMod val="65000"/>
-                  </a:schemeClr>
-                </a:solidFill>
-              </a:rPr>
-              <a:t> </a:t>
-            </a:r>
-            <a:r>
-              <a:rPr lang="en-US" dirty="0">
-                <a:ln w="0"/>
-                <a:solidFill>
-                  <a:schemeClr val="bg1"/>
-                </a:solidFill>
-                <a:effectLst>
-                  <a:outerShdw blurRad="38100" dist="25400" dir="5400000" algn="ctr" rotWithShape="0">
-                    <a:srgbClr val="6E747A">
-                      <a:alpha val="43000"/>
-                    </a:srgbClr>
-                  </a:outerShdw>
-                </a:effectLst>
-              </a:rPr>
-              <a:t> </a:t>
-            </a:r>
-            <a:r>
-              <a:rPr lang="en-US" dirty="0">
-                <a:ln w="0"/>
-                <a:solidFill>
-                  <a:schemeClr val="bg1">
-                    <a:lumMod val="65000"/>
-                  </a:schemeClr>
-                </a:solidFill>
-                <a:effectLst>
-                  <a:outerShdw blurRad="38100" dist="25400" dir="5400000" algn="ctr" rotWithShape="0">
-                    <a:srgbClr val="6E747A">
-                      <a:alpha val="43000"/>
-                    </a:srgbClr>
-                  </a:outerShdw>
-                </a:effectLst>
-              </a:rPr>
-              <a:t>|   </a:t>
-            </a:r>
-            <a:r>
-              <a:rPr lang="en-US" dirty="0">
-                <a:ln w="0"/>
-                <a:solidFill>
-                  <a:schemeClr val="bg1"/>
-                </a:solidFill>
-                <a:effectLst>
-                  <a:outerShdw blurRad="38100" dist="25400" dir="5400000" algn="ctr" rotWithShape="0">
-                    <a:srgbClr val="6E747A">
-                      <a:alpha val="43000"/>
-                    </a:srgbClr>
-                  </a:outerShdw>
-                </a:effectLst>
-              </a:rPr>
-              <a:t>Data</a:t>
-            </a:r>
-            <a:r>
-              <a:rPr lang="en-US" dirty="0">
-                <a:ln w="0"/>
-                <a:solidFill>
-                  <a:schemeClr val="bg1">
-                    <a:lumMod val="65000"/>
-                  </a:schemeClr>
-                </a:solidFill>
-                <a:effectLst>
-                  <a:outerShdw blurRad="38100" dist="25400" dir="5400000" algn="ctr" rotWithShape="0">
-                    <a:srgbClr val="6E747A">
-                      <a:alpha val="43000"/>
-                    </a:srgbClr>
-                  </a:outerShdw>
-                </a:effectLst>
-              </a:rPr>
-              <a:t> |   Exploration  |   Analysis  |   </a:t>
-            </a:r>
-            <a:r>
-              <a:rPr lang="en-US" dirty="0" err="1">
-                <a:ln w="0"/>
-                <a:solidFill>
-                  <a:schemeClr val="bg1">
-                    <a:lumMod val="65000"/>
-                  </a:schemeClr>
-                </a:solidFill>
-                <a:effectLst>
-                  <a:outerShdw blurRad="38100" dist="25400" dir="5400000" algn="ctr" rotWithShape="0">
-                    <a:srgbClr val="6E747A">
-                      <a:alpha val="43000"/>
-                    </a:srgbClr>
-                  </a:outerShdw>
-                </a:effectLst>
-              </a:rPr>
-              <a:t>Discusion</a:t>
-            </a:r>
-            <a:r>
-              <a:rPr lang="en-US" dirty="0">
-                <a:ln w="0"/>
-                <a:solidFill>
-                  <a:schemeClr val="bg1">
-                    <a:lumMod val="65000"/>
-                  </a:schemeClr>
-                </a:solidFill>
-                <a:effectLst>
-                  <a:outerShdw blurRad="38100" dist="25400" dir="5400000" algn="ctr" rotWithShape="0">
-                    <a:srgbClr val="6E747A">
-                      <a:alpha val="43000"/>
-                    </a:srgbClr>
-                  </a:outerShdw>
-                </a:effectLst>
-              </a:rPr>
-              <a:t>  |  </a:t>
-            </a:r>
-          </a:p>
-        </p:txBody>
-      </p:sp>
-      <p:pic>
-        <p:nvPicPr>
-          <p:cNvPr id="12" name="Picture 11"/>
-          <p:cNvPicPr>
-            <a:picLocks noChangeAspect="1"/>
-          </p:cNvPicPr>
-          <p:nvPr/>
-        </p:nvPicPr>
-        <p:blipFill>
-          <a:blip r:embed="rId3">
-            <a:extLst>
-              <a:ext uri="{BEBA8EAE-BF5A-486C-A8C5-ECC9F3942E4B}">
-                <a14:imgProps xmlns:a14="http://schemas.microsoft.com/office/drawing/2010/main">
-                  <a14:imgLayer r:embed="rId4">
-                    <a14:imgEffect>
-                      <a14:saturation sat="0"/>
-                    </a14:imgEffect>
-                  </a14:imgLayer>
-                </a14:imgProps>
-              </a:ext>
-              <a:ext uri="{28A0092B-C50C-407E-A947-70E740481C1C}">
-                <a14:useLocalDpi xmlns:a14="http://schemas.microsoft.com/office/drawing/2010/main" val="0"/>
-              </a:ext>
-            </a:extLst>
-          </a:blip>
-          <a:stretch>
-            <a:fillRect/>
-          </a:stretch>
-        </p:blipFill>
-        <p:spPr>
-          <a:xfrm>
-            <a:off x="4584700" y="31442"/>
-            <a:ext cx="7607300" cy="1397965"/>
-          </a:xfrm>
-          <a:prstGeom prst="rect">
-            <a:avLst/>
-          </a:prstGeom>
-          <a:effectLst>
-            <a:softEdge rad="50800"/>
-          </a:effectLst>
-        </p:spPr>
-      </p:pic>
-      <p:sp>
-        <p:nvSpPr>
-          <p:cNvPr id="8" name="Title 1">
-            <a:extLst>
-              <a:ext uri="{FF2B5EF4-FFF2-40B4-BE49-F238E27FC236}">
-                <a16:creationId xmlns:a16="http://schemas.microsoft.com/office/drawing/2014/main" id="{984A60E7-48A8-4B8E-AD9F-0A37136405B5}"/>
-              </a:ext>
-            </a:extLst>
-          </p:cNvPr>
-          <p:cNvSpPr txBox="1">
-            <a:spLocks/>
-          </p:cNvSpPr>
-          <p:nvPr/>
-        </p:nvSpPr>
-        <p:spPr>
-          <a:xfrm>
-            <a:off x="0" y="142875"/>
-            <a:ext cx="5076967" cy="1179512"/>
-          </a:xfrm>
-          <a:prstGeom prst="rect">
-            <a:avLst/>
-          </a:prstGeom>
-        </p:spPr>
-        <p:txBody>
-          <a:bodyPr vert="horz" lIns="91440" tIns="45720" rIns="91440" bIns="45720" rtlCol="0" anchor="ctr">
-            <a:normAutofit/>
-          </a:bodyPr>
-          <a:lstStyle>
-            <a:lvl1pPr algn="l" defTabSz="914400" rtl="0" eaLnBrk="1" latinLnBrk="0" hangingPunct="1">
-              <a:spcBef>
-                <a:spcPct val="0"/>
-              </a:spcBef>
-              <a:buNone/>
-              <a:defRPr sz="4400" kern="1200">
-                <a:solidFill>
-                  <a:schemeClr val="accent2"/>
-                </a:solidFill>
-                <a:latin typeface="+mj-lt"/>
-                <a:ea typeface="+mj-ea"/>
-                <a:cs typeface="+mj-cs"/>
-              </a:defRPr>
-            </a:lvl1pPr>
-          </a:lstStyle>
-          <a:p>
-            <a:r>
-              <a:rPr lang="es-CO" sz="3200" dirty="0" err="1"/>
-              <a:t>World</a:t>
-            </a:r>
-            <a:r>
-              <a:rPr lang="es-CO" sz="3200" dirty="0"/>
-              <a:t> </a:t>
-            </a:r>
-            <a:r>
-              <a:rPr lang="es-CO" sz="3200" dirty="0" err="1"/>
-              <a:t>Happines</a:t>
-            </a:r>
-            <a:r>
-              <a:rPr lang="es-CO" sz="3200" dirty="0"/>
-              <a:t> </a:t>
-            </a:r>
-            <a:r>
-              <a:rPr lang="es-CO" sz="3200" dirty="0" err="1"/>
-              <a:t>Analysis</a:t>
-            </a:r>
-            <a:endParaRPr lang="en-US" sz="3000" dirty="0"/>
-          </a:p>
-        </p:txBody>
-      </p:sp>
-    </p:spTree>
-    <p:extLst>
-      <p:ext uri="{BB962C8B-B14F-4D97-AF65-F5344CB8AC3E}">
-        <p14:creationId xmlns:p14="http://schemas.microsoft.com/office/powerpoint/2010/main" val="3762565235"/>
-      </p:ext>
-    </p:extLst>
-  </p:cSld>
-  <p:clrMapOvr>
-    <a:masterClrMapping/>
-  </p:clrMapOvr>
-  <mc:AlternateContent xmlns:mc="http://schemas.openxmlformats.org/markup-compatibility/2006" xmlns:p14="http://schemas.microsoft.com/office/powerpoint/2010/main">
-    <mc:Choice Requires="p14">
-      <p:transition spd="med" p14:dur="700">
-        <p:fade/>
-      </p:transition>
-    </mc:Choice>
-    <mc:Fallback xmlns="">
-      <p:transition spd="med">
-        <p:fade/>
-      </p:transition>
-    </mc:Fallback>
-  </mc:AlternateContent>
-</p:sld>
-</file>
-
-<file path=ppt/slides/slide9.xml><?xml version="1.0" encoding="utf-8"?>
-<p:sld xmlns:a="http://schemas.openxmlformats.org/drawingml/2006/main" xmlns:r="http://schemas.openxmlformats.org/officeDocument/2006/relationships" xmlns:p="http://schemas.openxmlformats.org/presentationml/2006/main">
-  <p:cSld>
-    <p:spTree>
-      <p:nvGrpSpPr>
-        <p:cNvPr id="1" name=""/>
-        <p:cNvGrpSpPr/>
-        <p:nvPr/>
-      </p:nvGrpSpPr>
-      <p:grpSpPr>
-        <a:xfrm>
-          <a:off x="0" y="0"/>
-          <a:ext cx="0" cy="0"/>
-          <a:chOff x="0" y="0"/>
-          <a:chExt cx="0" cy="0"/>
-        </a:xfrm>
-      </p:grpSpPr>
-      <p:pic>
-        <p:nvPicPr>
-          <p:cNvPr id="5" name="Content Placeholder 4" descr="A screenshot of a cell phone&#10;&#10;Description automatically generated">
-            <a:extLst>
-              <a:ext uri="{FF2B5EF4-FFF2-40B4-BE49-F238E27FC236}">
-                <a16:creationId xmlns:a16="http://schemas.microsoft.com/office/drawing/2014/main" id="{DC7C85E5-6604-4226-BBCA-D35ACAF135F8}"/>
-              </a:ext>
-            </a:extLst>
-          </p:cNvPr>
-          <p:cNvPicPr>
-            <a:picLocks noGrp="1" noChangeAspect="1"/>
-          </p:cNvPicPr>
-          <p:nvPr>
-            <p:ph idx="1"/>
-          </p:nvPr>
-        </p:nvPicPr>
-        <p:blipFill>
-          <a:blip r:embed="rId3">
-            <a:extLst>
-              <a:ext uri="{28A0092B-C50C-407E-A947-70E740481C1C}">
-                <a14:useLocalDpi xmlns:a14="http://schemas.microsoft.com/office/drawing/2010/main" val="0"/>
-              </a:ext>
-            </a:extLst>
-          </a:blip>
-          <a:stretch>
-            <a:fillRect/>
-          </a:stretch>
-        </p:blipFill>
-        <p:spPr>
-          <a:xfrm>
-            <a:off x="3352175" y="2424490"/>
-            <a:ext cx="5487650" cy="3658433"/>
-          </a:xfrm>
-        </p:spPr>
-      </p:pic>
-      <p:sp>
-        <p:nvSpPr>
-          <p:cNvPr id="2" name="Title 1"/>
-          <p:cNvSpPr>
-            <a:spLocks noGrp="1"/>
-          </p:cNvSpPr>
-          <p:nvPr>
-            <p:ph type="title"/>
-          </p:nvPr>
-        </p:nvSpPr>
-        <p:spPr>
-          <a:xfrm>
-            <a:off x="838200" y="1682750"/>
-            <a:ext cx="10515600" cy="535011"/>
-          </a:xfrm>
-        </p:spPr>
-        <p:txBody>
-          <a:bodyPr>
-            <a:normAutofit fontScale="90000"/>
-          </a:bodyPr>
-          <a:lstStyle/>
-          <a:p>
-            <a:r>
-              <a:rPr lang="en-US" dirty="0"/>
-              <a:t>Exploration &amp; Analysis – Happiness Index</a:t>
-            </a:r>
-          </a:p>
-        </p:txBody>
-      </p:sp>
-      <p:sp>
-        <p:nvSpPr>
-          <p:cNvPr id="10" name="Round Diagonal Corner Rectangle 9"/>
-          <p:cNvSpPr/>
-          <p:nvPr/>
-        </p:nvSpPr>
-        <p:spPr>
-          <a:xfrm>
-            <a:off x="1076885" y="6426201"/>
-            <a:ext cx="8933627" cy="364208"/>
-          </a:xfrm>
-          <a:prstGeom prst="round2DiagRect">
-            <a:avLst/>
-          </a:prstGeom>
-          <a:solidFill>
-            <a:srgbClr val="9E2936"/>
-          </a:solidFill>
-        </p:spPr>
-        <p:style>
-          <a:lnRef idx="1">
-            <a:schemeClr val="accent2"/>
-          </a:lnRef>
-          <a:fillRef idx="2">
-            <a:schemeClr val="accent2"/>
-          </a:fillRef>
-          <a:effectRef idx="1">
-            <a:schemeClr val="accent2"/>
-          </a:effectRef>
-          <a:fontRef idx="minor">
-            <a:schemeClr val="dk1"/>
-          </a:fontRef>
-        </p:style>
-        <p:txBody>
-          <a:bodyPr rtlCol="0" anchor="ctr"/>
-          <a:lstStyle/>
-          <a:p>
-            <a:pPr algn="ctr"/>
-            <a:r>
-              <a:rPr lang="es-CO" dirty="0" err="1">
-                <a:solidFill>
-                  <a:schemeClr val="bg1">
-                    <a:lumMod val="65000"/>
-                  </a:schemeClr>
-                </a:solidFill>
-              </a:rPr>
-              <a:t>Hypothesis</a:t>
-            </a:r>
-            <a:r>
-              <a:rPr lang="es-CO" dirty="0">
-                <a:solidFill>
-                  <a:schemeClr val="bg1">
-                    <a:lumMod val="65000"/>
-                  </a:schemeClr>
-                </a:solidFill>
-              </a:rPr>
-              <a:t> </a:t>
-            </a:r>
-            <a:r>
-              <a:rPr lang="en-US" dirty="0">
-                <a:ln w="0"/>
-                <a:solidFill>
-                  <a:schemeClr val="bg1"/>
-                </a:solidFill>
-                <a:effectLst>
-                  <a:outerShdw blurRad="38100" dist="25400" dir="5400000" algn="ctr" rotWithShape="0">
-                    <a:srgbClr val="6E747A">
-                      <a:alpha val="43000"/>
-                    </a:srgbClr>
-                  </a:outerShdw>
-                </a:effectLst>
-              </a:rPr>
-              <a:t> </a:t>
-            </a:r>
-            <a:r>
-              <a:rPr lang="en-US" dirty="0">
-                <a:ln w="0"/>
-                <a:solidFill>
-                  <a:schemeClr val="bg1">
-                    <a:lumMod val="65000"/>
-                  </a:schemeClr>
-                </a:solidFill>
-                <a:effectLst>
-                  <a:outerShdw blurRad="38100" dist="25400" dir="5400000" algn="ctr" rotWithShape="0">
-                    <a:srgbClr val="6E747A">
-                      <a:alpha val="43000"/>
-                    </a:srgbClr>
-                  </a:outerShdw>
-                </a:effectLst>
-              </a:rPr>
-              <a:t>|   Data |   </a:t>
-            </a:r>
-            <a:r>
-              <a:rPr lang="en-US" dirty="0">
-                <a:ln w="0"/>
-                <a:solidFill>
-                  <a:schemeClr val="bg1"/>
-                </a:solidFill>
-                <a:effectLst>
-                  <a:outerShdw blurRad="38100" dist="25400" dir="5400000" algn="ctr" rotWithShape="0">
-                    <a:srgbClr val="6E747A">
-                      <a:alpha val="43000"/>
-                    </a:srgbClr>
-                  </a:outerShdw>
-                </a:effectLst>
-              </a:rPr>
-              <a:t>Exploration &amp; analysis</a:t>
-            </a:r>
-            <a:r>
-              <a:rPr lang="en-US" dirty="0">
-                <a:ln w="0"/>
-                <a:solidFill>
-                  <a:schemeClr val="bg1">
-                    <a:lumMod val="65000"/>
-                  </a:schemeClr>
-                </a:solidFill>
-                <a:effectLst>
-                  <a:outerShdw blurRad="38100" dist="25400" dir="5400000" algn="ctr" rotWithShape="0">
-                    <a:srgbClr val="6E747A">
-                      <a:alpha val="43000"/>
-                    </a:srgbClr>
-                  </a:outerShdw>
-                </a:effectLst>
-              </a:rPr>
-              <a:t> |   </a:t>
-            </a:r>
-            <a:r>
-              <a:rPr lang="en-US" dirty="0" err="1">
-                <a:ln w="0"/>
-                <a:solidFill>
-                  <a:schemeClr val="bg1">
-                    <a:lumMod val="65000"/>
-                  </a:schemeClr>
-                </a:solidFill>
-                <a:effectLst>
-                  <a:outerShdw blurRad="38100" dist="25400" dir="5400000" algn="ctr" rotWithShape="0">
-                    <a:srgbClr val="6E747A">
-                      <a:alpha val="43000"/>
-                    </a:srgbClr>
-                  </a:outerShdw>
-                </a:effectLst>
-              </a:rPr>
-              <a:t>Discusion</a:t>
-            </a:r>
-            <a:r>
-              <a:rPr lang="en-US" dirty="0">
-                <a:ln w="0"/>
-                <a:solidFill>
-                  <a:schemeClr val="bg1">
-                    <a:lumMod val="65000"/>
-                  </a:schemeClr>
-                </a:solidFill>
-                <a:effectLst>
-                  <a:outerShdw blurRad="38100" dist="25400" dir="5400000" algn="ctr" rotWithShape="0">
-                    <a:srgbClr val="6E747A">
-                      <a:alpha val="43000"/>
-                    </a:srgbClr>
-                  </a:outerShdw>
-                </a:effectLst>
-              </a:rPr>
-              <a:t>  |  </a:t>
-            </a:r>
-          </a:p>
-        </p:txBody>
-      </p:sp>
-      <p:pic>
-        <p:nvPicPr>
-          <p:cNvPr id="12" name="Picture 11"/>
-          <p:cNvPicPr>
-            <a:picLocks noChangeAspect="1"/>
-          </p:cNvPicPr>
-          <p:nvPr/>
-        </p:nvPicPr>
-        <p:blipFill>
-          <a:blip r:embed="rId4">
-            <a:extLst>
-              <a:ext uri="{BEBA8EAE-BF5A-486C-A8C5-ECC9F3942E4B}">
-                <a14:imgProps xmlns:a14="http://schemas.microsoft.com/office/drawing/2010/main">
-                  <a14:imgLayer r:embed="rId5">
-                    <a14:imgEffect>
-                      <a14:saturation sat="0"/>
-                    </a14:imgEffect>
-                  </a14:imgLayer>
-                </a14:imgProps>
-              </a:ext>
-              <a:ext uri="{28A0092B-C50C-407E-A947-70E740481C1C}">
-                <a14:useLocalDpi xmlns:a14="http://schemas.microsoft.com/office/drawing/2010/main" val="0"/>
-              </a:ext>
-            </a:extLst>
-          </a:blip>
-          <a:stretch>
-            <a:fillRect/>
-          </a:stretch>
-        </p:blipFill>
-        <p:spPr>
-          <a:xfrm>
-            <a:off x="4584700" y="31442"/>
-            <a:ext cx="7607300" cy="1397965"/>
-          </a:xfrm>
-          <a:prstGeom prst="rect">
-            <a:avLst/>
-          </a:prstGeom>
-          <a:effectLst>
-            <a:softEdge rad="50800"/>
-          </a:effectLst>
-        </p:spPr>
-      </p:pic>
-      <p:sp>
-        <p:nvSpPr>
-          <p:cNvPr id="8" name="Title 1">
-            <a:extLst>
-              <a:ext uri="{FF2B5EF4-FFF2-40B4-BE49-F238E27FC236}">
-                <a16:creationId xmlns:a16="http://schemas.microsoft.com/office/drawing/2014/main" id="{984A60E7-48A8-4B8E-AD9F-0A37136405B5}"/>
-              </a:ext>
-            </a:extLst>
-          </p:cNvPr>
-          <p:cNvSpPr txBox="1">
-            <a:spLocks/>
-          </p:cNvSpPr>
-          <p:nvPr/>
-        </p:nvSpPr>
-        <p:spPr>
-          <a:xfrm>
-            <a:off x="0" y="142875"/>
-            <a:ext cx="5076967" cy="1179512"/>
-          </a:xfrm>
-          <a:prstGeom prst="rect">
-            <a:avLst/>
-          </a:prstGeom>
-        </p:spPr>
-        <p:txBody>
-          <a:bodyPr vert="horz" lIns="91440" tIns="45720" rIns="91440" bIns="45720" rtlCol="0" anchor="ctr">
-            <a:normAutofit/>
-          </a:bodyPr>
-          <a:lstStyle>
-            <a:lvl1pPr algn="l" defTabSz="914400" rtl="0" eaLnBrk="1" latinLnBrk="0" hangingPunct="1">
-              <a:spcBef>
-                <a:spcPct val="0"/>
-              </a:spcBef>
-              <a:buNone/>
-              <a:defRPr sz="4400" kern="1200">
-                <a:solidFill>
-                  <a:schemeClr val="accent2"/>
-                </a:solidFill>
-                <a:latin typeface="+mj-lt"/>
-                <a:ea typeface="+mj-ea"/>
-                <a:cs typeface="+mj-cs"/>
-              </a:defRPr>
-            </a:lvl1pPr>
-          </a:lstStyle>
-          <a:p>
-            <a:r>
-              <a:rPr lang="es-CO" sz="3200" dirty="0" err="1"/>
-              <a:t>World</a:t>
-            </a:r>
-            <a:r>
-              <a:rPr lang="es-CO" sz="3200" dirty="0"/>
-              <a:t> </a:t>
-            </a:r>
-            <a:r>
-              <a:rPr lang="es-CO" sz="3200" dirty="0" err="1"/>
-              <a:t>Happines</a:t>
-            </a:r>
-            <a:r>
-              <a:rPr lang="es-CO" sz="3200" dirty="0"/>
-              <a:t> </a:t>
-            </a:r>
-            <a:r>
-              <a:rPr lang="es-CO" sz="3200" dirty="0" err="1"/>
-              <a:t>Analysis</a:t>
-            </a:r>
-            <a:endParaRPr lang="en-US" sz="3000" dirty="0"/>
-          </a:p>
-        </p:txBody>
-      </p:sp>
-    </p:spTree>
-    <p:extLst>
-      <p:ext uri="{BB962C8B-B14F-4D97-AF65-F5344CB8AC3E}">
-        <p14:creationId xmlns:p14="http://schemas.microsoft.com/office/powerpoint/2010/main" val="1974974057"/>
+        <p14:creationId xmlns:p14="http://schemas.microsoft.com/office/powerpoint/2010/main" val="256757830"/>
       </p:ext>
     </p:extLst>
   </p:cSld>
@@ -14124,6 +13583,15 @@
 </file>
 
 <file path=customXml/item1.xml><?xml version="1.0" encoding="utf-8"?>
+<?mso-contentType ?>
+<FormTemplates xmlns="http://schemas.microsoft.com/sharepoint/v3/contenttype/forms">
+  <Display>DocumentLibraryForm</Display>
+  <Edit>AssetEditForm</Edit>
+  <New>DocumentLibraryForm</New>
+</FormTemplates>
+</file>
+
+<file path=customXml/item2.xml><?xml version="1.0" encoding="utf-8"?>
 <p:properties xmlns:p="http://schemas.microsoft.com/office/2006/metadata/properties" xmlns:xsi="http://www.w3.org/2001/XMLSchema-instance" xmlns:pc="http://schemas.microsoft.com/office/infopath/2007/PartnerControls">
   <documentManagement>
     <APDescription xmlns="4873beb7-5857-4685-be1f-d57550cc96cc" xsi:nil="true"/>
@@ -14247,15 +13715,6 @@
     <UANotes xmlns="4873beb7-5857-4685-be1f-d57550cc96cc" xsi:nil="true"/>
   </documentManagement>
 </p:properties>
-</file>
-
-<file path=customXml/item2.xml><?xml version="1.0" encoding="utf-8"?>
-<?mso-contentType ?>
-<FormTemplates xmlns="http://schemas.microsoft.com/sharepoint/v3/contenttype/forms">
-  <Display>DocumentLibraryForm</Display>
-  <Edit>AssetEditForm</Edit>
-  <New>DocumentLibraryForm</New>
-</FormTemplates>
 </file>
 
 <file path=customXml/item3.xml><?xml version="1.0" encoding="utf-8"?>
@@ -15299,6 +14758,14 @@
 </file>
 
 <file path=customXml/itemProps1.xml><?xml version="1.0" encoding="utf-8"?>
+<ds:datastoreItem xmlns:ds="http://schemas.openxmlformats.org/officeDocument/2006/customXml" ds:itemID="{DCE864F3-A1EC-4046-9110-1C72B133CC3C}">
+  <ds:schemaRefs>
+    <ds:schemaRef ds:uri="http://schemas.microsoft.com/sharepoint/v3/contenttype/forms"/>
+  </ds:schemaRefs>
+</ds:datastoreItem>
+</file>
+
+<file path=customXml/itemProps2.xml><?xml version="1.0" encoding="utf-8"?>
 <ds:datastoreItem xmlns:ds="http://schemas.openxmlformats.org/officeDocument/2006/customXml" ds:itemID="{8EF0CB1D-80F7-4EA9-8A4A-0886922580CB}">
   <ds:schemaRefs>
     <ds:schemaRef ds:uri="http://schemas.microsoft.com/office/2006/metadata/properties"/>
@@ -15310,14 +14777,6 @@
     <ds:schemaRef ds:uri="http://schemas.microsoft.com/office/infopath/2007/PartnerControls"/>
     <ds:schemaRef ds:uri="http://purl.org/dc/terms/"/>
     <ds:schemaRef ds:uri="4873beb7-5857-4685-be1f-d57550cc96cc"/>
-  </ds:schemaRefs>
-</ds:datastoreItem>
-</file>
-
-<file path=customXml/itemProps2.xml><?xml version="1.0" encoding="utf-8"?>
-<ds:datastoreItem xmlns:ds="http://schemas.openxmlformats.org/officeDocument/2006/customXml" ds:itemID="{DCE864F3-A1EC-4046-9110-1C72B133CC3C}">
-  <ds:schemaRefs>
-    <ds:schemaRef ds:uri="http://schemas.microsoft.com/sharepoint/v3/contenttype/forms"/>
   </ds:schemaRefs>
 </ds:datastoreItem>
 </file>

</xml_diff>

<commit_message>
adding trend lines to spotify charts
</commit_message>
<xml_diff>
--- a/World Happiness Analysis- Group 4 Final Presentation.pptx
+++ b/World Happiness Analysis- Group 4 Final Presentation.pptx
@@ -220,7 +220,7 @@
           <a:p>
             <a:fld id="{F16760AE-279B-4AC5-A969-B7BD8CC351AB}" type="datetimeFigureOut">
               <a:rPr lang="en-US" smtClean="0"/>
-              <a:t>4/7/2019</a:t>
+              <a:t>4/10/2019</a:t>
             </a:fld>
             <a:endParaRPr lang="en-US"/>
           </a:p>
@@ -385,7 +385,7 @@
           <a:p>
             <a:fld id="{453E8A59-462E-44B2-B5D3-F7709038E0EB}" type="datetimeFigureOut">
               <a:rPr lang="en-US" smtClean="0"/>
-              <a:t>4/7/2019</a:t>
+              <a:t>4/8/2019</a:t>
             </a:fld>
             <a:endParaRPr lang="en-US"/>
           </a:p>
@@ -2317,7 +2317,7 @@
           <a:p>
             <a:fld id="{12BB8B08-D58C-4F06-9E25-A6F6DAF16C7D}" type="datetime1">
               <a:rPr lang="en-US" smtClean="0"/>
-              <a:t>4/7/2019</a:t>
+              <a:t>4/8/2019</a:t>
             </a:fld>
             <a:endParaRPr lang="en-US"/>
           </a:p>
@@ -2425,7 +2425,7 @@
           <a:p>
             <a:fld id="{4F490F93-5B8C-408E-9CFB-3F8A1CDFAD5F}" type="datetime1">
               <a:rPr lang="en-US" smtClean="0"/>
-              <a:t>4/7/2019</a:t>
+              <a:t>4/8/2019</a:t>
             </a:fld>
             <a:endParaRPr lang="en-US"/>
           </a:p>
@@ -2622,7 +2622,7 @@
           <a:p>
             <a:fld id="{FC282276-6DC1-4F27-9C77-C5F14D1F8F2C}" type="datetime1">
               <a:rPr lang="en-US" smtClean="0"/>
-              <a:t>4/7/2019</a:t>
+              <a:t>4/8/2019</a:t>
             </a:fld>
             <a:endParaRPr lang="en-US"/>
           </a:p>
@@ -2818,7 +2818,7 @@
           <a:p>
             <a:fld id="{A14B6FE2-9120-40A6-9C33-392D749D851F}" type="datetime1">
               <a:rPr lang="en-US" smtClean="0"/>
-              <a:t>4/7/2019</a:t>
+              <a:t>4/8/2019</a:t>
             </a:fld>
             <a:endParaRPr lang="en-US"/>
           </a:p>
@@ -3014,7 +3014,7 @@
           <a:p>
             <a:fld id="{33BA0D65-8961-43B9-AEED-7CD3BC7EDCFB}" type="datetime1">
               <a:rPr lang="en-US" smtClean="0"/>
-              <a:t>4/7/2019</a:t>
+              <a:t>4/8/2019</a:t>
             </a:fld>
             <a:endParaRPr lang="en-US"/>
           </a:p>
@@ -3224,7 +3224,7 @@
           <a:p>
             <a:fld id="{6E54E8E6-2D33-4C28-A5E2-468146984DC5}" type="datetime1">
               <a:rPr lang="en-US" smtClean="0"/>
-              <a:t>4/7/2019</a:t>
+              <a:t>4/8/2019</a:t>
             </a:fld>
             <a:endParaRPr lang="en-US"/>
           </a:p>
@@ -3560,7 +3560,7 @@
           <a:p>
             <a:fld id="{110798B6-1B52-4EC8-97C7-BE39A5F432B3}" type="datetime1">
               <a:rPr lang="en-US" smtClean="0"/>
-              <a:t>4/7/2019</a:t>
+              <a:t>4/8/2019</a:t>
             </a:fld>
             <a:endParaRPr lang="en-US"/>
           </a:p>
@@ -3986,7 +3986,7 @@
           <a:p>
             <a:fld id="{E48FAB2C-97D9-4818-A803-786BFF56A466}" type="datetime1">
               <a:rPr lang="en-US" smtClean="0"/>
-              <a:t>4/7/2019</a:t>
+              <a:t>4/8/2019</a:t>
             </a:fld>
             <a:endParaRPr lang="en-US"/>
           </a:p>
@@ -4124,7 +4124,7 @@
           <a:p>
             <a:fld id="{E17A8691-BFB3-4DE2-921A-9BEB79E6B02F}" type="datetime1">
               <a:rPr lang="en-US" smtClean="0"/>
-              <a:t>4/7/2019</a:t>
+              <a:t>4/8/2019</a:t>
             </a:fld>
             <a:endParaRPr lang="en-US"/>
           </a:p>
@@ -4231,7 +4231,7 @@
           <a:p>
             <a:fld id="{F55EF98E-4A7B-48A6-9104-D7B6CBFB329E}" type="datetime1">
               <a:rPr lang="en-US" smtClean="0"/>
-              <a:t>4/7/2019</a:t>
+              <a:t>4/8/2019</a:t>
             </a:fld>
             <a:endParaRPr lang="en-US"/>
           </a:p>
@@ -4550,7 +4550,7 @@
           <a:p>
             <a:fld id="{9B615D70-3893-4811-99A3-C8475F2779BB}" type="datetime1">
               <a:rPr lang="en-US" smtClean="0"/>
-              <a:t>4/7/2019</a:t>
+              <a:t>4/8/2019</a:t>
             </a:fld>
             <a:endParaRPr lang="en-US"/>
           </a:p>
@@ -4834,7 +4834,7 @@
           <a:p>
             <a:fld id="{0983B609-6865-4940-88BB-AE7F4644EA4C}" type="datetime1">
               <a:rPr lang="en-US" smtClean="0"/>
-              <a:t>4/7/2019</a:t>
+              <a:t>4/8/2019</a:t>
             </a:fld>
             <a:endParaRPr lang="en-US"/>
           </a:p>
@@ -7212,15 +7212,7 @@
           <a:p>
             <a:r>
               <a:rPr lang="en-US" b="0" dirty="0"/>
-              <a:t>R </a:t>
-            </a:r>
-            <a:r>
-              <a:rPr lang="en-US" b="0" dirty="0" err="1"/>
-              <a:t>sqr</a:t>
-            </a:r>
-            <a:r>
-              <a:rPr lang="en-US" b="0" dirty="0"/>
-              <a:t>= -0.07 P-Value= 0.59</a:t>
+              <a:t>R = -0.07 P-Value= 0.59</a:t>
             </a:r>
             <a:endParaRPr lang="en-US" dirty="0"/>
           </a:p>
@@ -7291,15 +7283,7 @@
           <a:p>
             <a:r>
               <a:rPr lang="en-US" b="0" dirty="0"/>
-              <a:t>R </a:t>
-            </a:r>
-            <a:r>
-              <a:rPr lang="en-US" b="0" dirty="0" err="1"/>
-              <a:t>sqr</a:t>
-            </a:r>
-            <a:r>
-              <a:rPr lang="en-US" b="0" dirty="0"/>
-              <a:t>= -0.29 P-Value= 0.034</a:t>
+              <a:t>R= -0.29 P-Value= 0.034</a:t>
             </a:r>
             <a:endParaRPr lang="en-US" dirty="0"/>
           </a:p>
@@ -7643,16 +7627,12 @@
           <a:lstStyle/>
           <a:p>
             <a:r>
+              <a:rPr lang="en-US" b="0"/>
+              <a:t>R = </a:t>
+            </a:r>
+            <a:r>
               <a:rPr lang="en-US" b="0" dirty="0"/>
-              <a:t>R </a:t>
-            </a:r>
-            <a:r>
-              <a:rPr lang="en-US" b="0" dirty="0" err="1"/>
-              <a:t>sqr</a:t>
-            </a:r>
-            <a:r>
-              <a:rPr lang="en-US" b="0" dirty="0"/>
-              <a:t>= 0.42 P-Value= 0.00183</a:t>
+              <a:t>0.42 P-Value= 0.00183</a:t>
             </a:r>
             <a:endParaRPr lang="en-US" dirty="0"/>
           </a:p>
@@ -7688,15 +7668,7 @@
           <a:p>
             <a:r>
               <a:rPr lang="en-US" b="0" dirty="0"/>
-              <a:t>R </a:t>
-            </a:r>
-            <a:r>
-              <a:rPr lang="en-US" b="0" dirty="0" err="1"/>
-              <a:t>sqr</a:t>
-            </a:r>
-            <a:r>
-              <a:rPr lang="en-US" b="0" dirty="0"/>
-              <a:t>= -0.21 P-Value= 0.13</a:t>
+              <a:t>R= -0.21 P-Value= 0.13</a:t>
             </a:r>
             <a:endParaRPr lang="en-US" dirty="0"/>
           </a:p>
@@ -13583,15 +13555,6 @@
 </file>
 
 <file path=customXml/item1.xml><?xml version="1.0" encoding="utf-8"?>
-<?mso-contentType ?>
-<FormTemplates xmlns="http://schemas.microsoft.com/sharepoint/v3/contenttype/forms">
-  <Display>DocumentLibraryForm</Display>
-  <Edit>AssetEditForm</Edit>
-  <New>DocumentLibraryForm</New>
-</FormTemplates>
-</file>
-
-<file path=customXml/item2.xml><?xml version="1.0" encoding="utf-8"?>
 <p:properties xmlns:p="http://schemas.microsoft.com/office/2006/metadata/properties" xmlns:xsi="http://www.w3.org/2001/XMLSchema-instance" xmlns:pc="http://schemas.microsoft.com/office/infopath/2007/PartnerControls">
   <documentManagement>
     <APDescription xmlns="4873beb7-5857-4685-be1f-d57550cc96cc" xsi:nil="true"/>
@@ -13715,6 +13678,15 @@
     <UANotes xmlns="4873beb7-5857-4685-be1f-d57550cc96cc" xsi:nil="true"/>
   </documentManagement>
 </p:properties>
+</file>
+
+<file path=customXml/item2.xml><?xml version="1.0" encoding="utf-8"?>
+<?mso-contentType ?>
+<FormTemplates xmlns="http://schemas.microsoft.com/sharepoint/v3/contenttype/forms">
+  <Display>DocumentLibraryForm</Display>
+  <Edit>AssetEditForm</Edit>
+  <New>DocumentLibraryForm</New>
+</FormTemplates>
 </file>
 
 <file path=customXml/item3.xml><?xml version="1.0" encoding="utf-8"?>
@@ -14758,14 +14730,6 @@
 </file>
 
 <file path=customXml/itemProps1.xml><?xml version="1.0" encoding="utf-8"?>
-<ds:datastoreItem xmlns:ds="http://schemas.openxmlformats.org/officeDocument/2006/customXml" ds:itemID="{DCE864F3-A1EC-4046-9110-1C72B133CC3C}">
-  <ds:schemaRefs>
-    <ds:schemaRef ds:uri="http://schemas.microsoft.com/sharepoint/v3/contenttype/forms"/>
-  </ds:schemaRefs>
-</ds:datastoreItem>
-</file>
-
-<file path=customXml/itemProps2.xml><?xml version="1.0" encoding="utf-8"?>
 <ds:datastoreItem xmlns:ds="http://schemas.openxmlformats.org/officeDocument/2006/customXml" ds:itemID="{8EF0CB1D-80F7-4EA9-8A4A-0886922580CB}">
   <ds:schemaRefs>
     <ds:schemaRef ds:uri="http://schemas.microsoft.com/office/2006/metadata/properties"/>
@@ -14777,6 +14741,14 @@
     <ds:schemaRef ds:uri="http://schemas.microsoft.com/office/infopath/2007/PartnerControls"/>
     <ds:schemaRef ds:uri="http://purl.org/dc/terms/"/>
     <ds:schemaRef ds:uri="4873beb7-5857-4685-be1f-d57550cc96cc"/>
+  </ds:schemaRefs>
+</ds:datastoreItem>
+</file>
+
+<file path=customXml/itemProps2.xml><?xml version="1.0" encoding="utf-8"?>
+<ds:datastoreItem xmlns:ds="http://schemas.openxmlformats.org/officeDocument/2006/customXml" ds:itemID="{DCE864F3-A1EC-4046-9110-1C72B133CC3C}">
+  <ds:schemaRefs>
+    <ds:schemaRef ds:uri="http://schemas.microsoft.com/sharepoint/v3/contenttype/forms"/>
   </ds:schemaRefs>
 </ds:datastoreItem>
 </file>

</xml_diff>